<commit_message>
Changed cuts in band fitting
</commit_message>
<xml_diff>
--- a/Presentations/group_status_update/neriX_nr_status.pptx
+++ b/Presentations/group_status_update/neriX_nr_status.pptx
@@ -5,10 +5,10 @@
     <p:sldMasterId id="2147483675" r:id="rId1"/>
   </p:sldMasterIdLst>
   <p:notesMasterIdLst>
-    <p:notesMasterId r:id="rId14"/>
+    <p:notesMasterId r:id="rId15"/>
   </p:notesMasterIdLst>
   <p:handoutMasterIdLst>
-    <p:handoutMasterId r:id="rId15"/>
+    <p:handoutMasterId r:id="rId16"/>
   </p:handoutMasterIdLst>
   <p:sldIdLst>
     <p:sldId id="282" r:id="rId2"/>
@@ -17,12 +17,13 @@
     <p:sldId id="284" r:id="rId5"/>
     <p:sldId id="285" r:id="rId6"/>
     <p:sldId id="287" r:id="rId7"/>
-    <p:sldId id="286" r:id="rId8"/>
-    <p:sldId id="290" r:id="rId9"/>
-    <p:sldId id="288" r:id="rId10"/>
-    <p:sldId id="289" r:id="rId11"/>
-    <p:sldId id="291" r:id="rId12"/>
-    <p:sldId id="292" r:id="rId13"/>
+    <p:sldId id="293" r:id="rId8"/>
+    <p:sldId id="286" r:id="rId9"/>
+    <p:sldId id="290" r:id="rId10"/>
+    <p:sldId id="288" r:id="rId11"/>
+    <p:sldId id="289" r:id="rId12"/>
+    <p:sldId id="291" r:id="rId13"/>
+    <p:sldId id="292" r:id="rId14"/>
   </p:sldIdLst>
   <p:sldSz cx="9144000" cy="6858000" type="screen4x3"/>
   <p:notesSz cx="6858000" cy="9144000"/>
@@ -206,7 +207,7 @@
           <a:p>
             <a:fld id="{C2B6A889-753A-F242-AA11-5A8C7810D63F}" type="datetime1">
               <a:rPr lang="en-US" smtClean="0"/>
-              <a:t>7/5/16</a:t>
+              <a:t>8/1/16</a:t>
             </a:fld>
             <a:endParaRPr lang="en-US"/>
           </a:p>
@@ -372,7 +373,7 @@
           <a:p>
             <a:fld id="{29DAF0D2-C3E7-3D4C-AC90-0C88761377B3}" type="datetime1">
               <a:rPr lang="en-US" smtClean="0"/>
-              <a:t>7/5/16</a:t>
+              <a:t>8/1/16</a:t>
             </a:fld>
             <a:endParaRPr lang="en-US"/>
           </a:p>
@@ -857,10 +858,6 @@
           <a:bodyPr/>
           <a:lstStyle/>
           <a:p>
-            <a:pPr marL="0" indent="0">
-              <a:buFont typeface="Arial"/>
-              <a:buNone/>
-            </a:pPr>
             <a:endParaRPr lang="en-US" dirty="0"/>
           </a:p>
         </p:txBody>
@@ -891,7 +888,7 @@
     </p:spTree>
     <p:extLst>
       <p:ext uri="{BB962C8B-B14F-4D97-AF65-F5344CB8AC3E}">
-        <p14:creationId xmlns:p14="http://schemas.microsoft.com/office/powerpoint/2010/main" val="3991195823"/>
+        <p14:creationId xmlns:p14="http://schemas.microsoft.com/office/powerpoint/2010/main" val="740614714"/>
       </p:ext>
     </p:extLst>
   </p:cSld>
@@ -971,6 +968,94 @@
             <a:fld id="{65102967-BEC4-0F46-A022-1564C826E33F}" type="slidenum">
               <a:rPr lang="en-US" smtClean="0"/>
               <a:t>12</a:t>
+            </a:fld>
+            <a:endParaRPr lang="en-US"/>
+          </a:p>
+        </p:txBody>
+      </p:sp>
+    </p:spTree>
+    <p:extLst>
+      <p:ext uri="{BB962C8B-B14F-4D97-AF65-F5344CB8AC3E}">
+        <p14:creationId xmlns:p14="http://schemas.microsoft.com/office/powerpoint/2010/main" val="3991195823"/>
+      </p:ext>
+    </p:extLst>
+  </p:cSld>
+  <p:clrMapOvr>
+    <a:masterClrMapping/>
+  </p:clrMapOvr>
+</p:notes>
+</file>
+
+<file path=ppt/notesSlides/notesSlide13.xml><?xml version="1.0" encoding="utf-8"?>
+<p:notes xmlns:a="http://schemas.openxmlformats.org/drawingml/2006/main" xmlns:r="http://schemas.openxmlformats.org/officeDocument/2006/relationships" xmlns:p="http://schemas.openxmlformats.org/presentationml/2006/main">
+  <p:cSld>
+    <p:spTree>
+      <p:nvGrpSpPr>
+        <p:cNvPr id="1" name=""/>
+        <p:cNvGrpSpPr/>
+        <p:nvPr/>
+      </p:nvGrpSpPr>
+      <p:grpSpPr>
+        <a:xfrm>
+          <a:off x="0" y="0"/>
+          <a:ext cx="0" cy="0"/>
+          <a:chOff x="0" y="0"/>
+          <a:chExt cx="0" cy="0"/>
+        </a:xfrm>
+      </p:grpSpPr>
+      <p:sp>
+        <p:nvSpPr>
+          <p:cNvPr id="2" name="Slide Image Placeholder 1"/>
+          <p:cNvSpPr>
+            <a:spLocks noGrp="1" noRot="1" noChangeAspect="1"/>
+          </p:cNvSpPr>
+          <p:nvPr>
+            <p:ph type="sldImg"/>
+          </p:nvPr>
+        </p:nvSpPr>
+        <p:spPr/>
+      </p:sp>
+      <p:sp>
+        <p:nvSpPr>
+          <p:cNvPr id="3" name="Notes Placeholder 2"/>
+          <p:cNvSpPr>
+            <a:spLocks noGrp="1"/>
+          </p:cNvSpPr>
+          <p:nvPr>
+            <p:ph type="body" idx="1"/>
+          </p:nvPr>
+        </p:nvSpPr>
+        <p:spPr/>
+        <p:txBody>
+          <a:bodyPr/>
+          <a:lstStyle/>
+          <a:p>
+            <a:pPr marL="0" indent="0">
+              <a:buFont typeface="Arial"/>
+              <a:buNone/>
+            </a:pPr>
+            <a:endParaRPr lang="en-US" dirty="0"/>
+          </a:p>
+        </p:txBody>
+      </p:sp>
+      <p:sp>
+        <p:nvSpPr>
+          <p:cNvPr id="4" name="Slide Number Placeholder 3"/>
+          <p:cNvSpPr>
+            <a:spLocks noGrp="1"/>
+          </p:cNvSpPr>
+          <p:nvPr>
+            <p:ph type="sldNum" sz="quarter" idx="10"/>
+          </p:nvPr>
+        </p:nvSpPr>
+        <p:spPr/>
+        <p:txBody>
+          <a:bodyPr/>
+          <a:lstStyle/>
+          <a:p>
+            <a:fld id="{65102967-BEC4-0F46-A022-1564C826E33F}" type="slidenum">
+              <a:rPr lang="en-US" smtClean="0"/>
+              <a:t>13</a:t>
             </a:fld>
             <a:endParaRPr lang="en-US"/>
           </a:p>
@@ -1633,6 +1718,10 @@
           <a:bodyPr/>
           <a:lstStyle/>
           <a:p>
+            <a:pPr marL="0" indent="0">
+              <a:buFont typeface="Arial"/>
+              <a:buNone/>
+            </a:pPr>
             <a:endParaRPr lang="en-US" dirty="0"/>
           </a:p>
         </p:txBody>
@@ -1663,7 +1752,7 @@
     </p:spTree>
     <p:extLst>
       <p:ext uri="{BB962C8B-B14F-4D97-AF65-F5344CB8AC3E}">
-        <p14:creationId xmlns:p14="http://schemas.microsoft.com/office/powerpoint/2010/main" val="740614714"/>
+        <p14:creationId xmlns:p14="http://schemas.microsoft.com/office/powerpoint/2010/main" val="3991195823"/>
       </p:ext>
     </p:extLst>
   </p:cSld>
@@ -6081,6 +6170,1026 @@
         </p:nvSpPr>
         <p:spPr/>
         <p:txBody>
+          <a:bodyPr/>
+          <a:lstStyle/>
+          <a:p>
+            <a:r>
+              <a:rPr lang="en-US" dirty="0" smtClean="0"/>
+              <a:t>Coincidence Matching</a:t>
+            </a:r>
+            <a:endParaRPr lang="en-US" dirty="0"/>
+          </a:p>
+        </p:txBody>
+      </p:sp>
+      <p:sp>
+        <p:nvSpPr>
+          <p:cNvPr id="3" name="Content Placeholder 2"/>
+          <p:cNvSpPr>
+            <a:spLocks noGrp="1"/>
+          </p:cNvSpPr>
+          <p:nvPr>
+            <p:ph idx="1"/>
+          </p:nvPr>
+        </p:nvSpPr>
+        <p:spPr>
+          <a:xfrm>
+            <a:off x="976923" y="3855915"/>
+            <a:ext cx="3155461" cy="833315"/>
+          </a:xfrm>
+          <a:solidFill>
+            <a:schemeClr val="bg2">
+              <a:lumMod val="90000"/>
+            </a:schemeClr>
+          </a:solidFill>
+          <a:ln>
+            <a:solidFill>
+              <a:schemeClr val="tx1"/>
+            </a:solidFill>
+          </a:ln>
+        </p:spPr>
+        <p:txBody>
+          <a:bodyPr anchor="ctr">
+            <a:normAutofit/>
+          </a:bodyPr>
+          <a:lstStyle/>
+          <a:p>
+            <a:pPr marL="0" indent="0" algn="ctr">
+              <a:buNone/>
+            </a:pPr>
+            <a:r>
+              <a:rPr lang="en-US" dirty="0" smtClean="0"/>
+              <a:t>Corrected Observables Data Spectrum</a:t>
+            </a:r>
+          </a:p>
+        </p:txBody>
+      </p:sp>
+      <p:sp>
+        <p:nvSpPr>
+          <p:cNvPr id="4" name="Date Placeholder 3"/>
+          <p:cNvSpPr>
+            <a:spLocks noGrp="1"/>
+          </p:cNvSpPr>
+          <p:nvPr>
+            <p:ph type="dt" sz="half" idx="10"/>
+          </p:nvPr>
+        </p:nvSpPr>
+        <p:spPr/>
+        <p:txBody>
+          <a:bodyPr/>
+          <a:lstStyle/>
+          <a:p>
+            <a:r>
+              <a:rPr lang="en-US" smtClean="0"/>
+              <a:t>7/7/16</a:t>
+            </a:r>
+            <a:endParaRPr lang="en-US"/>
+          </a:p>
+        </p:txBody>
+      </p:sp>
+      <p:sp>
+        <p:nvSpPr>
+          <p:cNvPr id="5" name="Footer Placeholder 4"/>
+          <p:cNvSpPr>
+            <a:spLocks noGrp="1"/>
+          </p:cNvSpPr>
+          <p:nvPr>
+            <p:ph type="ftr" sz="quarter" idx="11"/>
+          </p:nvPr>
+        </p:nvSpPr>
+        <p:spPr/>
+        <p:txBody>
+          <a:bodyPr/>
+          <a:lstStyle/>
+          <a:p>
+            <a:r>
+              <a:rPr lang="en-US" smtClean="0"/>
+              <a:t>Matthew D. Anthony</a:t>
+            </a:r>
+            <a:endParaRPr lang="en-US"/>
+          </a:p>
+        </p:txBody>
+      </p:sp>
+      <p:sp>
+        <p:nvSpPr>
+          <p:cNvPr id="6" name="Slide Number Placeholder 5"/>
+          <p:cNvSpPr>
+            <a:spLocks noGrp="1"/>
+          </p:cNvSpPr>
+          <p:nvPr>
+            <p:ph type="sldNum" sz="quarter" idx="12"/>
+          </p:nvPr>
+        </p:nvSpPr>
+        <p:spPr/>
+        <p:txBody>
+          <a:bodyPr/>
+          <a:lstStyle/>
+          <a:p>
+            <a:fld id="{CFE4BAC9-6D41-4691-9299-18EF07EF0177}" type="slidenum">
+              <a:rPr lang="en-US" smtClean="0"/>
+              <a:t>10</a:t>
+            </a:fld>
+            <a:endParaRPr lang="en-US"/>
+          </a:p>
+        </p:txBody>
+      </p:sp>
+      <p:sp>
+        <p:nvSpPr>
+          <p:cNvPr id="12" name="Content Placeholder 2"/>
+          <p:cNvSpPr txBox="1">
+            <a:spLocks/>
+          </p:cNvSpPr>
+          <p:nvPr/>
+        </p:nvSpPr>
+        <p:spPr>
+          <a:xfrm>
+            <a:off x="4786917" y="3855915"/>
+            <a:ext cx="3341077" cy="833315"/>
+          </a:xfrm>
+          <a:prstGeom prst="rect">
+            <a:avLst/>
+          </a:prstGeom>
+          <a:solidFill>
+            <a:schemeClr val="bg2">
+              <a:lumMod val="90000"/>
+            </a:schemeClr>
+          </a:solidFill>
+          <a:ln>
+            <a:solidFill>
+              <a:schemeClr val="tx1"/>
+            </a:solidFill>
+          </a:ln>
+        </p:spPr>
+        <p:txBody>
+          <a:bodyPr vert="horz" lIns="91440" tIns="45720" rIns="91440" bIns="45720" rtlCol="0" anchor="ctr">
+            <a:normAutofit/>
+          </a:bodyPr>
+          <a:lstStyle>
+            <a:lvl1pPr marL="182880" indent="-182880" algn="l" defTabSz="914400" rtl="0" eaLnBrk="1" latinLnBrk="0" hangingPunct="1">
+              <a:spcBef>
+                <a:spcPct val="20000"/>
+              </a:spcBef>
+              <a:buClr>
+                <a:schemeClr val="accent1"/>
+              </a:buClr>
+              <a:buSzPct val="85000"/>
+              <a:buFont typeface="Arial" pitchFamily="34" charset="0"/>
+              <a:buChar char="•"/>
+              <a:defRPr sz="2000" kern="1200">
+                <a:solidFill>
+                  <a:schemeClr val="tx1"/>
+                </a:solidFill>
+                <a:latin typeface="Lucida Fax"/>
+                <a:ea typeface="+mn-ea"/>
+                <a:cs typeface="+mn-cs"/>
+              </a:defRPr>
+            </a:lvl1pPr>
+            <a:lvl2pPr marL="457200" indent="-182880" algn="l" defTabSz="914400" rtl="0" eaLnBrk="1" latinLnBrk="0" hangingPunct="1">
+              <a:spcBef>
+                <a:spcPct val="20000"/>
+              </a:spcBef>
+              <a:buClr>
+                <a:schemeClr val="accent1"/>
+              </a:buClr>
+              <a:buSzPct val="85000"/>
+              <a:buFont typeface="Arial" pitchFamily="34" charset="0"/>
+              <a:buChar char="•"/>
+              <a:defRPr sz="1800" kern="1200">
+                <a:solidFill>
+                  <a:schemeClr val="tx1"/>
+                </a:solidFill>
+                <a:latin typeface="Lucida Fax"/>
+                <a:ea typeface="+mn-ea"/>
+                <a:cs typeface="+mn-cs"/>
+              </a:defRPr>
+            </a:lvl2pPr>
+            <a:lvl3pPr marL="731520" indent="-182880" algn="l" defTabSz="914400" rtl="0" eaLnBrk="1" latinLnBrk="0" hangingPunct="1">
+              <a:spcBef>
+                <a:spcPct val="20000"/>
+              </a:spcBef>
+              <a:buClr>
+                <a:schemeClr val="accent1"/>
+              </a:buClr>
+              <a:buSzPct val="90000"/>
+              <a:buFont typeface="Arial" pitchFamily="34" charset="0"/>
+              <a:buChar char="•"/>
+              <a:defRPr sz="1600" kern="1200">
+                <a:solidFill>
+                  <a:schemeClr val="tx1"/>
+                </a:solidFill>
+                <a:latin typeface="Lucida Fax"/>
+                <a:ea typeface="+mn-ea"/>
+                <a:cs typeface="+mn-cs"/>
+              </a:defRPr>
+            </a:lvl3pPr>
+            <a:lvl4pPr marL="1005840" indent="-182880" algn="l" defTabSz="914400" rtl="0" eaLnBrk="1" latinLnBrk="0" hangingPunct="1">
+              <a:spcBef>
+                <a:spcPct val="20000"/>
+              </a:spcBef>
+              <a:buClr>
+                <a:schemeClr val="accent1"/>
+              </a:buClr>
+              <a:buFont typeface="Arial" pitchFamily="34" charset="0"/>
+              <a:buChar char="•"/>
+              <a:defRPr sz="1400" kern="1200">
+                <a:solidFill>
+                  <a:schemeClr val="tx1"/>
+                </a:solidFill>
+                <a:latin typeface="Lucida Fax"/>
+                <a:ea typeface="+mn-ea"/>
+                <a:cs typeface="+mn-cs"/>
+              </a:defRPr>
+            </a:lvl4pPr>
+            <a:lvl5pPr marL="1188720" indent="-137160" algn="l" defTabSz="914400" rtl="0" eaLnBrk="1" latinLnBrk="0" hangingPunct="1">
+              <a:spcBef>
+                <a:spcPct val="20000"/>
+              </a:spcBef>
+              <a:buClr>
+                <a:schemeClr val="accent1"/>
+              </a:buClr>
+              <a:buSzPct val="100000"/>
+              <a:buFont typeface="Arial" pitchFamily="34" charset="0"/>
+              <a:buChar char="•"/>
+              <a:defRPr sz="1200" kern="1200" baseline="0">
+                <a:solidFill>
+                  <a:schemeClr val="tx1"/>
+                </a:solidFill>
+                <a:latin typeface="Lucida Fax"/>
+                <a:ea typeface="+mn-ea"/>
+                <a:cs typeface="+mn-cs"/>
+              </a:defRPr>
+            </a:lvl5pPr>
+            <a:lvl6pPr marL="1371600" indent="-182880" algn="l" defTabSz="914400" rtl="0" eaLnBrk="1" latinLnBrk="0" hangingPunct="1">
+              <a:spcBef>
+                <a:spcPct val="20000"/>
+              </a:spcBef>
+              <a:buClr>
+                <a:schemeClr val="accent1"/>
+              </a:buClr>
+              <a:buFont typeface="Arial" pitchFamily="34" charset="0"/>
+              <a:buChar char="•"/>
+              <a:defRPr sz="1300" kern="1200">
+                <a:solidFill>
+                  <a:schemeClr val="tx1"/>
+                </a:solidFill>
+                <a:latin typeface="+mn-lt"/>
+                <a:ea typeface="+mn-ea"/>
+                <a:cs typeface="+mn-cs"/>
+              </a:defRPr>
+            </a:lvl6pPr>
+            <a:lvl7pPr marL="1554480" indent="-182880" algn="l" defTabSz="914400" rtl="0" eaLnBrk="1" latinLnBrk="0" hangingPunct="1">
+              <a:spcBef>
+                <a:spcPct val="20000"/>
+              </a:spcBef>
+              <a:buClr>
+                <a:schemeClr val="accent1"/>
+              </a:buClr>
+              <a:buFont typeface="Arial" pitchFamily="34" charset="0"/>
+              <a:buChar char="•"/>
+              <a:defRPr sz="1300" kern="1200">
+                <a:solidFill>
+                  <a:schemeClr val="tx1"/>
+                </a:solidFill>
+                <a:latin typeface="+mn-lt"/>
+                <a:ea typeface="+mn-ea"/>
+                <a:cs typeface="+mn-cs"/>
+              </a:defRPr>
+            </a:lvl7pPr>
+            <a:lvl8pPr marL="1737360" indent="-182880" algn="l" defTabSz="914400" rtl="0" eaLnBrk="1" latinLnBrk="0" hangingPunct="1">
+              <a:spcBef>
+                <a:spcPct val="20000"/>
+              </a:spcBef>
+              <a:buClr>
+                <a:schemeClr val="accent1"/>
+              </a:buClr>
+              <a:buFont typeface="Arial" pitchFamily="34" charset="0"/>
+              <a:buChar char="•"/>
+              <a:defRPr sz="1300" kern="1200">
+                <a:solidFill>
+                  <a:schemeClr val="tx1"/>
+                </a:solidFill>
+                <a:latin typeface="+mn-lt"/>
+                <a:ea typeface="+mn-ea"/>
+                <a:cs typeface="+mn-cs"/>
+              </a:defRPr>
+            </a:lvl8pPr>
+            <a:lvl9pPr marL="1920240" indent="-182880" algn="l" defTabSz="914400" rtl="0" eaLnBrk="1" latinLnBrk="0" hangingPunct="1">
+              <a:spcBef>
+                <a:spcPct val="20000"/>
+              </a:spcBef>
+              <a:buClr>
+                <a:schemeClr val="accent1"/>
+              </a:buClr>
+              <a:buFont typeface="Arial" pitchFamily="34" charset="0"/>
+              <a:buChar char="•"/>
+              <a:defRPr sz="1300" kern="1200">
+                <a:solidFill>
+                  <a:schemeClr val="tx1"/>
+                </a:solidFill>
+                <a:latin typeface="+mn-lt"/>
+                <a:ea typeface="+mn-ea"/>
+                <a:cs typeface="+mn-cs"/>
+              </a:defRPr>
+            </a:lvl9pPr>
+          </a:lstStyle>
+          <a:p>
+            <a:pPr marL="0" indent="0" algn="ctr">
+              <a:buFont typeface="Arial" pitchFamily="34" charset="0"/>
+              <a:buNone/>
+            </a:pPr>
+            <a:r>
+              <a:rPr lang="en-US" dirty="0" smtClean="0"/>
+              <a:t>MC Produced Observables Spectrum</a:t>
+            </a:r>
+          </a:p>
+        </p:txBody>
+      </p:sp>
+      <p:cxnSp>
+        <p:nvCxnSpPr>
+          <p:cNvPr id="14" name="Straight Arrow Connector 13"/>
+          <p:cNvCxnSpPr/>
+          <p:nvPr/>
+        </p:nvCxnSpPr>
+        <p:spPr>
+          <a:xfrm>
+            <a:off x="3352800" y="4806463"/>
+            <a:ext cx="779584" cy="762000"/>
+          </a:xfrm>
+          <a:prstGeom prst="straightConnector1">
+            <a:avLst/>
+          </a:prstGeom>
+          <a:ln w="38100" cmpd="sng">
+            <a:tailEnd type="arrow"/>
+          </a:ln>
+        </p:spPr>
+        <p:style>
+          <a:lnRef idx="2">
+            <a:schemeClr val="accent1"/>
+          </a:lnRef>
+          <a:fillRef idx="0">
+            <a:schemeClr val="accent1"/>
+          </a:fillRef>
+          <a:effectRef idx="1">
+            <a:schemeClr val="accent1"/>
+          </a:effectRef>
+          <a:fontRef idx="minor">
+            <a:schemeClr val="tx1"/>
+          </a:fontRef>
+        </p:style>
+      </p:cxnSp>
+      <p:cxnSp>
+        <p:nvCxnSpPr>
+          <p:cNvPr id="16" name="Straight Arrow Connector 15"/>
+          <p:cNvCxnSpPr/>
+          <p:nvPr/>
+        </p:nvCxnSpPr>
+        <p:spPr>
+          <a:xfrm flipH="1">
+            <a:off x="4689219" y="4806463"/>
+            <a:ext cx="779584" cy="762000"/>
+          </a:xfrm>
+          <a:prstGeom prst="straightConnector1">
+            <a:avLst/>
+          </a:prstGeom>
+          <a:ln w="38100" cmpd="sng">
+            <a:tailEnd type="arrow"/>
+          </a:ln>
+        </p:spPr>
+        <p:style>
+          <a:lnRef idx="2">
+            <a:schemeClr val="accent1"/>
+          </a:lnRef>
+          <a:fillRef idx="0">
+            <a:schemeClr val="accent1"/>
+          </a:fillRef>
+          <a:effectRef idx="1">
+            <a:schemeClr val="accent1"/>
+          </a:effectRef>
+          <a:fontRef idx="minor">
+            <a:schemeClr val="tx1"/>
+          </a:fontRef>
+        </p:style>
+      </p:cxnSp>
+      <p:pic>
+        <p:nvPicPr>
+          <p:cNvPr id="18" name="Picture 17"/>
+          <p:cNvPicPr>
+            <a:picLocks noChangeAspect="1"/>
+          </p:cNvPicPr>
+          <p:nvPr/>
+        </p:nvPicPr>
+        <p:blipFill>
+          <a:blip r:embed="rId3"/>
+          <a:stretch>
+            <a:fillRect/>
+          </a:stretch>
+        </p:blipFill>
+        <p:spPr>
+          <a:xfrm>
+            <a:off x="3913554" y="5705229"/>
+            <a:ext cx="1029665" cy="1029665"/>
+          </a:xfrm>
+          <a:prstGeom prst="rect">
+            <a:avLst/>
+          </a:prstGeom>
+        </p:spPr>
+      </p:pic>
+      <p:sp>
+        <p:nvSpPr>
+          <p:cNvPr id="24" name="Content Placeholder 2"/>
+          <p:cNvSpPr txBox="1">
+            <a:spLocks/>
+          </p:cNvSpPr>
+          <p:nvPr/>
+        </p:nvSpPr>
+        <p:spPr>
+          <a:xfrm>
+            <a:off x="801077" y="2217126"/>
+            <a:ext cx="3575538" cy="833315"/>
+          </a:xfrm>
+          <a:prstGeom prst="rect">
+            <a:avLst/>
+          </a:prstGeom>
+          <a:solidFill>
+            <a:schemeClr val="bg2">
+              <a:lumMod val="90000"/>
+            </a:schemeClr>
+          </a:solidFill>
+          <a:ln>
+            <a:solidFill>
+              <a:schemeClr val="tx1"/>
+            </a:solidFill>
+          </a:ln>
+        </p:spPr>
+        <p:txBody>
+          <a:bodyPr vert="horz" lIns="91440" tIns="45720" rIns="91440" bIns="45720" rtlCol="0" anchor="ctr">
+            <a:normAutofit/>
+          </a:bodyPr>
+          <a:lstStyle>
+            <a:lvl1pPr marL="182880" indent="-182880" algn="l" defTabSz="914400" rtl="0" eaLnBrk="1" latinLnBrk="0" hangingPunct="1">
+              <a:spcBef>
+                <a:spcPct val="20000"/>
+              </a:spcBef>
+              <a:buClr>
+                <a:schemeClr val="accent1"/>
+              </a:buClr>
+              <a:buSzPct val="85000"/>
+              <a:buFont typeface="Arial" pitchFamily="34" charset="0"/>
+              <a:buChar char="•"/>
+              <a:defRPr sz="2000" kern="1200">
+                <a:solidFill>
+                  <a:schemeClr val="tx1"/>
+                </a:solidFill>
+                <a:latin typeface="Lucida Fax"/>
+                <a:ea typeface="+mn-ea"/>
+                <a:cs typeface="+mn-cs"/>
+              </a:defRPr>
+            </a:lvl1pPr>
+            <a:lvl2pPr marL="457200" indent="-182880" algn="l" defTabSz="914400" rtl="0" eaLnBrk="1" latinLnBrk="0" hangingPunct="1">
+              <a:spcBef>
+                <a:spcPct val="20000"/>
+              </a:spcBef>
+              <a:buClr>
+                <a:schemeClr val="accent1"/>
+              </a:buClr>
+              <a:buSzPct val="85000"/>
+              <a:buFont typeface="Arial" pitchFamily="34" charset="0"/>
+              <a:buChar char="•"/>
+              <a:defRPr sz="1800" kern="1200">
+                <a:solidFill>
+                  <a:schemeClr val="tx1"/>
+                </a:solidFill>
+                <a:latin typeface="Lucida Fax"/>
+                <a:ea typeface="+mn-ea"/>
+                <a:cs typeface="+mn-cs"/>
+              </a:defRPr>
+            </a:lvl2pPr>
+            <a:lvl3pPr marL="731520" indent="-182880" algn="l" defTabSz="914400" rtl="0" eaLnBrk="1" latinLnBrk="0" hangingPunct="1">
+              <a:spcBef>
+                <a:spcPct val="20000"/>
+              </a:spcBef>
+              <a:buClr>
+                <a:schemeClr val="accent1"/>
+              </a:buClr>
+              <a:buSzPct val="90000"/>
+              <a:buFont typeface="Arial" pitchFamily="34" charset="0"/>
+              <a:buChar char="•"/>
+              <a:defRPr sz="1600" kern="1200">
+                <a:solidFill>
+                  <a:schemeClr val="tx1"/>
+                </a:solidFill>
+                <a:latin typeface="Lucida Fax"/>
+                <a:ea typeface="+mn-ea"/>
+                <a:cs typeface="+mn-cs"/>
+              </a:defRPr>
+            </a:lvl3pPr>
+            <a:lvl4pPr marL="1005840" indent="-182880" algn="l" defTabSz="914400" rtl="0" eaLnBrk="1" latinLnBrk="0" hangingPunct="1">
+              <a:spcBef>
+                <a:spcPct val="20000"/>
+              </a:spcBef>
+              <a:buClr>
+                <a:schemeClr val="accent1"/>
+              </a:buClr>
+              <a:buFont typeface="Arial" pitchFamily="34" charset="0"/>
+              <a:buChar char="•"/>
+              <a:defRPr sz="1400" kern="1200">
+                <a:solidFill>
+                  <a:schemeClr val="tx1"/>
+                </a:solidFill>
+                <a:latin typeface="Lucida Fax"/>
+                <a:ea typeface="+mn-ea"/>
+                <a:cs typeface="+mn-cs"/>
+              </a:defRPr>
+            </a:lvl4pPr>
+            <a:lvl5pPr marL="1188720" indent="-137160" algn="l" defTabSz="914400" rtl="0" eaLnBrk="1" latinLnBrk="0" hangingPunct="1">
+              <a:spcBef>
+                <a:spcPct val="20000"/>
+              </a:spcBef>
+              <a:buClr>
+                <a:schemeClr val="accent1"/>
+              </a:buClr>
+              <a:buSzPct val="100000"/>
+              <a:buFont typeface="Arial" pitchFamily="34" charset="0"/>
+              <a:buChar char="•"/>
+              <a:defRPr sz="1200" kern="1200" baseline="0">
+                <a:solidFill>
+                  <a:schemeClr val="tx1"/>
+                </a:solidFill>
+                <a:latin typeface="Lucida Fax"/>
+                <a:ea typeface="+mn-ea"/>
+                <a:cs typeface="+mn-cs"/>
+              </a:defRPr>
+            </a:lvl5pPr>
+            <a:lvl6pPr marL="1371600" indent="-182880" algn="l" defTabSz="914400" rtl="0" eaLnBrk="1" latinLnBrk="0" hangingPunct="1">
+              <a:spcBef>
+                <a:spcPct val="20000"/>
+              </a:spcBef>
+              <a:buClr>
+                <a:schemeClr val="accent1"/>
+              </a:buClr>
+              <a:buFont typeface="Arial" pitchFamily="34" charset="0"/>
+              <a:buChar char="•"/>
+              <a:defRPr sz="1300" kern="1200">
+                <a:solidFill>
+                  <a:schemeClr val="tx1"/>
+                </a:solidFill>
+                <a:latin typeface="+mn-lt"/>
+                <a:ea typeface="+mn-ea"/>
+                <a:cs typeface="+mn-cs"/>
+              </a:defRPr>
+            </a:lvl6pPr>
+            <a:lvl7pPr marL="1554480" indent="-182880" algn="l" defTabSz="914400" rtl="0" eaLnBrk="1" latinLnBrk="0" hangingPunct="1">
+              <a:spcBef>
+                <a:spcPct val="20000"/>
+              </a:spcBef>
+              <a:buClr>
+                <a:schemeClr val="accent1"/>
+              </a:buClr>
+              <a:buFont typeface="Arial" pitchFamily="34" charset="0"/>
+              <a:buChar char="•"/>
+              <a:defRPr sz="1300" kern="1200">
+                <a:solidFill>
+                  <a:schemeClr val="tx1"/>
+                </a:solidFill>
+                <a:latin typeface="+mn-lt"/>
+                <a:ea typeface="+mn-ea"/>
+                <a:cs typeface="+mn-cs"/>
+              </a:defRPr>
+            </a:lvl7pPr>
+            <a:lvl8pPr marL="1737360" indent="-182880" algn="l" defTabSz="914400" rtl="0" eaLnBrk="1" latinLnBrk="0" hangingPunct="1">
+              <a:spcBef>
+                <a:spcPct val="20000"/>
+              </a:spcBef>
+              <a:buClr>
+                <a:schemeClr val="accent1"/>
+              </a:buClr>
+              <a:buFont typeface="Arial" pitchFamily="34" charset="0"/>
+              <a:buChar char="•"/>
+              <a:defRPr sz="1300" kern="1200">
+                <a:solidFill>
+                  <a:schemeClr val="tx1"/>
+                </a:solidFill>
+                <a:latin typeface="+mn-lt"/>
+                <a:ea typeface="+mn-ea"/>
+                <a:cs typeface="+mn-cs"/>
+              </a:defRPr>
+            </a:lvl8pPr>
+            <a:lvl9pPr marL="1920240" indent="-182880" algn="l" defTabSz="914400" rtl="0" eaLnBrk="1" latinLnBrk="0" hangingPunct="1">
+              <a:spcBef>
+                <a:spcPct val="20000"/>
+              </a:spcBef>
+              <a:buClr>
+                <a:schemeClr val="accent1"/>
+              </a:buClr>
+              <a:buFont typeface="Arial" pitchFamily="34" charset="0"/>
+              <a:buChar char="•"/>
+              <a:defRPr sz="1300" kern="1200">
+                <a:solidFill>
+                  <a:schemeClr val="tx1"/>
+                </a:solidFill>
+                <a:latin typeface="+mn-lt"/>
+                <a:ea typeface="+mn-ea"/>
+                <a:cs typeface="+mn-cs"/>
+              </a:defRPr>
+            </a:lvl9pPr>
+          </a:lstStyle>
+          <a:p>
+            <a:pPr marL="0" indent="0" algn="ctr">
+              <a:buFont typeface="Arial" pitchFamily="34" charset="0"/>
+              <a:buNone/>
+            </a:pPr>
+            <a:r>
+              <a:rPr lang="en-US" dirty="0" smtClean="0"/>
+              <a:t>Uncorrected Observables Data Spectrum</a:t>
+            </a:r>
+          </a:p>
+        </p:txBody>
+      </p:sp>
+      <p:cxnSp>
+        <p:nvCxnSpPr>
+          <p:cNvPr id="25" name="Straight Arrow Connector 24"/>
+          <p:cNvCxnSpPr/>
+          <p:nvPr/>
+        </p:nvCxnSpPr>
+        <p:spPr>
+          <a:xfrm>
+            <a:off x="2573216" y="3145694"/>
+            <a:ext cx="0" cy="651607"/>
+          </a:xfrm>
+          <a:prstGeom prst="straightConnector1">
+            <a:avLst/>
+          </a:prstGeom>
+          <a:ln w="38100" cmpd="sng">
+            <a:tailEnd type="arrow"/>
+          </a:ln>
+        </p:spPr>
+        <p:style>
+          <a:lnRef idx="2">
+            <a:schemeClr val="accent1"/>
+          </a:lnRef>
+          <a:fillRef idx="0">
+            <a:schemeClr val="accent1"/>
+          </a:fillRef>
+          <a:effectRef idx="1">
+            <a:schemeClr val="accent1"/>
+          </a:effectRef>
+          <a:fontRef idx="minor">
+            <a:schemeClr val="tx1"/>
+          </a:fontRef>
+        </p:style>
+      </p:cxnSp>
+      <p:sp>
+        <p:nvSpPr>
+          <p:cNvPr id="29" name="Content Placeholder 2"/>
+          <p:cNvSpPr txBox="1">
+            <a:spLocks/>
+          </p:cNvSpPr>
+          <p:nvPr/>
+        </p:nvSpPr>
+        <p:spPr>
+          <a:xfrm>
+            <a:off x="4669681" y="2217126"/>
+            <a:ext cx="3575538" cy="833315"/>
+          </a:xfrm>
+          <a:prstGeom prst="rect">
+            <a:avLst/>
+          </a:prstGeom>
+          <a:solidFill>
+            <a:schemeClr val="bg2">
+              <a:lumMod val="90000"/>
+            </a:schemeClr>
+          </a:solidFill>
+          <a:ln>
+            <a:solidFill>
+              <a:schemeClr val="tx1"/>
+            </a:solidFill>
+          </a:ln>
+        </p:spPr>
+        <p:txBody>
+          <a:bodyPr vert="horz" lIns="91440" tIns="45720" rIns="91440" bIns="45720" rtlCol="0" anchor="ctr">
+            <a:normAutofit/>
+          </a:bodyPr>
+          <a:lstStyle>
+            <a:lvl1pPr marL="182880" indent="-182880" algn="l" defTabSz="914400" rtl="0" eaLnBrk="1" latinLnBrk="0" hangingPunct="1">
+              <a:spcBef>
+                <a:spcPct val="20000"/>
+              </a:spcBef>
+              <a:buClr>
+                <a:schemeClr val="accent1"/>
+              </a:buClr>
+              <a:buSzPct val="85000"/>
+              <a:buFont typeface="Arial" pitchFamily="34" charset="0"/>
+              <a:buChar char="•"/>
+              <a:defRPr sz="2000" kern="1200">
+                <a:solidFill>
+                  <a:schemeClr val="tx1"/>
+                </a:solidFill>
+                <a:latin typeface="Lucida Fax"/>
+                <a:ea typeface="+mn-ea"/>
+                <a:cs typeface="+mn-cs"/>
+              </a:defRPr>
+            </a:lvl1pPr>
+            <a:lvl2pPr marL="457200" indent="-182880" algn="l" defTabSz="914400" rtl="0" eaLnBrk="1" latinLnBrk="0" hangingPunct="1">
+              <a:spcBef>
+                <a:spcPct val="20000"/>
+              </a:spcBef>
+              <a:buClr>
+                <a:schemeClr val="accent1"/>
+              </a:buClr>
+              <a:buSzPct val="85000"/>
+              <a:buFont typeface="Arial" pitchFamily="34" charset="0"/>
+              <a:buChar char="•"/>
+              <a:defRPr sz="1800" kern="1200">
+                <a:solidFill>
+                  <a:schemeClr val="tx1"/>
+                </a:solidFill>
+                <a:latin typeface="Lucida Fax"/>
+                <a:ea typeface="+mn-ea"/>
+                <a:cs typeface="+mn-cs"/>
+              </a:defRPr>
+            </a:lvl2pPr>
+            <a:lvl3pPr marL="731520" indent="-182880" algn="l" defTabSz="914400" rtl="0" eaLnBrk="1" latinLnBrk="0" hangingPunct="1">
+              <a:spcBef>
+                <a:spcPct val="20000"/>
+              </a:spcBef>
+              <a:buClr>
+                <a:schemeClr val="accent1"/>
+              </a:buClr>
+              <a:buSzPct val="90000"/>
+              <a:buFont typeface="Arial" pitchFamily="34" charset="0"/>
+              <a:buChar char="•"/>
+              <a:defRPr sz="1600" kern="1200">
+                <a:solidFill>
+                  <a:schemeClr val="tx1"/>
+                </a:solidFill>
+                <a:latin typeface="Lucida Fax"/>
+                <a:ea typeface="+mn-ea"/>
+                <a:cs typeface="+mn-cs"/>
+              </a:defRPr>
+            </a:lvl3pPr>
+            <a:lvl4pPr marL="1005840" indent="-182880" algn="l" defTabSz="914400" rtl="0" eaLnBrk="1" latinLnBrk="0" hangingPunct="1">
+              <a:spcBef>
+                <a:spcPct val="20000"/>
+              </a:spcBef>
+              <a:buClr>
+                <a:schemeClr val="accent1"/>
+              </a:buClr>
+              <a:buFont typeface="Arial" pitchFamily="34" charset="0"/>
+              <a:buChar char="•"/>
+              <a:defRPr sz="1400" kern="1200">
+                <a:solidFill>
+                  <a:schemeClr val="tx1"/>
+                </a:solidFill>
+                <a:latin typeface="Lucida Fax"/>
+                <a:ea typeface="+mn-ea"/>
+                <a:cs typeface="+mn-cs"/>
+              </a:defRPr>
+            </a:lvl4pPr>
+            <a:lvl5pPr marL="1188720" indent="-137160" algn="l" defTabSz="914400" rtl="0" eaLnBrk="1" latinLnBrk="0" hangingPunct="1">
+              <a:spcBef>
+                <a:spcPct val="20000"/>
+              </a:spcBef>
+              <a:buClr>
+                <a:schemeClr val="accent1"/>
+              </a:buClr>
+              <a:buSzPct val="100000"/>
+              <a:buFont typeface="Arial" pitchFamily="34" charset="0"/>
+              <a:buChar char="•"/>
+              <a:defRPr sz="1200" kern="1200" baseline="0">
+                <a:solidFill>
+                  <a:schemeClr val="tx1"/>
+                </a:solidFill>
+                <a:latin typeface="Lucida Fax"/>
+                <a:ea typeface="+mn-ea"/>
+                <a:cs typeface="+mn-cs"/>
+              </a:defRPr>
+            </a:lvl5pPr>
+            <a:lvl6pPr marL="1371600" indent="-182880" algn="l" defTabSz="914400" rtl="0" eaLnBrk="1" latinLnBrk="0" hangingPunct="1">
+              <a:spcBef>
+                <a:spcPct val="20000"/>
+              </a:spcBef>
+              <a:buClr>
+                <a:schemeClr val="accent1"/>
+              </a:buClr>
+              <a:buFont typeface="Arial" pitchFamily="34" charset="0"/>
+              <a:buChar char="•"/>
+              <a:defRPr sz="1300" kern="1200">
+                <a:solidFill>
+                  <a:schemeClr val="tx1"/>
+                </a:solidFill>
+                <a:latin typeface="+mn-lt"/>
+                <a:ea typeface="+mn-ea"/>
+                <a:cs typeface="+mn-cs"/>
+              </a:defRPr>
+            </a:lvl6pPr>
+            <a:lvl7pPr marL="1554480" indent="-182880" algn="l" defTabSz="914400" rtl="0" eaLnBrk="1" latinLnBrk="0" hangingPunct="1">
+              <a:spcBef>
+                <a:spcPct val="20000"/>
+              </a:spcBef>
+              <a:buClr>
+                <a:schemeClr val="accent1"/>
+              </a:buClr>
+              <a:buFont typeface="Arial" pitchFamily="34" charset="0"/>
+              <a:buChar char="•"/>
+              <a:defRPr sz="1300" kern="1200">
+                <a:solidFill>
+                  <a:schemeClr val="tx1"/>
+                </a:solidFill>
+                <a:latin typeface="+mn-lt"/>
+                <a:ea typeface="+mn-ea"/>
+                <a:cs typeface="+mn-cs"/>
+              </a:defRPr>
+            </a:lvl7pPr>
+            <a:lvl8pPr marL="1737360" indent="-182880" algn="l" defTabSz="914400" rtl="0" eaLnBrk="1" latinLnBrk="0" hangingPunct="1">
+              <a:spcBef>
+                <a:spcPct val="20000"/>
+              </a:spcBef>
+              <a:buClr>
+                <a:schemeClr val="accent1"/>
+              </a:buClr>
+              <a:buFont typeface="Arial" pitchFamily="34" charset="0"/>
+              <a:buChar char="•"/>
+              <a:defRPr sz="1300" kern="1200">
+                <a:solidFill>
+                  <a:schemeClr val="tx1"/>
+                </a:solidFill>
+                <a:latin typeface="+mn-lt"/>
+                <a:ea typeface="+mn-ea"/>
+                <a:cs typeface="+mn-cs"/>
+              </a:defRPr>
+            </a:lvl8pPr>
+            <a:lvl9pPr marL="1920240" indent="-182880" algn="l" defTabSz="914400" rtl="0" eaLnBrk="1" latinLnBrk="0" hangingPunct="1">
+              <a:spcBef>
+                <a:spcPct val="20000"/>
+              </a:spcBef>
+              <a:buClr>
+                <a:schemeClr val="accent1"/>
+              </a:buClr>
+              <a:buFont typeface="Arial" pitchFamily="34" charset="0"/>
+              <a:buChar char="•"/>
+              <a:defRPr sz="1300" kern="1200">
+                <a:solidFill>
+                  <a:schemeClr val="tx1"/>
+                </a:solidFill>
+                <a:latin typeface="+mn-lt"/>
+                <a:ea typeface="+mn-ea"/>
+                <a:cs typeface="+mn-cs"/>
+              </a:defRPr>
+            </a:lvl9pPr>
+          </a:lstStyle>
+          <a:p>
+            <a:pPr marL="0" indent="0" algn="ctr">
+              <a:buFont typeface="Arial" pitchFamily="34" charset="0"/>
+              <a:buNone/>
+            </a:pPr>
+            <a:r>
+              <a:rPr lang="en-US" dirty="0" smtClean="0"/>
+              <a:t>Energy Spectrum from Geant4</a:t>
+            </a:r>
+          </a:p>
+        </p:txBody>
+      </p:sp>
+      <p:cxnSp>
+        <p:nvCxnSpPr>
+          <p:cNvPr id="30" name="Straight Arrow Connector 29"/>
+          <p:cNvCxnSpPr/>
+          <p:nvPr/>
+        </p:nvCxnSpPr>
+        <p:spPr>
+          <a:xfrm>
+            <a:off x="6441820" y="3145694"/>
+            <a:ext cx="0" cy="651607"/>
+          </a:xfrm>
+          <a:prstGeom prst="straightConnector1">
+            <a:avLst/>
+          </a:prstGeom>
+          <a:ln w="38100" cmpd="sng">
+            <a:tailEnd type="arrow"/>
+          </a:ln>
+        </p:spPr>
+        <p:style>
+          <a:lnRef idx="2">
+            <a:schemeClr val="accent1"/>
+          </a:lnRef>
+          <a:fillRef idx="0">
+            <a:schemeClr val="accent1"/>
+          </a:fillRef>
+          <a:effectRef idx="1">
+            <a:schemeClr val="accent1"/>
+          </a:effectRef>
+          <a:fontRef idx="minor">
+            <a:schemeClr val="tx1"/>
+          </a:fontRef>
+        </p:style>
+      </p:cxnSp>
+      <p:sp>
+        <p:nvSpPr>
+          <p:cNvPr id="7" name="Donut 6"/>
+          <p:cNvSpPr/>
+          <p:nvPr/>
+        </p:nvSpPr>
+        <p:spPr>
+          <a:xfrm>
+            <a:off x="6158512" y="2972290"/>
+            <a:ext cx="566615" cy="1013558"/>
+          </a:xfrm>
+          <a:prstGeom prst="donut">
+            <a:avLst>
+              <a:gd name="adj" fmla="val 0"/>
+            </a:avLst>
+          </a:prstGeom>
+          <a:solidFill>
+            <a:srgbClr val="FF0000"/>
+          </a:solidFill>
+          <a:ln>
+            <a:solidFill>
+              <a:srgbClr val="FF0000"/>
+            </a:solidFill>
+          </a:ln>
+        </p:spPr>
+        <p:style>
+          <a:lnRef idx="1">
+            <a:schemeClr val="accent1"/>
+          </a:lnRef>
+          <a:fillRef idx="3">
+            <a:schemeClr val="accent1"/>
+          </a:fillRef>
+          <a:effectRef idx="2">
+            <a:schemeClr val="accent1"/>
+          </a:effectRef>
+          <a:fontRef idx="minor">
+            <a:schemeClr val="lt1"/>
+          </a:fontRef>
+        </p:style>
+        <p:txBody>
+          <a:bodyPr rtlCol="0" anchor="ctr"/>
+          <a:lstStyle/>
+          <a:p>
+            <a:pPr algn="ctr"/>
+            <a:endParaRPr lang="en-US">
+              <a:solidFill>
+                <a:schemeClr val="tx1"/>
+              </a:solidFill>
+            </a:endParaRPr>
+          </a:p>
+        </p:txBody>
+      </p:sp>
+    </p:spTree>
+    <p:extLst>
+      <p:ext uri="{BB962C8B-B14F-4D97-AF65-F5344CB8AC3E}">
+        <p14:creationId xmlns:p14="http://schemas.microsoft.com/office/powerpoint/2010/main" val="1779980456"/>
+      </p:ext>
+    </p:extLst>
+  </p:cSld>
+  <p:clrMapOvr>
+    <a:masterClrMapping/>
+  </p:clrMapOvr>
+  <mc:AlternateContent xmlns:mc="http://schemas.openxmlformats.org/markup-compatibility/2006" xmlns:p14="http://schemas.microsoft.com/office/powerpoint/2010/main">
+    <mc:Choice Requires="p14">
+      <p:transition spd="slow" p14:dur="2000" advTm="34259"/>
+    </mc:Choice>
+    <mc:Fallback xmlns="">
+      <p:transition xmlns:p14="http://schemas.microsoft.com/office/powerpoint/2010/main" spd="slow" advTm="34259"/>
+    </mc:Fallback>
+  </mc:AlternateContent>
+  <p:timing>
+    <p:tnLst>
+      <p:par>
+        <p:cTn xmlns:p14="http://schemas.microsoft.com/office/powerpoint/2010/main" id="1" dur="indefinite" restart="never" nodeType="tmRoot"/>
+      </p:par>
+    </p:tnLst>
+  </p:timing>
+</p:sld>
+</file>
+
+<file path=ppt/slides/slide11.xml><?xml version="1.0" encoding="utf-8"?>
+<p:sld xmlns:a="http://schemas.openxmlformats.org/drawingml/2006/main" xmlns:r="http://schemas.openxmlformats.org/officeDocument/2006/relationships" xmlns:p="http://schemas.openxmlformats.org/presentationml/2006/main">
+  <p:cSld>
+    <p:spTree>
+      <p:nvGrpSpPr>
+        <p:cNvPr id="1" name=""/>
+        <p:cNvGrpSpPr/>
+        <p:nvPr/>
+      </p:nvGrpSpPr>
+      <p:grpSpPr>
+        <a:xfrm>
+          <a:off x="0" y="0"/>
+          <a:ext cx="0" cy="0"/>
+          <a:chOff x="0" y="0"/>
+          <a:chExt cx="0" cy="0"/>
+        </a:xfrm>
+      </p:grpSpPr>
+      <p:sp>
+        <p:nvSpPr>
+          <p:cNvPr id="2" name="Title 1"/>
+          <p:cNvSpPr>
+            <a:spLocks noGrp="1"/>
+          </p:cNvSpPr>
+          <p:nvPr>
+            <p:ph type="title"/>
+          </p:nvPr>
+        </p:nvSpPr>
+        <p:spPr/>
+        <p:txBody>
           <a:bodyPr>
             <a:normAutofit fontScale="90000"/>
           </a:bodyPr>
@@ -6199,7 +7308,7 @@
           <a:p>
             <a:fld id="{CFE4BAC9-6D41-4691-9299-18EF07EF0177}" type="slidenum">
               <a:rPr lang="en-US" smtClean="0"/>
-              <a:t>10</a:t>
+              <a:t>11</a:t>
             </a:fld>
             <a:endParaRPr lang="en-US"/>
           </a:p>
@@ -7977,7 +9086,7 @@
 </p:sld>
 </file>
 
-<file path=ppt/slides/slide11.xml><?xml version="1.0" encoding="utf-8"?>
+<file path=ppt/slides/slide12.xml><?xml version="1.0" encoding="utf-8"?>
 <p:sld xmlns:a="http://schemas.openxmlformats.org/drawingml/2006/main" xmlns:r="http://schemas.openxmlformats.org/officeDocument/2006/relationships" xmlns:p="http://schemas.openxmlformats.org/presentationml/2006/main">
   <p:cSld>
     <p:spTree>
@@ -8114,7 +9223,7 @@
           <a:p>
             <a:fld id="{CFE4BAC9-6D41-4691-9299-18EF07EF0177}" type="slidenum">
               <a:rPr lang="en-US" smtClean="0"/>
-              <a:t>11</a:t>
+              <a:t>12</a:t>
             </a:fld>
             <a:endParaRPr lang="en-US"/>
           </a:p>
@@ -8232,7 +9341,7 @@
           <a:graphicData uri="http://schemas.openxmlformats.org/presentationml/2006/ole">
             <mc:AlternateContent xmlns:mc="http://schemas.openxmlformats.org/markup-compatibility/2006">
               <mc:Choice xmlns:v="urn:schemas-microsoft-com:vml" Requires="v">
-                <p:oleObj spid="_x0000_s1027" name="Equation" r:id="rId7" imgW="1308100" imgH="546100" progId="Equation.3">
+                <p:oleObj spid="_x0000_s1032" name="Equation" r:id="rId7" imgW="1308100" imgH="546100" progId="Equation.3">
                   <p:embed/>
                 </p:oleObj>
               </mc:Choice>
@@ -8289,7 +9398,7 @@
           <a:graphicData uri="http://schemas.openxmlformats.org/presentationml/2006/ole">
             <mc:AlternateContent xmlns:mc="http://schemas.openxmlformats.org/markup-compatibility/2006">
               <mc:Choice xmlns:v="urn:schemas-microsoft-com:vml" Requires="v">
-                <p:oleObj spid="_x0000_s1028" name="Equation" r:id="rId9" imgW="1181100" imgH="482600" progId="Equation.3">
+                <p:oleObj spid="_x0000_s1033" name="Equation" r:id="rId9" imgW="1181100" imgH="482600" progId="Equation.3">
                   <p:embed/>
                 </p:oleObj>
               </mc:Choice>
@@ -8418,7 +9527,7 @@
 </p:sld>
 </file>
 
-<file path=ppt/slides/slide12.xml><?xml version="1.0" encoding="utf-8"?>
+<file path=ppt/slides/slide13.xml><?xml version="1.0" encoding="utf-8"?>
 <p:sld xmlns:a="http://schemas.openxmlformats.org/drawingml/2006/main" xmlns:r="http://schemas.openxmlformats.org/officeDocument/2006/relationships" xmlns:p="http://schemas.openxmlformats.org/presentationml/2006/main">
   <p:cSld>
     <p:spTree>
@@ -8519,7 +9628,6 @@
               <a:rPr lang="en-US" dirty="0" smtClean="0"/>
               <a:t>Gas gain agrees nicely with g2 found in anti-correlation analysis.</a:t>
             </a:r>
-            <a:endParaRPr lang="en-US" dirty="0" smtClean="0"/>
           </a:p>
         </p:txBody>
       </p:sp>
@@ -8586,7 +9694,7 @@
           <a:p>
             <a:fld id="{CFE4BAC9-6D41-4691-9299-18EF07EF0177}" type="slidenum">
               <a:rPr lang="en-US" smtClean="0"/>
-              <a:t>12</a:t>
+              <a:t>13</a:t>
             </a:fld>
             <a:endParaRPr lang="en-US"/>
           </a:p>
@@ -14088,7 +15196,7 @@
           <a:p>
             <a:r>
               <a:rPr lang="en-US" sz="3200" dirty="0" smtClean="0"/>
-              <a:t>Position Reconstruction</a:t>
+              <a:t>PMT Gain</a:t>
             </a:r>
             <a:endParaRPr lang="en-US" sz="3200" dirty="0"/>
           </a:p>
@@ -14121,8 +15229,13 @@
             </a:pPr>
             <a:r>
               <a:rPr lang="en-US" dirty="0" smtClean="0"/>
-              <a:t>Calibrations: None (but potentially background)</a:t>
-            </a:r>
+              <a:t>Calibrations: </a:t>
+            </a:r>
+            <a:r>
+              <a:rPr lang="en-US" dirty="0" smtClean="0"/>
+              <a:t>LED at high and low voltages</a:t>
+            </a:r>
+            <a:endParaRPr lang="en-US" dirty="0" smtClean="0"/>
           </a:p>
           <a:p>
             <a:pPr marL="0" indent="0">
@@ -14136,7 +15249,208 @@
             </a:pPr>
             <a:r>
               <a:rPr lang="en-US" dirty="0" smtClean="0"/>
-              <a:t>Use neural network trained on Geant4 optical simulation data.</a:t>
+              <a:t>Use a combination of SPE and MPE spectra to track the gain of the PMTs in time.</a:t>
+            </a:r>
+          </a:p>
+        </p:txBody>
+      </p:sp>
+      <p:sp>
+        <p:nvSpPr>
+          <p:cNvPr id="4" name="Date Placeholder 3"/>
+          <p:cNvSpPr>
+            <a:spLocks noGrp="1"/>
+          </p:cNvSpPr>
+          <p:nvPr>
+            <p:ph type="dt" sz="half" idx="10"/>
+          </p:nvPr>
+        </p:nvSpPr>
+        <p:spPr/>
+        <p:txBody>
+          <a:bodyPr/>
+          <a:lstStyle/>
+          <a:p>
+            <a:r>
+              <a:rPr lang="en-US" smtClean="0"/>
+              <a:t>7/7/16</a:t>
+            </a:r>
+            <a:endParaRPr lang="en-US" dirty="0"/>
+          </a:p>
+        </p:txBody>
+      </p:sp>
+      <p:sp>
+        <p:nvSpPr>
+          <p:cNvPr id="5" name="Footer Placeholder 4"/>
+          <p:cNvSpPr>
+            <a:spLocks noGrp="1"/>
+          </p:cNvSpPr>
+          <p:nvPr>
+            <p:ph type="ftr" sz="quarter" idx="11"/>
+          </p:nvPr>
+        </p:nvSpPr>
+        <p:spPr/>
+        <p:txBody>
+          <a:bodyPr/>
+          <a:lstStyle/>
+          <a:p>
+            <a:r>
+              <a:rPr lang="en-US" smtClean="0"/>
+              <a:t>Matthew D. Anthony</a:t>
+            </a:r>
+            <a:endParaRPr lang="en-US"/>
+          </a:p>
+        </p:txBody>
+      </p:sp>
+      <p:sp>
+        <p:nvSpPr>
+          <p:cNvPr id="6" name="Slide Number Placeholder 5"/>
+          <p:cNvSpPr>
+            <a:spLocks noGrp="1"/>
+          </p:cNvSpPr>
+          <p:nvPr>
+            <p:ph type="sldNum" sz="quarter" idx="12"/>
+          </p:nvPr>
+        </p:nvSpPr>
+        <p:spPr/>
+        <p:txBody>
+          <a:bodyPr/>
+          <a:lstStyle/>
+          <a:p>
+            <a:fld id="{CFE4BAC9-6D41-4691-9299-18EF07EF0177}" type="slidenum">
+              <a:rPr lang="en-US" smtClean="0"/>
+              <a:t>6</a:t>
+            </a:fld>
+            <a:endParaRPr lang="en-US"/>
+          </a:p>
+        </p:txBody>
+      </p:sp>
+      <p:pic>
+        <p:nvPicPr>
+          <p:cNvPr id="11" name="Picture 10" descr="run_16_ch17.png"/>
+          <p:cNvPicPr>
+            <a:picLocks noChangeAspect="1"/>
+          </p:cNvPicPr>
+          <p:nvPr/>
+        </p:nvPicPr>
+        <p:blipFill>
+          <a:blip r:embed="rId3">
+            <a:extLst>
+              <a:ext uri="{28A0092B-C50C-407E-A947-70E740481C1C}">
+                <a14:useLocalDpi xmlns:a14="http://schemas.microsoft.com/office/drawing/2010/main" val="0"/>
+              </a:ext>
+            </a:extLst>
+          </a:blip>
+          <a:stretch>
+            <a:fillRect/>
+          </a:stretch>
+        </p:blipFill>
+        <p:spPr>
+          <a:xfrm>
+            <a:off x="0" y="3477852"/>
+            <a:ext cx="9144000" cy="3048000"/>
+          </a:xfrm>
+          <a:prstGeom prst="rect">
+            <a:avLst/>
+          </a:prstGeom>
+        </p:spPr>
+      </p:pic>
+    </p:spTree>
+    <p:extLst>
+      <p:ext uri="{BB962C8B-B14F-4D97-AF65-F5344CB8AC3E}">
+        <p14:creationId xmlns:p14="http://schemas.microsoft.com/office/powerpoint/2010/main" val="2016042938"/>
+      </p:ext>
+    </p:extLst>
+  </p:cSld>
+  <p:clrMapOvr>
+    <a:masterClrMapping/>
+  </p:clrMapOvr>
+  <mc:AlternateContent xmlns:mc="http://schemas.openxmlformats.org/markup-compatibility/2006" xmlns:p14="http://schemas.microsoft.com/office/powerpoint/2010/main">
+    <mc:Choice Requires="p14">
+      <p:transition spd="slow" p14:dur="2000" advTm="9161"/>
+    </mc:Choice>
+    <mc:Fallback xmlns="">
+      <p:transition xmlns:p14="http://schemas.microsoft.com/office/powerpoint/2010/main" spd="slow" advTm="9161"/>
+    </mc:Fallback>
+  </mc:AlternateContent>
+  <p:timing>
+    <p:tnLst>
+      <p:par>
+        <p:cTn xmlns:p14="http://schemas.microsoft.com/office/powerpoint/2010/main" id="1" dur="indefinite" restart="never" nodeType="tmRoot"/>
+      </p:par>
+    </p:tnLst>
+  </p:timing>
+</p:sld>
+</file>
+
+<file path=ppt/slides/slide7.xml><?xml version="1.0" encoding="utf-8"?>
+<p:sld xmlns:a="http://schemas.openxmlformats.org/drawingml/2006/main" xmlns:r="http://schemas.openxmlformats.org/officeDocument/2006/relationships" xmlns:p="http://schemas.openxmlformats.org/presentationml/2006/main">
+  <p:cSld>
+    <p:spTree>
+      <p:nvGrpSpPr>
+        <p:cNvPr id="1" name=""/>
+        <p:cNvGrpSpPr/>
+        <p:nvPr/>
+      </p:nvGrpSpPr>
+      <p:grpSpPr>
+        <a:xfrm>
+          <a:off x="0" y="0"/>
+          <a:ext cx="0" cy="0"/>
+          <a:chOff x="0" y="0"/>
+          <a:chExt cx="0" cy="0"/>
+        </a:xfrm>
+      </p:grpSpPr>
+      <p:sp>
+        <p:nvSpPr>
+          <p:cNvPr id="2" name="Title 1"/>
+          <p:cNvSpPr>
+            <a:spLocks noGrp="1"/>
+          </p:cNvSpPr>
+          <p:nvPr>
+            <p:ph type="title"/>
+          </p:nvPr>
+        </p:nvSpPr>
+        <p:spPr/>
+        <p:txBody>
+          <a:bodyPr>
+            <a:noAutofit/>
+          </a:bodyPr>
+          <a:lstStyle/>
+          <a:p>
+            <a:r>
+              <a:rPr lang="en-US" sz="3200" dirty="0" smtClean="0"/>
+              <a:t>Position Reconstruction</a:t>
+            </a:r>
+            <a:endParaRPr lang="en-US" sz="3200" dirty="0"/>
+          </a:p>
+        </p:txBody>
+      </p:sp>
+      <p:sp>
+        <p:nvSpPr>
+          <p:cNvPr id="7" name="Content Placeholder 6"/>
+          <p:cNvSpPr>
+            <a:spLocks noGrp="1"/>
+          </p:cNvSpPr>
+          <p:nvPr>
+            <p:ph idx="1"/>
+          </p:nvPr>
+        </p:nvSpPr>
+        <p:spPr>
+          <a:xfrm>
+            <a:off x="457200" y="1309914"/>
+            <a:ext cx="8229600" cy="2246085"/>
+          </a:xfrm>
+        </p:spPr>
+        <p:txBody>
+          <a:bodyPr>
+            <a:normAutofit/>
+          </a:bodyPr>
+          <a:lstStyle/>
+          <a:p>
+            <a:pPr marL="0" indent="0">
+              <a:buNone/>
+            </a:pPr>
+            <a:r>
+              <a:rPr lang="en-US" dirty="0" smtClean="0"/>
+              <a:t>Calibrations: None (but potentially background)</a:t>
             </a:r>
           </a:p>
           <a:p>
@@ -14151,6 +15465,21 @@
             </a:pPr>
             <a:r>
               <a:rPr lang="en-US" dirty="0" smtClean="0"/>
+              <a:t>Use neural network trained on Geant4 optical simulation data.</a:t>
+            </a:r>
+          </a:p>
+          <a:p>
+            <a:pPr marL="0" indent="0">
+              <a:buNone/>
+            </a:pPr>
+            <a:endParaRPr lang="en-US" dirty="0"/>
+          </a:p>
+          <a:p>
+            <a:pPr marL="0" indent="0">
+              <a:buNone/>
+            </a:pPr>
+            <a:r>
+              <a:rPr lang="en-US" dirty="0" smtClean="0"/>
               <a:t>Also considering the use of a network trained on data with known distribution.  </a:t>
             </a:r>
           </a:p>
@@ -14219,7 +15548,7 @@
           <a:p>
             <a:fld id="{CFE4BAC9-6D41-4691-9299-18EF07EF0177}" type="slidenum">
               <a:rPr lang="en-US" smtClean="0"/>
-              <a:t>6</a:t>
+              <a:t>7</a:t>
             </a:fld>
             <a:endParaRPr lang="en-US"/>
           </a:p>
@@ -14288,7 +15617,7 @@
     </p:spTree>
     <p:extLst>
       <p:ext uri="{BB962C8B-B14F-4D97-AF65-F5344CB8AC3E}">
-        <p14:creationId xmlns:p14="http://schemas.microsoft.com/office/powerpoint/2010/main" val="2016042938"/>
+        <p14:creationId xmlns:p14="http://schemas.microsoft.com/office/powerpoint/2010/main" val="1853289865"/>
       </p:ext>
     </p:extLst>
   </p:cSld>
@@ -14313,7 +15642,7 @@
 </p:sld>
 </file>
 
-<file path=ppt/slides/slide7.xml><?xml version="1.0" encoding="utf-8"?>
+<file path=ppt/slides/slide8.xml><?xml version="1.0" encoding="utf-8"?>
 <p:sld xmlns:a="http://schemas.openxmlformats.org/drawingml/2006/main" xmlns:r="http://schemas.openxmlformats.org/officeDocument/2006/relationships" xmlns:p="http://schemas.openxmlformats.org/presentationml/2006/main">
   <p:cSld>
     <p:spTree>
@@ -14480,7 +15809,7 @@
           <a:p>
             <a:fld id="{CFE4BAC9-6D41-4691-9299-18EF07EF0177}" type="slidenum">
               <a:rPr lang="en-US" smtClean="0"/>
-              <a:t>7</a:t>
+              <a:t>8</a:t>
             </a:fld>
             <a:endParaRPr lang="en-US"/>
           </a:p>
@@ -15082,7 +16411,7 @@
 </p:sld>
 </file>
 
-<file path=ppt/slides/slide8.xml><?xml version="1.0" encoding="utf-8"?>
+<file path=ppt/slides/slide9.xml><?xml version="1.0" encoding="utf-8"?>
 <p:sld xmlns:a="http://schemas.openxmlformats.org/drawingml/2006/main" xmlns:r="http://schemas.openxmlformats.org/officeDocument/2006/relationships" xmlns:p="http://schemas.openxmlformats.org/presentationml/2006/main">
   <p:cSld>
     <p:spTree>
@@ -15192,7 +16521,6 @@
               <a:rPr lang="en-US" dirty="0" smtClean="0"/>
               <a:t>There is much more that we can do with the NR band – we will come back to this later!</a:t>
             </a:r>
-            <a:endParaRPr lang="en-US" dirty="0" smtClean="0"/>
           </a:p>
         </p:txBody>
       </p:sp>
@@ -15259,7 +16587,7 @@
           <a:p>
             <a:fld id="{CFE4BAC9-6D41-4691-9299-18EF07EF0177}" type="slidenum">
               <a:rPr lang="en-US" smtClean="0"/>
-              <a:t>8</a:t>
+              <a:t>9</a:t>
             </a:fld>
             <a:endParaRPr lang="en-US"/>
           </a:p>
@@ -15333,1026 +16661,6 @@
     </mc:Choice>
     <mc:Fallback xmlns="">
       <p:transition xmlns:p14="http://schemas.microsoft.com/office/powerpoint/2010/main" spd="slow" advTm="9161"/>
-    </mc:Fallback>
-  </mc:AlternateContent>
-  <p:timing>
-    <p:tnLst>
-      <p:par>
-        <p:cTn xmlns:p14="http://schemas.microsoft.com/office/powerpoint/2010/main" id="1" dur="indefinite" restart="never" nodeType="tmRoot"/>
-      </p:par>
-    </p:tnLst>
-  </p:timing>
-</p:sld>
-</file>
-
-<file path=ppt/slides/slide9.xml><?xml version="1.0" encoding="utf-8"?>
-<p:sld xmlns:a="http://schemas.openxmlformats.org/drawingml/2006/main" xmlns:r="http://schemas.openxmlformats.org/officeDocument/2006/relationships" xmlns:p="http://schemas.openxmlformats.org/presentationml/2006/main">
-  <p:cSld>
-    <p:spTree>
-      <p:nvGrpSpPr>
-        <p:cNvPr id="1" name=""/>
-        <p:cNvGrpSpPr/>
-        <p:nvPr/>
-      </p:nvGrpSpPr>
-      <p:grpSpPr>
-        <a:xfrm>
-          <a:off x="0" y="0"/>
-          <a:ext cx="0" cy="0"/>
-          <a:chOff x="0" y="0"/>
-          <a:chExt cx="0" cy="0"/>
-        </a:xfrm>
-      </p:grpSpPr>
-      <p:sp>
-        <p:nvSpPr>
-          <p:cNvPr id="2" name="Title 1"/>
-          <p:cNvSpPr>
-            <a:spLocks noGrp="1"/>
-          </p:cNvSpPr>
-          <p:nvPr>
-            <p:ph type="title"/>
-          </p:nvPr>
-        </p:nvSpPr>
-        <p:spPr/>
-        <p:txBody>
-          <a:bodyPr/>
-          <a:lstStyle/>
-          <a:p>
-            <a:r>
-              <a:rPr lang="en-US" dirty="0" smtClean="0"/>
-              <a:t>Coincidence Matching</a:t>
-            </a:r>
-            <a:endParaRPr lang="en-US" dirty="0"/>
-          </a:p>
-        </p:txBody>
-      </p:sp>
-      <p:sp>
-        <p:nvSpPr>
-          <p:cNvPr id="3" name="Content Placeholder 2"/>
-          <p:cNvSpPr>
-            <a:spLocks noGrp="1"/>
-          </p:cNvSpPr>
-          <p:nvPr>
-            <p:ph idx="1"/>
-          </p:nvPr>
-        </p:nvSpPr>
-        <p:spPr>
-          <a:xfrm>
-            <a:off x="976923" y="3855915"/>
-            <a:ext cx="3155461" cy="833315"/>
-          </a:xfrm>
-          <a:solidFill>
-            <a:schemeClr val="bg2">
-              <a:lumMod val="90000"/>
-            </a:schemeClr>
-          </a:solidFill>
-          <a:ln>
-            <a:solidFill>
-              <a:schemeClr val="tx1"/>
-            </a:solidFill>
-          </a:ln>
-        </p:spPr>
-        <p:txBody>
-          <a:bodyPr anchor="ctr">
-            <a:normAutofit/>
-          </a:bodyPr>
-          <a:lstStyle/>
-          <a:p>
-            <a:pPr marL="0" indent="0" algn="ctr">
-              <a:buNone/>
-            </a:pPr>
-            <a:r>
-              <a:rPr lang="en-US" dirty="0" smtClean="0"/>
-              <a:t>Corrected Observables Data Spectrum</a:t>
-            </a:r>
-          </a:p>
-        </p:txBody>
-      </p:sp>
-      <p:sp>
-        <p:nvSpPr>
-          <p:cNvPr id="4" name="Date Placeholder 3"/>
-          <p:cNvSpPr>
-            <a:spLocks noGrp="1"/>
-          </p:cNvSpPr>
-          <p:nvPr>
-            <p:ph type="dt" sz="half" idx="10"/>
-          </p:nvPr>
-        </p:nvSpPr>
-        <p:spPr/>
-        <p:txBody>
-          <a:bodyPr/>
-          <a:lstStyle/>
-          <a:p>
-            <a:r>
-              <a:rPr lang="en-US" smtClean="0"/>
-              <a:t>7/7/16</a:t>
-            </a:r>
-            <a:endParaRPr lang="en-US"/>
-          </a:p>
-        </p:txBody>
-      </p:sp>
-      <p:sp>
-        <p:nvSpPr>
-          <p:cNvPr id="5" name="Footer Placeholder 4"/>
-          <p:cNvSpPr>
-            <a:spLocks noGrp="1"/>
-          </p:cNvSpPr>
-          <p:nvPr>
-            <p:ph type="ftr" sz="quarter" idx="11"/>
-          </p:nvPr>
-        </p:nvSpPr>
-        <p:spPr/>
-        <p:txBody>
-          <a:bodyPr/>
-          <a:lstStyle/>
-          <a:p>
-            <a:r>
-              <a:rPr lang="en-US" smtClean="0"/>
-              <a:t>Matthew D. Anthony</a:t>
-            </a:r>
-            <a:endParaRPr lang="en-US"/>
-          </a:p>
-        </p:txBody>
-      </p:sp>
-      <p:sp>
-        <p:nvSpPr>
-          <p:cNvPr id="6" name="Slide Number Placeholder 5"/>
-          <p:cNvSpPr>
-            <a:spLocks noGrp="1"/>
-          </p:cNvSpPr>
-          <p:nvPr>
-            <p:ph type="sldNum" sz="quarter" idx="12"/>
-          </p:nvPr>
-        </p:nvSpPr>
-        <p:spPr/>
-        <p:txBody>
-          <a:bodyPr/>
-          <a:lstStyle/>
-          <a:p>
-            <a:fld id="{CFE4BAC9-6D41-4691-9299-18EF07EF0177}" type="slidenum">
-              <a:rPr lang="en-US" smtClean="0"/>
-              <a:t>9</a:t>
-            </a:fld>
-            <a:endParaRPr lang="en-US"/>
-          </a:p>
-        </p:txBody>
-      </p:sp>
-      <p:sp>
-        <p:nvSpPr>
-          <p:cNvPr id="12" name="Content Placeholder 2"/>
-          <p:cNvSpPr txBox="1">
-            <a:spLocks/>
-          </p:cNvSpPr>
-          <p:nvPr/>
-        </p:nvSpPr>
-        <p:spPr>
-          <a:xfrm>
-            <a:off x="4786917" y="3855915"/>
-            <a:ext cx="3341077" cy="833315"/>
-          </a:xfrm>
-          <a:prstGeom prst="rect">
-            <a:avLst/>
-          </a:prstGeom>
-          <a:solidFill>
-            <a:schemeClr val="bg2">
-              <a:lumMod val="90000"/>
-            </a:schemeClr>
-          </a:solidFill>
-          <a:ln>
-            <a:solidFill>
-              <a:schemeClr val="tx1"/>
-            </a:solidFill>
-          </a:ln>
-        </p:spPr>
-        <p:txBody>
-          <a:bodyPr vert="horz" lIns="91440" tIns="45720" rIns="91440" bIns="45720" rtlCol="0" anchor="ctr">
-            <a:normAutofit/>
-          </a:bodyPr>
-          <a:lstStyle>
-            <a:lvl1pPr marL="182880" indent="-182880" algn="l" defTabSz="914400" rtl="0" eaLnBrk="1" latinLnBrk="0" hangingPunct="1">
-              <a:spcBef>
-                <a:spcPct val="20000"/>
-              </a:spcBef>
-              <a:buClr>
-                <a:schemeClr val="accent1"/>
-              </a:buClr>
-              <a:buSzPct val="85000"/>
-              <a:buFont typeface="Arial" pitchFamily="34" charset="0"/>
-              <a:buChar char="•"/>
-              <a:defRPr sz="2000" kern="1200">
-                <a:solidFill>
-                  <a:schemeClr val="tx1"/>
-                </a:solidFill>
-                <a:latin typeface="Lucida Fax"/>
-                <a:ea typeface="+mn-ea"/>
-                <a:cs typeface="+mn-cs"/>
-              </a:defRPr>
-            </a:lvl1pPr>
-            <a:lvl2pPr marL="457200" indent="-182880" algn="l" defTabSz="914400" rtl="0" eaLnBrk="1" latinLnBrk="0" hangingPunct="1">
-              <a:spcBef>
-                <a:spcPct val="20000"/>
-              </a:spcBef>
-              <a:buClr>
-                <a:schemeClr val="accent1"/>
-              </a:buClr>
-              <a:buSzPct val="85000"/>
-              <a:buFont typeface="Arial" pitchFamily="34" charset="0"/>
-              <a:buChar char="•"/>
-              <a:defRPr sz="1800" kern="1200">
-                <a:solidFill>
-                  <a:schemeClr val="tx1"/>
-                </a:solidFill>
-                <a:latin typeface="Lucida Fax"/>
-                <a:ea typeface="+mn-ea"/>
-                <a:cs typeface="+mn-cs"/>
-              </a:defRPr>
-            </a:lvl2pPr>
-            <a:lvl3pPr marL="731520" indent="-182880" algn="l" defTabSz="914400" rtl="0" eaLnBrk="1" latinLnBrk="0" hangingPunct="1">
-              <a:spcBef>
-                <a:spcPct val="20000"/>
-              </a:spcBef>
-              <a:buClr>
-                <a:schemeClr val="accent1"/>
-              </a:buClr>
-              <a:buSzPct val="90000"/>
-              <a:buFont typeface="Arial" pitchFamily="34" charset="0"/>
-              <a:buChar char="•"/>
-              <a:defRPr sz="1600" kern="1200">
-                <a:solidFill>
-                  <a:schemeClr val="tx1"/>
-                </a:solidFill>
-                <a:latin typeface="Lucida Fax"/>
-                <a:ea typeface="+mn-ea"/>
-                <a:cs typeface="+mn-cs"/>
-              </a:defRPr>
-            </a:lvl3pPr>
-            <a:lvl4pPr marL="1005840" indent="-182880" algn="l" defTabSz="914400" rtl="0" eaLnBrk="1" latinLnBrk="0" hangingPunct="1">
-              <a:spcBef>
-                <a:spcPct val="20000"/>
-              </a:spcBef>
-              <a:buClr>
-                <a:schemeClr val="accent1"/>
-              </a:buClr>
-              <a:buFont typeface="Arial" pitchFamily="34" charset="0"/>
-              <a:buChar char="•"/>
-              <a:defRPr sz="1400" kern="1200">
-                <a:solidFill>
-                  <a:schemeClr val="tx1"/>
-                </a:solidFill>
-                <a:latin typeface="Lucida Fax"/>
-                <a:ea typeface="+mn-ea"/>
-                <a:cs typeface="+mn-cs"/>
-              </a:defRPr>
-            </a:lvl4pPr>
-            <a:lvl5pPr marL="1188720" indent="-137160" algn="l" defTabSz="914400" rtl="0" eaLnBrk="1" latinLnBrk="0" hangingPunct="1">
-              <a:spcBef>
-                <a:spcPct val="20000"/>
-              </a:spcBef>
-              <a:buClr>
-                <a:schemeClr val="accent1"/>
-              </a:buClr>
-              <a:buSzPct val="100000"/>
-              <a:buFont typeface="Arial" pitchFamily="34" charset="0"/>
-              <a:buChar char="•"/>
-              <a:defRPr sz="1200" kern="1200" baseline="0">
-                <a:solidFill>
-                  <a:schemeClr val="tx1"/>
-                </a:solidFill>
-                <a:latin typeface="Lucida Fax"/>
-                <a:ea typeface="+mn-ea"/>
-                <a:cs typeface="+mn-cs"/>
-              </a:defRPr>
-            </a:lvl5pPr>
-            <a:lvl6pPr marL="1371600" indent="-182880" algn="l" defTabSz="914400" rtl="0" eaLnBrk="1" latinLnBrk="0" hangingPunct="1">
-              <a:spcBef>
-                <a:spcPct val="20000"/>
-              </a:spcBef>
-              <a:buClr>
-                <a:schemeClr val="accent1"/>
-              </a:buClr>
-              <a:buFont typeface="Arial" pitchFamily="34" charset="0"/>
-              <a:buChar char="•"/>
-              <a:defRPr sz="1300" kern="1200">
-                <a:solidFill>
-                  <a:schemeClr val="tx1"/>
-                </a:solidFill>
-                <a:latin typeface="+mn-lt"/>
-                <a:ea typeface="+mn-ea"/>
-                <a:cs typeface="+mn-cs"/>
-              </a:defRPr>
-            </a:lvl6pPr>
-            <a:lvl7pPr marL="1554480" indent="-182880" algn="l" defTabSz="914400" rtl="0" eaLnBrk="1" latinLnBrk="0" hangingPunct="1">
-              <a:spcBef>
-                <a:spcPct val="20000"/>
-              </a:spcBef>
-              <a:buClr>
-                <a:schemeClr val="accent1"/>
-              </a:buClr>
-              <a:buFont typeface="Arial" pitchFamily="34" charset="0"/>
-              <a:buChar char="•"/>
-              <a:defRPr sz="1300" kern="1200">
-                <a:solidFill>
-                  <a:schemeClr val="tx1"/>
-                </a:solidFill>
-                <a:latin typeface="+mn-lt"/>
-                <a:ea typeface="+mn-ea"/>
-                <a:cs typeface="+mn-cs"/>
-              </a:defRPr>
-            </a:lvl7pPr>
-            <a:lvl8pPr marL="1737360" indent="-182880" algn="l" defTabSz="914400" rtl="0" eaLnBrk="1" latinLnBrk="0" hangingPunct="1">
-              <a:spcBef>
-                <a:spcPct val="20000"/>
-              </a:spcBef>
-              <a:buClr>
-                <a:schemeClr val="accent1"/>
-              </a:buClr>
-              <a:buFont typeface="Arial" pitchFamily="34" charset="0"/>
-              <a:buChar char="•"/>
-              <a:defRPr sz="1300" kern="1200">
-                <a:solidFill>
-                  <a:schemeClr val="tx1"/>
-                </a:solidFill>
-                <a:latin typeface="+mn-lt"/>
-                <a:ea typeface="+mn-ea"/>
-                <a:cs typeface="+mn-cs"/>
-              </a:defRPr>
-            </a:lvl8pPr>
-            <a:lvl9pPr marL="1920240" indent="-182880" algn="l" defTabSz="914400" rtl="0" eaLnBrk="1" latinLnBrk="0" hangingPunct="1">
-              <a:spcBef>
-                <a:spcPct val="20000"/>
-              </a:spcBef>
-              <a:buClr>
-                <a:schemeClr val="accent1"/>
-              </a:buClr>
-              <a:buFont typeface="Arial" pitchFamily="34" charset="0"/>
-              <a:buChar char="•"/>
-              <a:defRPr sz="1300" kern="1200">
-                <a:solidFill>
-                  <a:schemeClr val="tx1"/>
-                </a:solidFill>
-                <a:latin typeface="+mn-lt"/>
-                <a:ea typeface="+mn-ea"/>
-                <a:cs typeface="+mn-cs"/>
-              </a:defRPr>
-            </a:lvl9pPr>
-          </a:lstStyle>
-          <a:p>
-            <a:pPr marL="0" indent="0" algn="ctr">
-              <a:buFont typeface="Arial" pitchFamily="34" charset="0"/>
-              <a:buNone/>
-            </a:pPr>
-            <a:r>
-              <a:rPr lang="en-US" dirty="0" smtClean="0"/>
-              <a:t>MC Produced Observables Spectrum</a:t>
-            </a:r>
-          </a:p>
-        </p:txBody>
-      </p:sp>
-      <p:cxnSp>
-        <p:nvCxnSpPr>
-          <p:cNvPr id="14" name="Straight Arrow Connector 13"/>
-          <p:cNvCxnSpPr/>
-          <p:nvPr/>
-        </p:nvCxnSpPr>
-        <p:spPr>
-          <a:xfrm>
-            <a:off x="3352800" y="4806463"/>
-            <a:ext cx="779584" cy="762000"/>
-          </a:xfrm>
-          <a:prstGeom prst="straightConnector1">
-            <a:avLst/>
-          </a:prstGeom>
-          <a:ln w="38100" cmpd="sng">
-            <a:tailEnd type="arrow"/>
-          </a:ln>
-        </p:spPr>
-        <p:style>
-          <a:lnRef idx="2">
-            <a:schemeClr val="accent1"/>
-          </a:lnRef>
-          <a:fillRef idx="0">
-            <a:schemeClr val="accent1"/>
-          </a:fillRef>
-          <a:effectRef idx="1">
-            <a:schemeClr val="accent1"/>
-          </a:effectRef>
-          <a:fontRef idx="minor">
-            <a:schemeClr val="tx1"/>
-          </a:fontRef>
-        </p:style>
-      </p:cxnSp>
-      <p:cxnSp>
-        <p:nvCxnSpPr>
-          <p:cNvPr id="16" name="Straight Arrow Connector 15"/>
-          <p:cNvCxnSpPr/>
-          <p:nvPr/>
-        </p:nvCxnSpPr>
-        <p:spPr>
-          <a:xfrm flipH="1">
-            <a:off x="4689219" y="4806463"/>
-            <a:ext cx="779584" cy="762000"/>
-          </a:xfrm>
-          <a:prstGeom prst="straightConnector1">
-            <a:avLst/>
-          </a:prstGeom>
-          <a:ln w="38100" cmpd="sng">
-            <a:tailEnd type="arrow"/>
-          </a:ln>
-        </p:spPr>
-        <p:style>
-          <a:lnRef idx="2">
-            <a:schemeClr val="accent1"/>
-          </a:lnRef>
-          <a:fillRef idx="0">
-            <a:schemeClr val="accent1"/>
-          </a:fillRef>
-          <a:effectRef idx="1">
-            <a:schemeClr val="accent1"/>
-          </a:effectRef>
-          <a:fontRef idx="minor">
-            <a:schemeClr val="tx1"/>
-          </a:fontRef>
-        </p:style>
-      </p:cxnSp>
-      <p:pic>
-        <p:nvPicPr>
-          <p:cNvPr id="18" name="Picture 17"/>
-          <p:cNvPicPr>
-            <a:picLocks noChangeAspect="1"/>
-          </p:cNvPicPr>
-          <p:nvPr/>
-        </p:nvPicPr>
-        <p:blipFill>
-          <a:blip r:embed="rId3"/>
-          <a:stretch>
-            <a:fillRect/>
-          </a:stretch>
-        </p:blipFill>
-        <p:spPr>
-          <a:xfrm>
-            <a:off x="3913554" y="5705229"/>
-            <a:ext cx="1029665" cy="1029665"/>
-          </a:xfrm>
-          <a:prstGeom prst="rect">
-            <a:avLst/>
-          </a:prstGeom>
-        </p:spPr>
-      </p:pic>
-      <p:sp>
-        <p:nvSpPr>
-          <p:cNvPr id="24" name="Content Placeholder 2"/>
-          <p:cNvSpPr txBox="1">
-            <a:spLocks/>
-          </p:cNvSpPr>
-          <p:nvPr/>
-        </p:nvSpPr>
-        <p:spPr>
-          <a:xfrm>
-            <a:off x="801077" y="2217126"/>
-            <a:ext cx="3575538" cy="833315"/>
-          </a:xfrm>
-          <a:prstGeom prst="rect">
-            <a:avLst/>
-          </a:prstGeom>
-          <a:solidFill>
-            <a:schemeClr val="bg2">
-              <a:lumMod val="90000"/>
-            </a:schemeClr>
-          </a:solidFill>
-          <a:ln>
-            <a:solidFill>
-              <a:schemeClr val="tx1"/>
-            </a:solidFill>
-          </a:ln>
-        </p:spPr>
-        <p:txBody>
-          <a:bodyPr vert="horz" lIns="91440" tIns="45720" rIns="91440" bIns="45720" rtlCol="0" anchor="ctr">
-            <a:normAutofit/>
-          </a:bodyPr>
-          <a:lstStyle>
-            <a:lvl1pPr marL="182880" indent="-182880" algn="l" defTabSz="914400" rtl="0" eaLnBrk="1" latinLnBrk="0" hangingPunct="1">
-              <a:spcBef>
-                <a:spcPct val="20000"/>
-              </a:spcBef>
-              <a:buClr>
-                <a:schemeClr val="accent1"/>
-              </a:buClr>
-              <a:buSzPct val="85000"/>
-              <a:buFont typeface="Arial" pitchFamily="34" charset="0"/>
-              <a:buChar char="•"/>
-              <a:defRPr sz="2000" kern="1200">
-                <a:solidFill>
-                  <a:schemeClr val="tx1"/>
-                </a:solidFill>
-                <a:latin typeface="Lucida Fax"/>
-                <a:ea typeface="+mn-ea"/>
-                <a:cs typeface="+mn-cs"/>
-              </a:defRPr>
-            </a:lvl1pPr>
-            <a:lvl2pPr marL="457200" indent="-182880" algn="l" defTabSz="914400" rtl="0" eaLnBrk="1" latinLnBrk="0" hangingPunct="1">
-              <a:spcBef>
-                <a:spcPct val="20000"/>
-              </a:spcBef>
-              <a:buClr>
-                <a:schemeClr val="accent1"/>
-              </a:buClr>
-              <a:buSzPct val="85000"/>
-              <a:buFont typeface="Arial" pitchFamily="34" charset="0"/>
-              <a:buChar char="•"/>
-              <a:defRPr sz="1800" kern="1200">
-                <a:solidFill>
-                  <a:schemeClr val="tx1"/>
-                </a:solidFill>
-                <a:latin typeface="Lucida Fax"/>
-                <a:ea typeface="+mn-ea"/>
-                <a:cs typeface="+mn-cs"/>
-              </a:defRPr>
-            </a:lvl2pPr>
-            <a:lvl3pPr marL="731520" indent="-182880" algn="l" defTabSz="914400" rtl="0" eaLnBrk="1" latinLnBrk="0" hangingPunct="1">
-              <a:spcBef>
-                <a:spcPct val="20000"/>
-              </a:spcBef>
-              <a:buClr>
-                <a:schemeClr val="accent1"/>
-              </a:buClr>
-              <a:buSzPct val="90000"/>
-              <a:buFont typeface="Arial" pitchFamily="34" charset="0"/>
-              <a:buChar char="•"/>
-              <a:defRPr sz="1600" kern="1200">
-                <a:solidFill>
-                  <a:schemeClr val="tx1"/>
-                </a:solidFill>
-                <a:latin typeface="Lucida Fax"/>
-                <a:ea typeface="+mn-ea"/>
-                <a:cs typeface="+mn-cs"/>
-              </a:defRPr>
-            </a:lvl3pPr>
-            <a:lvl4pPr marL="1005840" indent="-182880" algn="l" defTabSz="914400" rtl="0" eaLnBrk="1" latinLnBrk="0" hangingPunct="1">
-              <a:spcBef>
-                <a:spcPct val="20000"/>
-              </a:spcBef>
-              <a:buClr>
-                <a:schemeClr val="accent1"/>
-              </a:buClr>
-              <a:buFont typeface="Arial" pitchFamily="34" charset="0"/>
-              <a:buChar char="•"/>
-              <a:defRPr sz="1400" kern="1200">
-                <a:solidFill>
-                  <a:schemeClr val="tx1"/>
-                </a:solidFill>
-                <a:latin typeface="Lucida Fax"/>
-                <a:ea typeface="+mn-ea"/>
-                <a:cs typeface="+mn-cs"/>
-              </a:defRPr>
-            </a:lvl4pPr>
-            <a:lvl5pPr marL="1188720" indent="-137160" algn="l" defTabSz="914400" rtl="0" eaLnBrk="1" latinLnBrk="0" hangingPunct="1">
-              <a:spcBef>
-                <a:spcPct val="20000"/>
-              </a:spcBef>
-              <a:buClr>
-                <a:schemeClr val="accent1"/>
-              </a:buClr>
-              <a:buSzPct val="100000"/>
-              <a:buFont typeface="Arial" pitchFamily="34" charset="0"/>
-              <a:buChar char="•"/>
-              <a:defRPr sz="1200" kern="1200" baseline="0">
-                <a:solidFill>
-                  <a:schemeClr val="tx1"/>
-                </a:solidFill>
-                <a:latin typeface="Lucida Fax"/>
-                <a:ea typeface="+mn-ea"/>
-                <a:cs typeface="+mn-cs"/>
-              </a:defRPr>
-            </a:lvl5pPr>
-            <a:lvl6pPr marL="1371600" indent="-182880" algn="l" defTabSz="914400" rtl="0" eaLnBrk="1" latinLnBrk="0" hangingPunct="1">
-              <a:spcBef>
-                <a:spcPct val="20000"/>
-              </a:spcBef>
-              <a:buClr>
-                <a:schemeClr val="accent1"/>
-              </a:buClr>
-              <a:buFont typeface="Arial" pitchFamily="34" charset="0"/>
-              <a:buChar char="•"/>
-              <a:defRPr sz="1300" kern="1200">
-                <a:solidFill>
-                  <a:schemeClr val="tx1"/>
-                </a:solidFill>
-                <a:latin typeface="+mn-lt"/>
-                <a:ea typeface="+mn-ea"/>
-                <a:cs typeface="+mn-cs"/>
-              </a:defRPr>
-            </a:lvl6pPr>
-            <a:lvl7pPr marL="1554480" indent="-182880" algn="l" defTabSz="914400" rtl="0" eaLnBrk="1" latinLnBrk="0" hangingPunct="1">
-              <a:spcBef>
-                <a:spcPct val="20000"/>
-              </a:spcBef>
-              <a:buClr>
-                <a:schemeClr val="accent1"/>
-              </a:buClr>
-              <a:buFont typeface="Arial" pitchFamily="34" charset="0"/>
-              <a:buChar char="•"/>
-              <a:defRPr sz="1300" kern="1200">
-                <a:solidFill>
-                  <a:schemeClr val="tx1"/>
-                </a:solidFill>
-                <a:latin typeface="+mn-lt"/>
-                <a:ea typeface="+mn-ea"/>
-                <a:cs typeface="+mn-cs"/>
-              </a:defRPr>
-            </a:lvl7pPr>
-            <a:lvl8pPr marL="1737360" indent="-182880" algn="l" defTabSz="914400" rtl="0" eaLnBrk="1" latinLnBrk="0" hangingPunct="1">
-              <a:spcBef>
-                <a:spcPct val="20000"/>
-              </a:spcBef>
-              <a:buClr>
-                <a:schemeClr val="accent1"/>
-              </a:buClr>
-              <a:buFont typeface="Arial" pitchFamily="34" charset="0"/>
-              <a:buChar char="•"/>
-              <a:defRPr sz="1300" kern="1200">
-                <a:solidFill>
-                  <a:schemeClr val="tx1"/>
-                </a:solidFill>
-                <a:latin typeface="+mn-lt"/>
-                <a:ea typeface="+mn-ea"/>
-                <a:cs typeface="+mn-cs"/>
-              </a:defRPr>
-            </a:lvl8pPr>
-            <a:lvl9pPr marL="1920240" indent="-182880" algn="l" defTabSz="914400" rtl="0" eaLnBrk="1" latinLnBrk="0" hangingPunct="1">
-              <a:spcBef>
-                <a:spcPct val="20000"/>
-              </a:spcBef>
-              <a:buClr>
-                <a:schemeClr val="accent1"/>
-              </a:buClr>
-              <a:buFont typeface="Arial" pitchFamily="34" charset="0"/>
-              <a:buChar char="•"/>
-              <a:defRPr sz="1300" kern="1200">
-                <a:solidFill>
-                  <a:schemeClr val="tx1"/>
-                </a:solidFill>
-                <a:latin typeface="+mn-lt"/>
-                <a:ea typeface="+mn-ea"/>
-                <a:cs typeface="+mn-cs"/>
-              </a:defRPr>
-            </a:lvl9pPr>
-          </a:lstStyle>
-          <a:p>
-            <a:pPr marL="0" indent="0" algn="ctr">
-              <a:buFont typeface="Arial" pitchFamily="34" charset="0"/>
-              <a:buNone/>
-            </a:pPr>
-            <a:r>
-              <a:rPr lang="en-US" dirty="0" smtClean="0"/>
-              <a:t>Uncorrected Observables Data Spectrum</a:t>
-            </a:r>
-          </a:p>
-        </p:txBody>
-      </p:sp>
-      <p:cxnSp>
-        <p:nvCxnSpPr>
-          <p:cNvPr id="25" name="Straight Arrow Connector 24"/>
-          <p:cNvCxnSpPr/>
-          <p:nvPr/>
-        </p:nvCxnSpPr>
-        <p:spPr>
-          <a:xfrm>
-            <a:off x="2573216" y="3145694"/>
-            <a:ext cx="0" cy="651607"/>
-          </a:xfrm>
-          <a:prstGeom prst="straightConnector1">
-            <a:avLst/>
-          </a:prstGeom>
-          <a:ln w="38100" cmpd="sng">
-            <a:tailEnd type="arrow"/>
-          </a:ln>
-        </p:spPr>
-        <p:style>
-          <a:lnRef idx="2">
-            <a:schemeClr val="accent1"/>
-          </a:lnRef>
-          <a:fillRef idx="0">
-            <a:schemeClr val="accent1"/>
-          </a:fillRef>
-          <a:effectRef idx="1">
-            <a:schemeClr val="accent1"/>
-          </a:effectRef>
-          <a:fontRef idx="minor">
-            <a:schemeClr val="tx1"/>
-          </a:fontRef>
-        </p:style>
-      </p:cxnSp>
-      <p:sp>
-        <p:nvSpPr>
-          <p:cNvPr id="29" name="Content Placeholder 2"/>
-          <p:cNvSpPr txBox="1">
-            <a:spLocks/>
-          </p:cNvSpPr>
-          <p:nvPr/>
-        </p:nvSpPr>
-        <p:spPr>
-          <a:xfrm>
-            <a:off x="4669681" y="2217126"/>
-            <a:ext cx="3575538" cy="833315"/>
-          </a:xfrm>
-          <a:prstGeom prst="rect">
-            <a:avLst/>
-          </a:prstGeom>
-          <a:solidFill>
-            <a:schemeClr val="bg2">
-              <a:lumMod val="90000"/>
-            </a:schemeClr>
-          </a:solidFill>
-          <a:ln>
-            <a:solidFill>
-              <a:schemeClr val="tx1"/>
-            </a:solidFill>
-          </a:ln>
-        </p:spPr>
-        <p:txBody>
-          <a:bodyPr vert="horz" lIns="91440" tIns="45720" rIns="91440" bIns="45720" rtlCol="0" anchor="ctr">
-            <a:normAutofit/>
-          </a:bodyPr>
-          <a:lstStyle>
-            <a:lvl1pPr marL="182880" indent="-182880" algn="l" defTabSz="914400" rtl="0" eaLnBrk="1" latinLnBrk="0" hangingPunct="1">
-              <a:spcBef>
-                <a:spcPct val="20000"/>
-              </a:spcBef>
-              <a:buClr>
-                <a:schemeClr val="accent1"/>
-              </a:buClr>
-              <a:buSzPct val="85000"/>
-              <a:buFont typeface="Arial" pitchFamily="34" charset="0"/>
-              <a:buChar char="•"/>
-              <a:defRPr sz="2000" kern="1200">
-                <a:solidFill>
-                  <a:schemeClr val="tx1"/>
-                </a:solidFill>
-                <a:latin typeface="Lucida Fax"/>
-                <a:ea typeface="+mn-ea"/>
-                <a:cs typeface="+mn-cs"/>
-              </a:defRPr>
-            </a:lvl1pPr>
-            <a:lvl2pPr marL="457200" indent="-182880" algn="l" defTabSz="914400" rtl="0" eaLnBrk="1" latinLnBrk="0" hangingPunct="1">
-              <a:spcBef>
-                <a:spcPct val="20000"/>
-              </a:spcBef>
-              <a:buClr>
-                <a:schemeClr val="accent1"/>
-              </a:buClr>
-              <a:buSzPct val="85000"/>
-              <a:buFont typeface="Arial" pitchFamily="34" charset="0"/>
-              <a:buChar char="•"/>
-              <a:defRPr sz="1800" kern="1200">
-                <a:solidFill>
-                  <a:schemeClr val="tx1"/>
-                </a:solidFill>
-                <a:latin typeface="Lucida Fax"/>
-                <a:ea typeface="+mn-ea"/>
-                <a:cs typeface="+mn-cs"/>
-              </a:defRPr>
-            </a:lvl2pPr>
-            <a:lvl3pPr marL="731520" indent="-182880" algn="l" defTabSz="914400" rtl="0" eaLnBrk="1" latinLnBrk="0" hangingPunct="1">
-              <a:spcBef>
-                <a:spcPct val="20000"/>
-              </a:spcBef>
-              <a:buClr>
-                <a:schemeClr val="accent1"/>
-              </a:buClr>
-              <a:buSzPct val="90000"/>
-              <a:buFont typeface="Arial" pitchFamily="34" charset="0"/>
-              <a:buChar char="•"/>
-              <a:defRPr sz="1600" kern="1200">
-                <a:solidFill>
-                  <a:schemeClr val="tx1"/>
-                </a:solidFill>
-                <a:latin typeface="Lucida Fax"/>
-                <a:ea typeface="+mn-ea"/>
-                <a:cs typeface="+mn-cs"/>
-              </a:defRPr>
-            </a:lvl3pPr>
-            <a:lvl4pPr marL="1005840" indent="-182880" algn="l" defTabSz="914400" rtl="0" eaLnBrk="1" latinLnBrk="0" hangingPunct="1">
-              <a:spcBef>
-                <a:spcPct val="20000"/>
-              </a:spcBef>
-              <a:buClr>
-                <a:schemeClr val="accent1"/>
-              </a:buClr>
-              <a:buFont typeface="Arial" pitchFamily="34" charset="0"/>
-              <a:buChar char="•"/>
-              <a:defRPr sz="1400" kern="1200">
-                <a:solidFill>
-                  <a:schemeClr val="tx1"/>
-                </a:solidFill>
-                <a:latin typeface="Lucida Fax"/>
-                <a:ea typeface="+mn-ea"/>
-                <a:cs typeface="+mn-cs"/>
-              </a:defRPr>
-            </a:lvl4pPr>
-            <a:lvl5pPr marL="1188720" indent="-137160" algn="l" defTabSz="914400" rtl="0" eaLnBrk="1" latinLnBrk="0" hangingPunct="1">
-              <a:spcBef>
-                <a:spcPct val="20000"/>
-              </a:spcBef>
-              <a:buClr>
-                <a:schemeClr val="accent1"/>
-              </a:buClr>
-              <a:buSzPct val="100000"/>
-              <a:buFont typeface="Arial" pitchFamily="34" charset="0"/>
-              <a:buChar char="•"/>
-              <a:defRPr sz="1200" kern="1200" baseline="0">
-                <a:solidFill>
-                  <a:schemeClr val="tx1"/>
-                </a:solidFill>
-                <a:latin typeface="Lucida Fax"/>
-                <a:ea typeface="+mn-ea"/>
-                <a:cs typeface="+mn-cs"/>
-              </a:defRPr>
-            </a:lvl5pPr>
-            <a:lvl6pPr marL="1371600" indent="-182880" algn="l" defTabSz="914400" rtl="0" eaLnBrk="1" latinLnBrk="0" hangingPunct="1">
-              <a:spcBef>
-                <a:spcPct val="20000"/>
-              </a:spcBef>
-              <a:buClr>
-                <a:schemeClr val="accent1"/>
-              </a:buClr>
-              <a:buFont typeface="Arial" pitchFamily="34" charset="0"/>
-              <a:buChar char="•"/>
-              <a:defRPr sz="1300" kern="1200">
-                <a:solidFill>
-                  <a:schemeClr val="tx1"/>
-                </a:solidFill>
-                <a:latin typeface="+mn-lt"/>
-                <a:ea typeface="+mn-ea"/>
-                <a:cs typeface="+mn-cs"/>
-              </a:defRPr>
-            </a:lvl6pPr>
-            <a:lvl7pPr marL="1554480" indent="-182880" algn="l" defTabSz="914400" rtl="0" eaLnBrk="1" latinLnBrk="0" hangingPunct="1">
-              <a:spcBef>
-                <a:spcPct val="20000"/>
-              </a:spcBef>
-              <a:buClr>
-                <a:schemeClr val="accent1"/>
-              </a:buClr>
-              <a:buFont typeface="Arial" pitchFamily="34" charset="0"/>
-              <a:buChar char="•"/>
-              <a:defRPr sz="1300" kern="1200">
-                <a:solidFill>
-                  <a:schemeClr val="tx1"/>
-                </a:solidFill>
-                <a:latin typeface="+mn-lt"/>
-                <a:ea typeface="+mn-ea"/>
-                <a:cs typeface="+mn-cs"/>
-              </a:defRPr>
-            </a:lvl7pPr>
-            <a:lvl8pPr marL="1737360" indent="-182880" algn="l" defTabSz="914400" rtl="0" eaLnBrk="1" latinLnBrk="0" hangingPunct="1">
-              <a:spcBef>
-                <a:spcPct val="20000"/>
-              </a:spcBef>
-              <a:buClr>
-                <a:schemeClr val="accent1"/>
-              </a:buClr>
-              <a:buFont typeface="Arial" pitchFamily="34" charset="0"/>
-              <a:buChar char="•"/>
-              <a:defRPr sz="1300" kern="1200">
-                <a:solidFill>
-                  <a:schemeClr val="tx1"/>
-                </a:solidFill>
-                <a:latin typeface="+mn-lt"/>
-                <a:ea typeface="+mn-ea"/>
-                <a:cs typeface="+mn-cs"/>
-              </a:defRPr>
-            </a:lvl8pPr>
-            <a:lvl9pPr marL="1920240" indent="-182880" algn="l" defTabSz="914400" rtl="0" eaLnBrk="1" latinLnBrk="0" hangingPunct="1">
-              <a:spcBef>
-                <a:spcPct val="20000"/>
-              </a:spcBef>
-              <a:buClr>
-                <a:schemeClr val="accent1"/>
-              </a:buClr>
-              <a:buFont typeface="Arial" pitchFamily="34" charset="0"/>
-              <a:buChar char="•"/>
-              <a:defRPr sz="1300" kern="1200">
-                <a:solidFill>
-                  <a:schemeClr val="tx1"/>
-                </a:solidFill>
-                <a:latin typeface="+mn-lt"/>
-                <a:ea typeface="+mn-ea"/>
-                <a:cs typeface="+mn-cs"/>
-              </a:defRPr>
-            </a:lvl9pPr>
-          </a:lstStyle>
-          <a:p>
-            <a:pPr marL="0" indent="0" algn="ctr">
-              <a:buFont typeface="Arial" pitchFamily="34" charset="0"/>
-              <a:buNone/>
-            </a:pPr>
-            <a:r>
-              <a:rPr lang="en-US" dirty="0" smtClean="0"/>
-              <a:t>Energy Spectrum from Geant4</a:t>
-            </a:r>
-          </a:p>
-        </p:txBody>
-      </p:sp>
-      <p:cxnSp>
-        <p:nvCxnSpPr>
-          <p:cNvPr id="30" name="Straight Arrow Connector 29"/>
-          <p:cNvCxnSpPr/>
-          <p:nvPr/>
-        </p:nvCxnSpPr>
-        <p:spPr>
-          <a:xfrm>
-            <a:off x="6441820" y="3145694"/>
-            <a:ext cx="0" cy="651607"/>
-          </a:xfrm>
-          <a:prstGeom prst="straightConnector1">
-            <a:avLst/>
-          </a:prstGeom>
-          <a:ln w="38100" cmpd="sng">
-            <a:tailEnd type="arrow"/>
-          </a:ln>
-        </p:spPr>
-        <p:style>
-          <a:lnRef idx="2">
-            <a:schemeClr val="accent1"/>
-          </a:lnRef>
-          <a:fillRef idx="0">
-            <a:schemeClr val="accent1"/>
-          </a:fillRef>
-          <a:effectRef idx="1">
-            <a:schemeClr val="accent1"/>
-          </a:effectRef>
-          <a:fontRef idx="minor">
-            <a:schemeClr val="tx1"/>
-          </a:fontRef>
-        </p:style>
-      </p:cxnSp>
-      <p:sp>
-        <p:nvSpPr>
-          <p:cNvPr id="7" name="Donut 6"/>
-          <p:cNvSpPr/>
-          <p:nvPr/>
-        </p:nvSpPr>
-        <p:spPr>
-          <a:xfrm>
-            <a:off x="6158512" y="2972290"/>
-            <a:ext cx="566615" cy="1013558"/>
-          </a:xfrm>
-          <a:prstGeom prst="donut">
-            <a:avLst>
-              <a:gd name="adj" fmla="val 0"/>
-            </a:avLst>
-          </a:prstGeom>
-          <a:solidFill>
-            <a:srgbClr val="FF0000"/>
-          </a:solidFill>
-          <a:ln>
-            <a:solidFill>
-              <a:srgbClr val="FF0000"/>
-            </a:solidFill>
-          </a:ln>
-        </p:spPr>
-        <p:style>
-          <a:lnRef idx="1">
-            <a:schemeClr val="accent1"/>
-          </a:lnRef>
-          <a:fillRef idx="3">
-            <a:schemeClr val="accent1"/>
-          </a:fillRef>
-          <a:effectRef idx="2">
-            <a:schemeClr val="accent1"/>
-          </a:effectRef>
-          <a:fontRef idx="minor">
-            <a:schemeClr val="lt1"/>
-          </a:fontRef>
-        </p:style>
-        <p:txBody>
-          <a:bodyPr rtlCol="0" anchor="ctr"/>
-          <a:lstStyle/>
-          <a:p>
-            <a:pPr algn="ctr"/>
-            <a:endParaRPr lang="en-US">
-              <a:solidFill>
-                <a:schemeClr val="tx1"/>
-              </a:solidFill>
-            </a:endParaRPr>
-          </a:p>
-        </p:txBody>
-      </p:sp>
-    </p:spTree>
-    <p:extLst>
-      <p:ext uri="{BB962C8B-B14F-4D97-AF65-F5344CB8AC3E}">
-        <p14:creationId xmlns:p14="http://schemas.microsoft.com/office/powerpoint/2010/main" val="1779980456"/>
-      </p:ext>
-    </p:extLst>
-  </p:cSld>
-  <p:clrMapOvr>
-    <a:masterClrMapping/>
-  </p:clrMapOvr>
-  <mc:AlternateContent xmlns:mc="http://schemas.openxmlformats.org/markup-compatibility/2006" xmlns:p14="http://schemas.microsoft.com/office/powerpoint/2010/main">
-    <mc:Choice Requires="p14">
-      <p:transition spd="slow" p14:dur="2000" advTm="34259"/>
-    </mc:Choice>
-    <mc:Fallback xmlns="">
-      <p:transition xmlns:p14="http://schemas.microsoft.com/office/powerpoint/2010/main" spd="slow" advTm="34259"/>
     </mc:Fallback>
   </mc:AlternateContent>
   <p:timing>

</xml_diff>

<commit_message>
Small changes to matching codes
</commit_message>
<xml_diff>
--- a/Presentations/group_status_update/neriX_nr_status.pptx
+++ b/Presentations/group_status_update/neriX_nr_status.pptx
@@ -5,10 +5,10 @@
     <p:sldMasterId id="2147483675" r:id="rId1"/>
   </p:sldMasterIdLst>
   <p:notesMasterIdLst>
-    <p:notesMasterId r:id="rId15"/>
+    <p:notesMasterId r:id="rId18"/>
   </p:notesMasterIdLst>
   <p:handoutMasterIdLst>
-    <p:handoutMasterId r:id="rId16"/>
+    <p:handoutMasterId r:id="rId19"/>
   </p:handoutMasterIdLst>
   <p:sldIdLst>
     <p:sldId id="282" r:id="rId2"/>
@@ -24,6 +24,9 @@
     <p:sldId id="289" r:id="rId12"/>
     <p:sldId id="291" r:id="rId13"/>
     <p:sldId id="292" r:id="rId14"/>
+    <p:sldId id="296" r:id="rId15"/>
+    <p:sldId id="295" r:id="rId16"/>
+    <p:sldId id="294" r:id="rId17"/>
   </p:sldIdLst>
   <p:sldSz cx="9144000" cy="6858000" type="screen4x3"/>
   <p:notesSz cx="6858000" cy="9144000"/>
@@ -207,7 +210,7 @@
           <a:p>
             <a:fld id="{C2B6A889-753A-F242-AA11-5A8C7810D63F}" type="datetime1">
               <a:rPr lang="en-US" smtClean="0"/>
-              <a:t>8/1/16</a:t>
+              <a:t>8/3/16</a:t>
             </a:fld>
             <a:endParaRPr lang="en-US"/>
           </a:p>
@@ -373,7 +376,7 @@
           <a:p>
             <a:fld id="{29DAF0D2-C3E7-3D4C-AC90-0C88761377B3}" type="datetime1">
               <a:rPr lang="en-US" smtClean="0"/>
-              <a:t>8/1/16</a:t>
+              <a:t>8/3/16</a:t>
             </a:fld>
             <a:endParaRPr lang="en-US"/>
           </a:p>
@@ -1056,6 +1059,266 @@
             <a:fld id="{65102967-BEC4-0F46-A022-1564C826E33F}" type="slidenum">
               <a:rPr lang="en-US" smtClean="0"/>
               <a:t>13</a:t>
+            </a:fld>
+            <a:endParaRPr lang="en-US"/>
+          </a:p>
+        </p:txBody>
+      </p:sp>
+    </p:spTree>
+    <p:extLst>
+      <p:ext uri="{BB962C8B-B14F-4D97-AF65-F5344CB8AC3E}">
+        <p14:creationId xmlns:p14="http://schemas.microsoft.com/office/powerpoint/2010/main" val="3991195823"/>
+      </p:ext>
+    </p:extLst>
+  </p:cSld>
+  <p:clrMapOvr>
+    <a:masterClrMapping/>
+  </p:clrMapOvr>
+</p:notes>
+</file>
+
+<file path=ppt/notesSlides/notesSlide14.xml><?xml version="1.0" encoding="utf-8"?>
+<p:notes xmlns:a="http://schemas.openxmlformats.org/drawingml/2006/main" xmlns:r="http://schemas.openxmlformats.org/officeDocument/2006/relationships" xmlns:p="http://schemas.openxmlformats.org/presentationml/2006/main">
+  <p:cSld>
+    <p:spTree>
+      <p:nvGrpSpPr>
+        <p:cNvPr id="1" name=""/>
+        <p:cNvGrpSpPr/>
+        <p:nvPr/>
+      </p:nvGrpSpPr>
+      <p:grpSpPr>
+        <a:xfrm>
+          <a:off x="0" y="0"/>
+          <a:ext cx="0" cy="0"/>
+          <a:chOff x="0" y="0"/>
+          <a:chExt cx="0" cy="0"/>
+        </a:xfrm>
+      </p:grpSpPr>
+      <p:sp>
+        <p:nvSpPr>
+          <p:cNvPr id="2" name="Slide Image Placeholder 1"/>
+          <p:cNvSpPr>
+            <a:spLocks noGrp="1" noRot="1" noChangeAspect="1"/>
+          </p:cNvSpPr>
+          <p:nvPr>
+            <p:ph type="sldImg"/>
+          </p:nvPr>
+        </p:nvSpPr>
+        <p:spPr/>
+      </p:sp>
+      <p:sp>
+        <p:nvSpPr>
+          <p:cNvPr id="3" name="Notes Placeholder 2"/>
+          <p:cNvSpPr>
+            <a:spLocks noGrp="1"/>
+          </p:cNvSpPr>
+          <p:nvPr>
+            <p:ph type="body" idx="1"/>
+          </p:nvPr>
+        </p:nvSpPr>
+        <p:spPr/>
+        <p:txBody>
+          <a:bodyPr/>
+          <a:lstStyle/>
+          <a:p>
+            <a:endParaRPr lang="en-US" dirty="0"/>
+          </a:p>
+        </p:txBody>
+      </p:sp>
+      <p:sp>
+        <p:nvSpPr>
+          <p:cNvPr id="4" name="Slide Number Placeholder 3"/>
+          <p:cNvSpPr>
+            <a:spLocks noGrp="1"/>
+          </p:cNvSpPr>
+          <p:nvPr>
+            <p:ph type="sldNum" sz="quarter" idx="10"/>
+          </p:nvPr>
+        </p:nvSpPr>
+        <p:spPr/>
+        <p:txBody>
+          <a:bodyPr/>
+          <a:lstStyle/>
+          <a:p>
+            <a:fld id="{65102967-BEC4-0F46-A022-1564C826E33F}" type="slidenum">
+              <a:rPr lang="en-US" smtClean="0"/>
+              <a:t>14</a:t>
+            </a:fld>
+            <a:endParaRPr lang="en-US"/>
+          </a:p>
+        </p:txBody>
+      </p:sp>
+    </p:spTree>
+    <p:extLst>
+      <p:ext uri="{BB962C8B-B14F-4D97-AF65-F5344CB8AC3E}">
+        <p14:creationId xmlns:p14="http://schemas.microsoft.com/office/powerpoint/2010/main" val="740614714"/>
+      </p:ext>
+    </p:extLst>
+  </p:cSld>
+  <p:clrMapOvr>
+    <a:masterClrMapping/>
+  </p:clrMapOvr>
+</p:notes>
+</file>
+
+<file path=ppt/notesSlides/notesSlide15.xml><?xml version="1.0" encoding="utf-8"?>
+<p:notes xmlns:a="http://schemas.openxmlformats.org/drawingml/2006/main" xmlns:r="http://schemas.openxmlformats.org/officeDocument/2006/relationships" xmlns:p="http://schemas.openxmlformats.org/presentationml/2006/main">
+  <p:cSld>
+    <p:spTree>
+      <p:nvGrpSpPr>
+        <p:cNvPr id="1" name=""/>
+        <p:cNvGrpSpPr/>
+        <p:nvPr/>
+      </p:nvGrpSpPr>
+      <p:grpSpPr>
+        <a:xfrm>
+          <a:off x="0" y="0"/>
+          <a:ext cx="0" cy="0"/>
+          <a:chOff x="0" y="0"/>
+          <a:chExt cx="0" cy="0"/>
+        </a:xfrm>
+      </p:grpSpPr>
+      <p:sp>
+        <p:nvSpPr>
+          <p:cNvPr id="2" name="Slide Image Placeholder 1"/>
+          <p:cNvSpPr>
+            <a:spLocks noGrp="1" noRot="1" noChangeAspect="1"/>
+          </p:cNvSpPr>
+          <p:nvPr>
+            <p:ph type="sldImg"/>
+          </p:nvPr>
+        </p:nvSpPr>
+        <p:spPr/>
+      </p:sp>
+      <p:sp>
+        <p:nvSpPr>
+          <p:cNvPr id="3" name="Notes Placeholder 2"/>
+          <p:cNvSpPr>
+            <a:spLocks noGrp="1"/>
+          </p:cNvSpPr>
+          <p:nvPr>
+            <p:ph type="body" idx="1"/>
+          </p:nvPr>
+        </p:nvSpPr>
+        <p:spPr/>
+        <p:txBody>
+          <a:bodyPr/>
+          <a:lstStyle/>
+          <a:p>
+            <a:pPr marL="0" indent="0">
+              <a:buFont typeface="Arial"/>
+              <a:buNone/>
+            </a:pPr>
+            <a:endParaRPr lang="en-US" dirty="0"/>
+          </a:p>
+        </p:txBody>
+      </p:sp>
+      <p:sp>
+        <p:nvSpPr>
+          <p:cNvPr id="4" name="Slide Number Placeholder 3"/>
+          <p:cNvSpPr>
+            <a:spLocks noGrp="1"/>
+          </p:cNvSpPr>
+          <p:nvPr>
+            <p:ph type="sldNum" sz="quarter" idx="10"/>
+          </p:nvPr>
+        </p:nvSpPr>
+        <p:spPr/>
+        <p:txBody>
+          <a:bodyPr/>
+          <a:lstStyle/>
+          <a:p>
+            <a:fld id="{65102967-BEC4-0F46-A022-1564C826E33F}" type="slidenum">
+              <a:rPr lang="en-US" smtClean="0"/>
+              <a:t>15</a:t>
+            </a:fld>
+            <a:endParaRPr lang="en-US"/>
+          </a:p>
+        </p:txBody>
+      </p:sp>
+    </p:spTree>
+    <p:extLst>
+      <p:ext uri="{BB962C8B-B14F-4D97-AF65-F5344CB8AC3E}">
+        <p14:creationId xmlns:p14="http://schemas.microsoft.com/office/powerpoint/2010/main" val="3991195823"/>
+      </p:ext>
+    </p:extLst>
+  </p:cSld>
+  <p:clrMapOvr>
+    <a:masterClrMapping/>
+  </p:clrMapOvr>
+</p:notes>
+</file>
+
+<file path=ppt/notesSlides/notesSlide16.xml><?xml version="1.0" encoding="utf-8"?>
+<p:notes xmlns:a="http://schemas.openxmlformats.org/drawingml/2006/main" xmlns:r="http://schemas.openxmlformats.org/officeDocument/2006/relationships" xmlns:p="http://schemas.openxmlformats.org/presentationml/2006/main">
+  <p:cSld>
+    <p:spTree>
+      <p:nvGrpSpPr>
+        <p:cNvPr id="1" name=""/>
+        <p:cNvGrpSpPr/>
+        <p:nvPr/>
+      </p:nvGrpSpPr>
+      <p:grpSpPr>
+        <a:xfrm>
+          <a:off x="0" y="0"/>
+          <a:ext cx="0" cy="0"/>
+          <a:chOff x="0" y="0"/>
+          <a:chExt cx="0" cy="0"/>
+        </a:xfrm>
+      </p:grpSpPr>
+      <p:sp>
+        <p:nvSpPr>
+          <p:cNvPr id="2" name="Slide Image Placeholder 1"/>
+          <p:cNvSpPr>
+            <a:spLocks noGrp="1" noRot="1" noChangeAspect="1"/>
+          </p:cNvSpPr>
+          <p:nvPr>
+            <p:ph type="sldImg"/>
+          </p:nvPr>
+        </p:nvSpPr>
+        <p:spPr/>
+      </p:sp>
+      <p:sp>
+        <p:nvSpPr>
+          <p:cNvPr id="3" name="Notes Placeholder 2"/>
+          <p:cNvSpPr>
+            <a:spLocks noGrp="1"/>
+          </p:cNvSpPr>
+          <p:nvPr>
+            <p:ph type="body" idx="1"/>
+          </p:nvPr>
+        </p:nvSpPr>
+        <p:spPr/>
+        <p:txBody>
+          <a:bodyPr/>
+          <a:lstStyle/>
+          <a:p>
+            <a:pPr marL="0" indent="0">
+              <a:buFont typeface="Arial"/>
+              <a:buNone/>
+            </a:pPr>
+            <a:endParaRPr lang="en-US" dirty="0"/>
+          </a:p>
+        </p:txBody>
+      </p:sp>
+      <p:sp>
+        <p:nvSpPr>
+          <p:cNvPr id="4" name="Slide Number Placeholder 3"/>
+          <p:cNvSpPr>
+            <a:spLocks noGrp="1"/>
+          </p:cNvSpPr>
+          <p:nvPr>
+            <p:ph type="sldNum" sz="quarter" idx="10"/>
+          </p:nvPr>
+        </p:nvSpPr>
+        <p:spPr/>
+        <p:txBody>
+          <a:bodyPr/>
+          <a:lstStyle/>
+          <a:p>
+            <a:fld id="{65102967-BEC4-0F46-A022-1564C826E33F}" type="slidenum">
+              <a:rPr lang="en-US" smtClean="0"/>
+              <a:t>16</a:t>
             </a:fld>
             <a:endParaRPr lang="en-US"/>
           </a:p>
@@ -9341,7 +9604,7 @@
           <a:graphicData uri="http://schemas.openxmlformats.org/presentationml/2006/ole">
             <mc:AlternateContent xmlns:mc="http://schemas.openxmlformats.org/markup-compatibility/2006">
               <mc:Choice xmlns:v="urn:schemas-microsoft-com:vml" Requires="v">
-                <p:oleObj spid="_x0000_s1032" name="Equation" r:id="rId7" imgW="1308100" imgH="546100" progId="Equation.3">
+                <p:oleObj spid="_x0000_s1042" name="Equation" r:id="rId7" imgW="1308100" imgH="546100" progId="Equation.3">
                   <p:embed/>
                 </p:oleObj>
               </mc:Choice>
@@ -9398,7 +9661,7 @@
           <a:graphicData uri="http://schemas.openxmlformats.org/presentationml/2006/ole">
             <mc:AlternateContent xmlns:mc="http://schemas.openxmlformats.org/markup-compatibility/2006">
               <mc:Choice xmlns:v="urn:schemas-microsoft-com:vml" Requires="v">
-                <p:oleObj spid="_x0000_s1033" name="Equation" r:id="rId9" imgW="1181100" imgH="482600" progId="Equation.3">
+                <p:oleObj spid="_x0000_s1043" name="Equation" r:id="rId9" imgW="1181100" imgH="482600" progId="Equation.3">
                   <p:embed/>
                 </p:oleObj>
               </mc:Choice>
@@ -9758,6 +10021,2463 @@
 </p:sld>
 </file>
 
+<file path=ppt/slides/slide14.xml><?xml version="1.0" encoding="utf-8"?>
+<p:sld xmlns:a="http://schemas.openxmlformats.org/drawingml/2006/main" xmlns:r="http://schemas.openxmlformats.org/officeDocument/2006/relationships" xmlns:p="http://schemas.openxmlformats.org/presentationml/2006/main">
+  <p:cSld>
+    <p:spTree>
+      <p:nvGrpSpPr>
+        <p:cNvPr id="1" name=""/>
+        <p:cNvGrpSpPr/>
+        <p:nvPr/>
+      </p:nvGrpSpPr>
+      <p:grpSpPr>
+        <a:xfrm>
+          <a:off x="0" y="0"/>
+          <a:ext cx="0" cy="0"/>
+          <a:chOff x="0" y="0"/>
+          <a:chExt cx="0" cy="0"/>
+        </a:xfrm>
+      </p:grpSpPr>
+      <p:sp>
+        <p:nvSpPr>
+          <p:cNvPr id="2" name="Title 1"/>
+          <p:cNvSpPr>
+            <a:spLocks noGrp="1"/>
+          </p:cNvSpPr>
+          <p:nvPr>
+            <p:ph type="title"/>
+          </p:nvPr>
+        </p:nvSpPr>
+        <p:spPr/>
+        <p:txBody>
+          <a:bodyPr>
+            <a:normAutofit fontScale="90000"/>
+          </a:bodyPr>
+          <a:lstStyle/>
+          <a:p>
+            <a:r>
+              <a:rPr lang="en-US" dirty="0" smtClean="0"/>
+              <a:t>Observables Spectrum from Geant4</a:t>
+            </a:r>
+            <a:endParaRPr lang="en-US" dirty="0"/>
+          </a:p>
+        </p:txBody>
+      </p:sp>
+      <p:sp>
+        <p:nvSpPr>
+          <p:cNvPr id="3" name="Content Placeholder 2"/>
+          <p:cNvSpPr>
+            <a:spLocks noGrp="1"/>
+          </p:cNvSpPr>
+          <p:nvPr>
+            <p:ph idx="1"/>
+          </p:nvPr>
+        </p:nvSpPr>
+        <p:spPr>
+          <a:xfrm>
+            <a:off x="2994270" y="5946529"/>
+            <a:ext cx="3155461" cy="833315"/>
+          </a:xfrm>
+          <a:solidFill>
+            <a:schemeClr val="bg2">
+              <a:lumMod val="90000"/>
+            </a:schemeClr>
+          </a:solidFill>
+          <a:ln>
+            <a:solidFill>
+              <a:schemeClr val="tx1"/>
+            </a:solidFill>
+          </a:ln>
+        </p:spPr>
+        <p:txBody>
+          <a:bodyPr anchor="ctr">
+            <a:normAutofit/>
+          </a:bodyPr>
+          <a:lstStyle/>
+          <a:p>
+            <a:pPr marL="0" indent="0" algn="ctr">
+              <a:buNone/>
+            </a:pPr>
+            <a:r>
+              <a:rPr lang="en-US" dirty="0" smtClean="0"/>
+              <a:t>Corrected Observables Data Spectrum</a:t>
+            </a:r>
+          </a:p>
+        </p:txBody>
+      </p:sp>
+      <p:sp>
+        <p:nvSpPr>
+          <p:cNvPr id="4" name="Date Placeholder 3"/>
+          <p:cNvSpPr>
+            <a:spLocks noGrp="1"/>
+          </p:cNvSpPr>
+          <p:nvPr>
+            <p:ph type="dt" sz="half" idx="10"/>
+          </p:nvPr>
+        </p:nvSpPr>
+        <p:spPr/>
+        <p:txBody>
+          <a:bodyPr/>
+          <a:lstStyle/>
+          <a:p>
+            <a:r>
+              <a:rPr lang="en-US" smtClean="0"/>
+              <a:t>7/7/16</a:t>
+            </a:r>
+            <a:endParaRPr lang="en-US"/>
+          </a:p>
+        </p:txBody>
+      </p:sp>
+      <p:sp>
+        <p:nvSpPr>
+          <p:cNvPr id="5" name="Footer Placeholder 4"/>
+          <p:cNvSpPr>
+            <a:spLocks noGrp="1"/>
+          </p:cNvSpPr>
+          <p:nvPr>
+            <p:ph type="ftr" sz="quarter" idx="11"/>
+          </p:nvPr>
+        </p:nvSpPr>
+        <p:spPr/>
+        <p:txBody>
+          <a:bodyPr/>
+          <a:lstStyle/>
+          <a:p>
+            <a:r>
+              <a:rPr lang="en-US" smtClean="0"/>
+              <a:t>Matthew D. Anthony</a:t>
+            </a:r>
+            <a:endParaRPr lang="en-US"/>
+          </a:p>
+        </p:txBody>
+      </p:sp>
+      <p:sp>
+        <p:nvSpPr>
+          <p:cNvPr id="6" name="Slide Number Placeholder 5"/>
+          <p:cNvSpPr>
+            <a:spLocks noGrp="1"/>
+          </p:cNvSpPr>
+          <p:nvPr>
+            <p:ph type="sldNum" sz="quarter" idx="12"/>
+          </p:nvPr>
+        </p:nvSpPr>
+        <p:spPr/>
+        <p:txBody>
+          <a:bodyPr/>
+          <a:lstStyle/>
+          <a:p>
+            <a:fld id="{CFE4BAC9-6D41-4691-9299-18EF07EF0177}" type="slidenum">
+              <a:rPr lang="en-US" smtClean="0"/>
+              <a:t>14</a:t>
+            </a:fld>
+            <a:endParaRPr lang="en-US"/>
+          </a:p>
+        </p:txBody>
+      </p:sp>
+      <p:sp>
+        <p:nvSpPr>
+          <p:cNvPr id="24" name="Content Placeholder 2"/>
+          <p:cNvSpPr txBox="1">
+            <a:spLocks/>
+          </p:cNvSpPr>
+          <p:nvPr/>
+        </p:nvSpPr>
+        <p:spPr>
+          <a:xfrm>
+            <a:off x="2080847" y="1393105"/>
+            <a:ext cx="4982307" cy="541208"/>
+          </a:xfrm>
+          <a:prstGeom prst="rect">
+            <a:avLst/>
+          </a:prstGeom>
+          <a:solidFill>
+            <a:schemeClr val="bg2">
+              <a:lumMod val="90000"/>
+            </a:schemeClr>
+          </a:solidFill>
+          <a:ln>
+            <a:solidFill>
+              <a:schemeClr val="tx1"/>
+            </a:solidFill>
+          </a:ln>
+        </p:spPr>
+        <p:txBody>
+          <a:bodyPr vert="horz" lIns="91440" tIns="45720" rIns="91440" bIns="45720" rtlCol="0" anchor="ctr">
+            <a:normAutofit/>
+          </a:bodyPr>
+          <a:lstStyle>
+            <a:lvl1pPr marL="182880" indent="-182880" algn="l" defTabSz="914400" rtl="0" eaLnBrk="1" latinLnBrk="0" hangingPunct="1">
+              <a:spcBef>
+                <a:spcPct val="20000"/>
+              </a:spcBef>
+              <a:buClr>
+                <a:schemeClr val="accent1"/>
+              </a:buClr>
+              <a:buSzPct val="85000"/>
+              <a:buFont typeface="Arial" pitchFamily="34" charset="0"/>
+              <a:buChar char="•"/>
+              <a:defRPr sz="2000" kern="1200">
+                <a:solidFill>
+                  <a:schemeClr val="tx1"/>
+                </a:solidFill>
+                <a:latin typeface="Lucida Fax"/>
+                <a:ea typeface="+mn-ea"/>
+                <a:cs typeface="+mn-cs"/>
+              </a:defRPr>
+            </a:lvl1pPr>
+            <a:lvl2pPr marL="457200" indent="-182880" algn="l" defTabSz="914400" rtl="0" eaLnBrk="1" latinLnBrk="0" hangingPunct="1">
+              <a:spcBef>
+                <a:spcPct val="20000"/>
+              </a:spcBef>
+              <a:buClr>
+                <a:schemeClr val="accent1"/>
+              </a:buClr>
+              <a:buSzPct val="85000"/>
+              <a:buFont typeface="Arial" pitchFamily="34" charset="0"/>
+              <a:buChar char="•"/>
+              <a:defRPr sz="1800" kern="1200">
+                <a:solidFill>
+                  <a:schemeClr val="tx1"/>
+                </a:solidFill>
+                <a:latin typeface="Lucida Fax"/>
+                <a:ea typeface="+mn-ea"/>
+                <a:cs typeface="+mn-cs"/>
+              </a:defRPr>
+            </a:lvl2pPr>
+            <a:lvl3pPr marL="731520" indent="-182880" algn="l" defTabSz="914400" rtl="0" eaLnBrk="1" latinLnBrk="0" hangingPunct="1">
+              <a:spcBef>
+                <a:spcPct val="20000"/>
+              </a:spcBef>
+              <a:buClr>
+                <a:schemeClr val="accent1"/>
+              </a:buClr>
+              <a:buSzPct val="90000"/>
+              <a:buFont typeface="Arial" pitchFamily="34" charset="0"/>
+              <a:buChar char="•"/>
+              <a:defRPr sz="1600" kern="1200">
+                <a:solidFill>
+                  <a:schemeClr val="tx1"/>
+                </a:solidFill>
+                <a:latin typeface="Lucida Fax"/>
+                <a:ea typeface="+mn-ea"/>
+                <a:cs typeface="+mn-cs"/>
+              </a:defRPr>
+            </a:lvl3pPr>
+            <a:lvl4pPr marL="1005840" indent="-182880" algn="l" defTabSz="914400" rtl="0" eaLnBrk="1" latinLnBrk="0" hangingPunct="1">
+              <a:spcBef>
+                <a:spcPct val="20000"/>
+              </a:spcBef>
+              <a:buClr>
+                <a:schemeClr val="accent1"/>
+              </a:buClr>
+              <a:buFont typeface="Arial" pitchFamily="34" charset="0"/>
+              <a:buChar char="•"/>
+              <a:defRPr sz="1400" kern="1200">
+                <a:solidFill>
+                  <a:schemeClr val="tx1"/>
+                </a:solidFill>
+                <a:latin typeface="Lucida Fax"/>
+                <a:ea typeface="+mn-ea"/>
+                <a:cs typeface="+mn-cs"/>
+              </a:defRPr>
+            </a:lvl4pPr>
+            <a:lvl5pPr marL="1188720" indent="-137160" algn="l" defTabSz="914400" rtl="0" eaLnBrk="1" latinLnBrk="0" hangingPunct="1">
+              <a:spcBef>
+                <a:spcPct val="20000"/>
+              </a:spcBef>
+              <a:buClr>
+                <a:schemeClr val="accent1"/>
+              </a:buClr>
+              <a:buSzPct val="100000"/>
+              <a:buFont typeface="Arial" pitchFamily="34" charset="0"/>
+              <a:buChar char="•"/>
+              <a:defRPr sz="1200" kern="1200" baseline="0">
+                <a:solidFill>
+                  <a:schemeClr val="tx1"/>
+                </a:solidFill>
+                <a:latin typeface="Lucida Fax"/>
+                <a:ea typeface="+mn-ea"/>
+                <a:cs typeface="+mn-cs"/>
+              </a:defRPr>
+            </a:lvl5pPr>
+            <a:lvl6pPr marL="1371600" indent="-182880" algn="l" defTabSz="914400" rtl="0" eaLnBrk="1" latinLnBrk="0" hangingPunct="1">
+              <a:spcBef>
+                <a:spcPct val="20000"/>
+              </a:spcBef>
+              <a:buClr>
+                <a:schemeClr val="accent1"/>
+              </a:buClr>
+              <a:buFont typeface="Arial" pitchFamily="34" charset="0"/>
+              <a:buChar char="•"/>
+              <a:defRPr sz="1300" kern="1200">
+                <a:solidFill>
+                  <a:schemeClr val="tx1"/>
+                </a:solidFill>
+                <a:latin typeface="+mn-lt"/>
+                <a:ea typeface="+mn-ea"/>
+                <a:cs typeface="+mn-cs"/>
+              </a:defRPr>
+            </a:lvl6pPr>
+            <a:lvl7pPr marL="1554480" indent="-182880" algn="l" defTabSz="914400" rtl="0" eaLnBrk="1" latinLnBrk="0" hangingPunct="1">
+              <a:spcBef>
+                <a:spcPct val="20000"/>
+              </a:spcBef>
+              <a:buClr>
+                <a:schemeClr val="accent1"/>
+              </a:buClr>
+              <a:buFont typeface="Arial" pitchFamily="34" charset="0"/>
+              <a:buChar char="•"/>
+              <a:defRPr sz="1300" kern="1200">
+                <a:solidFill>
+                  <a:schemeClr val="tx1"/>
+                </a:solidFill>
+                <a:latin typeface="+mn-lt"/>
+                <a:ea typeface="+mn-ea"/>
+                <a:cs typeface="+mn-cs"/>
+              </a:defRPr>
+            </a:lvl7pPr>
+            <a:lvl8pPr marL="1737360" indent="-182880" algn="l" defTabSz="914400" rtl="0" eaLnBrk="1" latinLnBrk="0" hangingPunct="1">
+              <a:spcBef>
+                <a:spcPct val="20000"/>
+              </a:spcBef>
+              <a:buClr>
+                <a:schemeClr val="accent1"/>
+              </a:buClr>
+              <a:buFont typeface="Arial" pitchFamily="34" charset="0"/>
+              <a:buChar char="•"/>
+              <a:defRPr sz="1300" kern="1200">
+                <a:solidFill>
+                  <a:schemeClr val="tx1"/>
+                </a:solidFill>
+                <a:latin typeface="+mn-lt"/>
+                <a:ea typeface="+mn-ea"/>
+                <a:cs typeface="+mn-cs"/>
+              </a:defRPr>
+            </a:lvl8pPr>
+            <a:lvl9pPr marL="1920240" indent="-182880" algn="l" defTabSz="914400" rtl="0" eaLnBrk="1" latinLnBrk="0" hangingPunct="1">
+              <a:spcBef>
+                <a:spcPct val="20000"/>
+              </a:spcBef>
+              <a:buClr>
+                <a:schemeClr val="accent1"/>
+              </a:buClr>
+              <a:buFont typeface="Arial" pitchFamily="34" charset="0"/>
+              <a:buChar char="•"/>
+              <a:defRPr sz="1300" kern="1200">
+                <a:solidFill>
+                  <a:schemeClr val="tx1"/>
+                </a:solidFill>
+                <a:latin typeface="+mn-lt"/>
+                <a:ea typeface="+mn-ea"/>
+                <a:cs typeface="+mn-cs"/>
+              </a:defRPr>
+            </a:lvl9pPr>
+          </a:lstStyle>
+          <a:p>
+            <a:pPr marL="0" indent="0" algn="ctr">
+              <a:buNone/>
+            </a:pPr>
+            <a:r>
+              <a:rPr lang="en-US" dirty="0"/>
+              <a:t>Energy Spectrum from Geant4</a:t>
+            </a:r>
+          </a:p>
+        </p:txBody>
+      </p:sp>
+      <p:cxnSp>
+        <p:nvCxnSpPr>
+          <p:cNvPr id="25" name="Straight Arrow Connector 24"/>
+          <p:cNvCxnSpPr/>
+          <p:nvPr/>
+        </p:nvCxnSpPr>
+        <p:spPr>
+          <a:xfrm flipH="1">
+            <a:off x="2305539" y="2000752"/>
+            <a:ext cx="371231" cy="324324"/>
+          </a:xfrm>
+          <a:prstGeom prst="straightConnector1">
+            <a:avLst/>
+          </a:prstGeom>
+          <a:ln w="38100" cmpd="sng">
+            <a:tailEnd type="arrow"/>
+          </a:ln>
+        </p:spPr>
+        <p:style>
+          <a:lnRef idx="2">
+            <a:schemeClr val="accent1"/>
+          </a:lnRef>
+          <a:fillRef idx="0">
+            <a:schemeClr val="accent1"/>
+          </a:fillRef>
+          <a:effectRef idx="1">
+            <a:schemeClr val="accent1"/>
+          </a:effectRef>
+          <a:fontRef idx="minor">
+            <a:schemeClr val="tx1"/>
+          </a:fontRef>
+        </p:style>
+      </p:cxnSp>
+      <p:sp>
+        <p:nvSpPr>
+          <p:cNvPr id="17" name="Content Placeholder 2"/>
+          <p:cNvSpPr txBox="1">
+            <a:spLocks/>
+          </p:cNvSpPr>
+          <p:nvPr/>
+        </p:nvSpPr>
+        <p:spPr>
+          <a:xfrm>
+            <a:off x="501162" y="2423759"/>
+            <a:ext cx="2713892" cy="632500"/>
+          </a:xfrm>
+          <a:prstGeom prst="rect">
+            <a:avLst/>
+          </a:prstGeom>
+          <a:pattFill prst="pct10">
+            <a:fgClr>
+              <a:srgbClr val="0000FF"/>
+            </a:fgClr>
+            <a:bgClr>
+              <a:prstClr val="white"/>
+            </a:bgClr>
+          </a:pattFill>
+          <a:ln>
+            <a:solidFill>
+              <a:schemeClr val="tx1"/>
+            </a:solidFill>
+          </a:ln>
+        </p:spPr>
+        <p:txBody>
+          <a:bodyPr vert="horz" lIns="91440" tIns="45720" rIns="91440" bIns="45720" rtlCol="0" anchor="ctr">
+            <a:normAutofit fontScale="92500"/>
+          </a:bodyPr>
+          <a:lstStyle>
+            <a:lvl1pPr marL="182880" indent="-182880" algn="l" defTabSz="914400" rtl="0" eaLnBrk="1" latinLnBrk="0" hangingPunct="1">
+              <a:spcBef>
+                <a:spcPct val="20000"/>
+              </a:spcBef>
+              <a:buClr>
+                <a:schemeClr val="accent1"/>
+              </a:buClr>
+              <a:buSzPct val="85000"/>
+              <a:buFont typeface="Arial" pitchFamily="34" charset="0"/>
+              <a:buChar char="•"/>
+              <a:defRPr sz="2000" kern="1200">
+                <a:solidFill>
+                  <a:schemeClr val="tx1"/>
+                </a:solidFill>
+                <a:latin typeface="Lucida Fax"/>
+                <a:ea typeface="+mn-ea"/>
+                <a:cs typeface="+mn-cs"/>
+              </a:defRPr>
+            </a:lvl1pPr>
+            <a:lvl2pPr marL="457200" indent="-182880" algn="l" defTabSz="914400" rtl="0" eaLnBrk="1" latinLnBrk="0" hangingPunct="1">
+              <a:spcBef>
+                <a:spcPct val="20000"/>
+              </a:spcBef>
+              <a:buClr>
+                <a:schemeClr val="accent1"/>
+              </a:buClr>
+              <a:buSzPct val="85000"/>
+              <a:buFont typeface="Arial" pitchFamily="34" charset="0"/>
+              <a:buChar char="•"/>
+              <a:defRPr sz="1800" kern="1200">
+                <a:solidFill>
+                  <a:schemeClr val="tx1"/>
+                </a:solidFill>
+                <a:latin typeface="Lucida Fax"/>
+                <a:ea typeface="+mn-ea"/>
+                <a:cs typeface="+mn-cs"/>
+              </a:defRPr>
+            </a:lvl2pPr>
+            <a:lvl3pPr marL="731520" indent="-182880" algn="l" defTabSz="914400" rtl="0" eaLnBrk="1" latinLnBrk="0" hangingPunct="1">
+              <a:spcBef>
+                <a:spcPct val="20000"/>
+              </a:spcBef>
+              <a:buClr>
+                <a:schemeClr val="accent1"/>
+              </a:buClr>
+              <a:buSzPct val="90000"/>
+              <a:buFont typeface="Arial" pitchFamily="34" charset="0"/>
+              <a:buChar char="•"/>
+              <a:defRPr sz="1600" kern="1200">
+                <a:solidFill>
+                  <a:schemeClr val="tx1"/>
+                </a:solidFill>
+                <a:latin typeface="Lucida Fax"/>
+                <a:ea typeface="+mn-ea"/>
+                <a:cs typeface="+mn-cs"/>
+              </a:defRPr>
+            </a:lvl3pPr>
+            <a:lvl4pPr marL="1005840" indent="-182880" algn="l" defTabSz="914400" rtl="0" eaLnBrk="1" latinLnBrk="0" hangingPunct="1">
+              <a:spcBef>
+                <a:spcPct val="20000"/>
+              </a:spcBef>
+              <a:buClr>
+                <a:schemeClr val="accent1"/>
+              </a:buClr>
+              <a:buFont typeface="Arial" pitchFamily="34" charset="0"/>
+              <a:buChar char="•"/>
+              <a:defRPr sz="1400" kern="1200">
+                <a:solidFill>
+                  <a:schemeClr val="tx1"/>
+                </a:solidFill>
+                <a:latin typeface="Lucida Fax"/>
+                <a:ea typeface="+mn-ea"/>
+                <a:cs typeface="+mn-cs"/>
+              </a:defRPr>
+            </a:lvl4pPr>
+            <a:lvl5pPr marL="1188720" indent="-137160" algn="l" defTabSz="914400" rtl="0" eaLnBrk="1" latinLnBrk="0" hangingPunct="1">
+              <a:spcBef>
+                <a:spcPct val="20000"/>
+              </a:spcBef>
+              <a:buClr>
+                <a:schemeClr val="accent1"/>
+              </a:buClr>
+              <a:buSzPct val="100000"/>
+              <a:buFont typeface="Arial" pitchFamily="34" charset="0"/>
+              <a:buChar char="•"/>
+              <a:defRPr sz="1200" kern="1200" baseline="0">
+                <a:solidFill>
+                  <a:schemeClr val="tx1"/>
+                </a:solidFill>
+                <a:latin typeface="Lucida Fax"/>
+                <a:ea typeface="+mn-ea"/>
+                <a:cs typeface="+mn-cs"/>
+              </a:defRPr>
+            </a:lvl5pPr>
+            <a:lvl6pPr marL="1371600" indent="-182880" algn="l" defTabSz="914400" rtl="0" eaLnBrk="1" latinLnBrk="0" hangingPunct="1">
+              <a:spcBef>
+                <a:spcPct val="20000"/>
+              </a:spcBef>
+              <a:buClr>
+                <a:schemeClr val="accent1"/>
+              </a:buClr>
+              <a:buFont typeface="Arial" pitchFamily="34" charset="0"/>
+              <a:buChar char="•"/>
+              <a:defRPr sz="1300" kern="1200">
+                <a:solidFill>
+                  <a:schemeClr val="tx1"/>
+                </a:solidFill>
+                <a:latin typeface="+mn-lt"/>
+                <a:ea typeface="+mn-ea"/>
+                <a:cs typeface="+mn-cs"/>
+              </a:defRPr>
+            </a:lvl6pPr>
+            <a:lvl7pPr marL="1554480" indent="-182880" algn="l" defTabSz="914400" rtl="0" eaLnBrk="1" latinLnBrk="0" hangingPunct="1">
+              <a:spcBef>
+                <a:spcPct val="20000"/>
+              </a:spcBef>
+              <a:buClr>
+                <a:schemeClr val="accent1"/>
+              </a:buClr>
+              <a:buFont typeface="Arial" pitchFamily="34" charset="0"/>
+              <a:buChar char="•"/>
+              <a:defRPr sz="1300" kern="1200">
+                <a:solidFill>
+                  <a:schemeClr val="tx1"/>
+                </a:solidFill>
+                <a:latin typeface="+mn-lt"/>
+                <a:ea typeface="+mn-ea"/>
+                <a:cs typeface="+mn-cs"/>
+              </a:defRPr>
+            </a:lvl7pPr>
+            <a:lvl8pPr marL="1737360" indent="-182880" algn="l" defTabSz="914400" rtl="0" eaLnBrk="1" latinLnBrk="0" hangingPunct="1">
+              <a:spcBef>
+                <a:spcPct val="20000"/>
+              </a:spcBef>
+              <a:buClr>
+                <a:schemeClr val="accent1"/>
+              </a:buClr>
+              <a:buFont typeface="Arial" pitchFamily="34" charset="0"/>
+              <a:buChar char="•"/>
+              <a:defRPr sz="1300" kern="1200">
+                <a:solidFill>
+                  <a:schemeClr val="tx1"/>
+                </a:solidFill>
+                <a:latin typeface="+mn-lt"/>
+                <a:ea typeface="+mn-ea"/>
+                <a:cs typeface="+mn-cs"/>
+              </a:defRPr>
+            </a:lvl8pPr>
+            <a:lvl9pPr marL="1920240" indent="-182880" algn="l" defTabSz="914400" rtl="0" eaLnBrk="1" latinLnBrk="0" hangingPunct="1">
+              <a:spcBef>
+                <a:spcPct val="20000"/>
+              </a:spcBef>
+              <a:buClr>
+                <a:schemeClr val="accent1"/>
+              </a:buClr>
+              <a:buFont typeface="Arial" pitchFamily="34" charset="0"/>
+              <a:buChar char="•"/>
+              <a:defRPr sz="1300" kern="1200">
+                <a:solidFill>
+                  <a:schemeClr val="tx1"/>
+                </a:solidFill>
+                <a:latin typeface="+mn-lt"/>
+                <a:ea typeface="+mn-ea"/>
+                <a:cs typeface="+mn-cs"/>
+              </a:defRPr>
+            </a:lvl9pPr>
+          </a:lstStyle>
+          <a:p>
+            <a:pPr marL="0" indent="0" algn="ctr">
+              <a:buFont typeface="Arial" pitchFamily="34" charset="0"/>
+              <a:buNone/>
+            </a:pPr>
+            <a:r>
+              <a:rPr lang="en-US" dirty="0" smtClean="0"/>
+              <a:t>Photon/Charge Yield</a:t>
+            </a:r>
+          </a:p>
+        </p:txBody>
+      </p:sp>
+      <p:sp>
+        <p:nvSpPr>
+          <p:cNvPr id="20" name="Content Placeholder 2"/>
+          <p:cNvSpPr txBox="1">
+            <a:spLocks/>
+          </p:cNvSpPr>
+          <p:nvPr/>
+        </p:nvSpPr>
+        <p:spPr>
+          <a:xfrm>
+            <a:off x="4348285" y="2423759"/>
+            <a:ext cx="1259253" cy="632500"/>
+          </a:xfrm>
+          <a:prstGeom prst="rect">
+            <a:avLst/>
+          </a:prstGeom>
+          <a:solidFill>
+            <a:srgbClr val="FFFF00"/>
+          </a:solidFill>
+          <a:ln>
+            <a:solidFill>
+              <a:schemeClr val="tx1"/>
+            </a:solidFill>
+          </a:ln>
+        </p:spPr>
+        <p:txBody>
+          <a:bodyPr vert="horz" lIns="91440" tIns="45720" rIns="91440" bIns="45720" rtlCol="0" anchor="ctr">
+            <a:normAutofit/>
+          </a:bodyPr>
+          <a:lstStyle>
+            <a:lvl1pPr marL="182880" indent="-182880" algn="l" defTabSz="914400" rtl="0" eaLnBrk="1" latinLnBrk="0" hangingPunct="1">
+              <a:spcBef>
+                <a:spcPct val="20000"/>
+              </a:spcBef>
+              <a:buClr>
+                <a:schemeClr val="accent1"/>
+              </a:buClr>
+              <a:buSzPct val="85000"/>
+              <a:buFont typeface="Arial" pitchFamily="34" charset="0"/>
+              <a:buChar char="•"/>
+              <a:defRPr sz="2000" kern="1200">
+                <a:solidFill>
+                  <a:schemeClr val="tx1"/>
+                </a:solidFill>
+                <a:latin typeface="Lucida Fax"/>
+                <a:ea typeface="+mn-ea"/>
+                <a:cs typeface="+mn-cs"/>
+              </a:defRPr>
+            </a:lvl1pPr>
+            <a:lvl2pPr marL="457200" indent="-182880" algn="l" defTabSz="914400" rtl="0" eaLnBrk="1" latinLnBrk="0" hangingPunct="1">
+              <a:spcBef>
+                <a:spcPct val="20000"/>
+              </a:spcBef>
+              <a:buClr>
+                <a:schemeClr val="accent1"/>
+              </a:buClr>
+              <a:buSzPct val="85000"/>
+              <a:buFont typeface="Arial" pitchFamily="34" charset="0"/>
+              <a:buChar char="•"/>
+              <a:defRPr sz="1800" kern="1200">
+                <a:solidFill>
+                  <a:schemeClr val="tx1"/>
+                </a:solidFill>
+                <a:latin typeface="Lucida Fax"/>
+                <a:ea typeface="+mn-ea"/>
+                <a:cs typeface="+mn-cs"/>
+              </a:defRPr>
+            </a:lvl2pPr>
+            <a:lvl3pPr marL="731520" indent="-182880" algn="l" defTabSz="914400" rtl="0" eaLnBrk="1" latinLnBrk="0" hangingPunct="1">
+              <a:spcBef>
+                <a:spcPct val="20000"/>
+              </a:spcBef>
+              <a:buClr>
+                <a:schemeClr val="accent1"/>
+              </a:buClr>
+              <a:buSzPct val="90000"/>
+              <a:buFont typeface="Arial" pitchFamily="34" charset="0"/>
+              <a:buChar char="•"/>
+              <a:defRPr sz="1600" kern="1200">
+                <a:solidFill>
+                  <a:schemeClr val="tx1"/>
+                </a:solidFill>
+                <a:latin typeface="Lucida Fax"/>
+                <a:ea typeface="+mn-ea"/>
+                <a:cs typeface="+mn-cs"/>
+              </a:defRPr>
+            </a:lvl3pPr>
+            <a:lvl4pPr marL="1005840" indent="-182880" algn="l" defTabSz="914400" rtl="0" eaLnBrk="1" latinLnBrk="0" hangingPunct="1">
+              <a:spcBef>
+                <a:spcPct val="20000"/>
+              </a:spcBef>
+              <a:buClr>
+                <a:schemeClr val="accent1"/>
+              </a:buClr>
+              <a:buFont typeface="Arial" pitchFamily="34" charset="0"/>
+              <a:buChar char="•"/>
+              <a:defRPr sz="1400" kern="1200">
+                <a:solidFill>
+                  <a:schemeClr val="tx1"/>
+                </a:solidFill>
+                <a:latin typeface="Lucida Fax"/>
+                <a:ea typeface="+mn-ea"/>
+                <a:cs typeface="+mn-cs"/>
+              </a:defRPr>
+            </a:lvl4pPr>
+            <a:lvl5pPr marL="1188720" indent="-137160" algn="l" defTabSz="914400" rtl="0" eaLnBrk="1" latinLnBrk="0" hangingPunct="1">
+              <a:spcBef>
+                <a:spcPct val="20000"/>
+              </a:spcBef>
+              <a:buClr>
+                <a:schemeClr val="accent1"/>
+              </a:buClr>
+              <a:buSzPct val="100000"/>
+              <a:buFont typeface="Arial" pitchFamily="34" charset="0"/>
+              <a:buChar char="•"/>
+              <a:defRPr sz="1200" kern="1200" baseline="0">
+                <a:solidFill>
+                  <a:schemeClr val="tx1"/>
+                </a:solidFill>
+                <a:latin typeface="Lucida Fax"/>
+                <a:ea typeface="+mn-ea"/>
+                <a:cs typeface="+mn-cs"/>
+              </a:defRPr>
+            </a:lvl5pPr>
+            <a:lvl6pPr marL="1371600" indent="-182880" algn="l" defTabSz="914400" rtl="0" eaLnBrk="1" latinLnBrk="0" hangingPunct="1">
+              <a:spcBef>
+                <a:spcPct val="20000"/>
+              </a:spcBef>
+              <a:buClr>
+                <a:schemeClr val="accent1"/>
+              </a:buClr>
+              <a:buFont typeface="Arial" pitchFamily="34" charset="0"/>
+              <a:buChar char="•"/>
+              <a:defRPr sz="1300" kern="1200">
+                <a:solidFill>
+                  <a:schemeClr val="tx1"/>
+                </a:solidFill>
+                <a:latin typeface="+mn-lt"/>
+                <a:ea typeface="+mn-ea"/>
+                <a:cs typeface="+mn-cs"/>
+              </a:defRPr>
+            </a:lvl6pPr>
+            <a:lvl7pPr marL="1554480" indent="-182880" algn="l" defTabSz="914400" rtl="0" eaLnBrk="1" latinLnBrk="0" hangingPunct="1">
+              <a:spcBef>
+                <a:spcPct val="20000"/>
+              </a:spcBef>
+              <a:buClr>
+                <a:schemeClr val="accent1"/>
+              </a:buClr>
+              <a:buFont typeface="Arial" pitchFamily="34" charset="0"/>
+              <a:buChar char="•"/>
+              <a:defRPr sz="1300" kern="1200">
+                <a:solidFill>
+                  <a:schemeClr val="tx1"/>
+                </a:solidFill>
+                <a:latin typeface="+mn-lt"/>
+                <a:ea typeface="+mn-ea"/>
+                <a:cs typeface="+mn-cs"/>
+              </a:defRPr>
+            </a:lvl7pPr>
+            <a:lvl8pPr marL="1737360" indent="-182880" algn="l" defTabSz="914400" rtl="0" eaLnBrk="1" latinLnBrk="0" hangingPunct="1">
+              <a:spcBef>
+                <a:spcPct val="20000"/>
+              </a:spcBef>
+              <a:buClr>
+                <a:schemeClr val="accent1"/>
+              </a:buClr>
+              <a:buFont typeface="Arial" pitchFamily="34" charset="0"/>
+              <a:buChar char="•"/>
+              <a:defRPr sz="1300" kern="1200">
+                <a:solidFill>
+                  <a:schemeClr val="tx1"/>
+                </a:solidFill>
+                <a:latin typeface="+mn-lt"/>
+                <a:ea typeface="+mn-ea"/>
+                <a:cs typeface="+mn-cs"/>
+              </a:defRPr>
+            </a:lvl8pPr>
+            <a:lvl9pPr marL="1920240" indent="-182880" algn="l" defTabSz="914400" rtl="0" eaLnBrk="1" latinLnBrk="0" hangingPunct="1">
+              <a:spcBef>
+                <a:spcPct val="20000"/>
+              </a:spcBef>
+              <a:buClr>
+                <a:schemeClr val="accent1"/>
+              </a:buClr>
+              <a:buFont typeface="Arial" pitchFamily="34" charset="0"/>
+              <a:buChar char="•"/>
+              <a:defRPr sz="1300" kern="1200">
+                <a:solidFill>
+                  <a:schemeClr val="tx1"/>
+                </a:solidFill>
+                <a:latin typeface="+mn-lt"/>
+                <a:ea typeface="+mn-ea"/>
+                <a:cs typeface="+mn-cs"/>
+              </a:defRPr>
+            </a:lvl9pPr>
+          </a:lstStyle>
+          <a:p>
+            <a:pPr marL="0" indent="0" algn="ctr">
+              <a:buFont typeface="Arial" pitchFamily="34" charset="0"/>
+              <a:buNone/>
+            </a:pPr>
+            <a:r>
+              <a:rPr lang="en-US" dirty="0"/>
+              <a:t>g</a:t>
+            </a:r>
+            <a:r>
+              <a:rPr lang="en-US" dirty="0" smtClean="0"/>
+              <a:t>1/g2</a:t>
+            </a:r>
+          </a:p>
+        </p:txBody>
+      </p:sp>
+      <p:cxnSp>
+        <p:nvCxnSpPr>
+          <p:cNvPr id="21" name="Straight Arrow Connector 20"/>
+          <p:cNvCxnSpPr/>
+          <p:nvPr/>
+        </p:nvCxnSpPr>
+        <p:spPr>
+          <a:xfrm>
+            <a:off x="3372338" y="2775901"/>
+            <a:ext cx="418124" cy="0"/>
+          </a:xfrm>
+          <a:prstGeom prst="straightConnector1">
+            <a:avLst/>
+          </a:prstGeom>
+          <a:ln w="38100" cmpd="sng">
+            <a:tailEnd type="arrow"/>
+          </a:ln>
+        </p:spPr>
+        <p:style>
+          <a:lnRef idx="2">
+            <a:schemeClr val="accent1"/>
+          </a:lnRef>
+          <a:fillRef idx="0">
+            <a:schemeClr val="accent1"/>
+          </a:fillRef>
+          <a:effectRef idx="1">
+            <a:schemeClr val="accent1"/>
+          </a:effectRef>
+          <a:fontRef idx="minor">
+            <a:schemeClr val="tx1"/>
+          </a:fontRef>
+        </p:style>
+      </p:cxnSp>
+      <p:cxnSp>
+        <p:nvCxnSpPr>
+          <p:cNvPr id="23" name="Straight Arrow Connector 22"/>
+          <p:cNvCxnSpPr/>
+          <p:nvPr/>
+        </p:nvCxnSpPr>
+        <p:spPr>
+          <a:xfrm flipH="1">
+            <a:off x="5186491" y="4194212"/>
+            <a:ext cx="661370" cy="0"/>
+          </a:xfrm>
+          <a:prstGeom prst="straightConnector1">
+            <a:avLst/>
+          </a:prstGeom>
+          <a:ln w="38100" cmpd="sng">
+            <a:tailEnd type="arrow"/>
+          </a:ln>
+        </p:spPr>
+        <p:style>
+          <a:lnRef idx="2">
+            <a:schemeClr val="accent1"/>
+          </a:lnRef>
+          <a:fillRef idx="0">
+            <a:schemeClr val="accent1"/>
+          </a:fillRef>
+          <a:effectRef idx="1">
+            <a:schemeClr val="accent1"/>
+          </a:effectRef>
+          <a:fontRef idx="minor">
+            <a:schemeClr val="tx1"/>
+          </a:fontRef>
+        </p:style>
+      </p:cxnSp>
+      <p:cxnSp>
+        <p:nvCxnSpPr>
+          <p:cNvPr id="26" name="Straight Arrow Connector 25"/>
+          <p:cNvCxnSpPr/>
+          <p:nvPr/>
+        </p:nvCxnSpPr>
+        <p:spPr>
+          <a:xfrm>
+            <a:off x="6623538" y="3312237"/>
+            <a:ext cx="312615" cy="462083"/>
+          </a:xfrm>
+          <a:prstGeom prst="straightConnector1">
+            <a:avLst/>
+          </a:prstGeom>
+          <a:ln w="38100" cmpd="sng">
+            <a:tailEnd type="arrow"/>
+          </a:ln>
+        </p:spPr>
+        <p:style>
+          <a:lnRef idx="2">
+            <a:schemeClr val="accent1"/>
+          </a:lnRef>
+          <a:fillRef idx="0">
+            <a:schemeClr val="accent1"/>
+          </a:fillRef>
+          <a:effectRef idx="1">
+            <a:schemeClr val="accent1"/>
+          </a:effectRef>
+          <a:fontRef idx="minor">
+            <a:schemeClr val="tx1"/>
+          </a:fontRef>
+        </p:style>
+      </p:cxnSp>
+      <p:sp>
+        <p:nvSpPr>
+          <p:cNvPr id="27" name="Content Placeholder 2"/>
+          <p:cNvSpPr txBox="1">
+            <a:spLocks/>
+          </p:cNvSpPr>
+          <p:nvPr/>
+        </p:nvSpPr>
+        <p:spPr>
+          <a:xfrm>
+            <a:off x="6027618" y="2423759"/>
+            <a:ext cx="1864946" cy="632500"/>
+          </a:xfrm>
+          <a:prstGeom prst="rect">
+            <a:avLst/>
+          </a:prstGeom>
+          <a:solidFill>
+            <a:srgbClr val="CCFFCC"/>
+          </a:solidFill>
+          <a:ln>
+            <a:solidFill>
+              <a:schemeClr val="tx1"/>
+            </a:solidFill>
+          </a:ln>
+        </p:spPr>
+        <p:txBody>
+          <a:bodyPr vert="horz" lIns="91440" tIns="45720" rIns="91440" bIns="45720" rtlCol="0" anchor="ctr">
+            <a:normAutofit/>
+          </a:bodyPr>
+          <a:lstStyle>
+            <a:lvl1pPr marL="182880" indent="-182880" algn="l" defTabSz="914400" rtl="0" eaLnBrk="1" latinLnBrk="0" hangingPunct="1">
+              <a:spcBef>
+                <a:spcPct val="20000"/>
+              </a:spcBef>
+              <a:buClr>
+                <a:schemeClr val="accent1"/>
+              </a:buClr>
+              <a:buSzPct val="85000"/>
+              <a:buFont typeface="Arial" pitchFamily="34" charset="0"/>
+              <a:buChar char="•"/>
+              <a:defRPr sz="2000" kern="1200">
+                <a:solidFill>
+                  <a:schemeClr val="tx1"/>
+                </a:solidFill>
+                <a:latin typeface="Lucida Fax"/>
+                <a:ea typeface="+mn-ea"/>
+                <a:cs typeface="+mn-cs"/>
+              </a:defRPr>
+            </a:lvl1pPr>
+            <a:lvl2pPr marL="457200" indent="-182880" algn="l" defTabSz="914400" rtl="0" eaLnBrk="1" latinLnBrk="0" hangingPunct="1">
+              <a:spcBef>
+                <a:spcPct val="20000"/>
+              </a:spcBef>
+              <a:buClr>
+                <a:schemeClr val="accent1"/>
+              </a:buClr>
+              <a:buSzPct val="85000"/>
+              <a:buFont typeface="Arial" pitchFamily="34" charset="0"/>
+              <a:buChar char="•"/>
+              <a:defRPr sz="1800" kern="1200">
+                <a:solidFill>
+                  <a:schemeClr val="tx1"/>
+                </a:solidFill>
+                <a:latin typeface="Lucida Fax"/>
+                <a:ea typeface="+mn-ea"/>
+                <a:cs typeface="+mn-cs"/>
+              </a:defRPr>
+            </a:lvl2pPr>
+            <a:lvl3pPr marL="731520" indent="-182880" algn="l" defTabSz="914400" rtl="0" eaLnBrk="1" latinLnBrk="0" hangingPunct="1">
+              <a:spcBef>
+                <a:spcPct val="20000"/>
+              </a:spcBef>
+              <a:buClr>
+                <a:schemeClr val="accent1"/>
+              </a:buClr>
+              <a:buSzPct val="90000"/>
+              <a:buFont typeface="Arial" pitchFamily="34" charset="0"/>
+              <a:buChar char="•"/>
+              <a:defRPr sz="1600" kern="1200">
+                <a:solidFill>
+                  <a:schemeClr val="tx1"/>
+                </a:solidFill>
+                <a:latin typeface="Lucida Fax"/>
+                <a:ea typeface="+mn-ea"/>
+                <a:cs typeface="+mn-cs"/>
+              </a:defRPr>
+            </a:lvl3pPr>
+            <a:lvl4pPr marL="1005840" indent="-182880" algn="l" defTabSz="914400" rtl="0" eaLnBrk="1" latinLnBrk="0" hangingPunct="1">
+              <a:spcBef>
+                <a:spcPct val="20000"/>
+              </a:spcBef>
+              <a:buClr>
+                <a:schemeClr val="accent1"/>
+              </a:buClr>
+              <a:buFont typeface="Arial" pitchFamily="34" charset="0"/>
+              <a:buChar char="•"/>
+              <a:defRPr sz="1400" kern="1200">
+                <a:solidFill>
+                  <a:schemeClr val="tx1"/>
+                </a:solidFill>
+                <a:latin typeface="Lucida Fax"/>
+                <a:ea typeface="+mn-ea"/>
+                <a:cs typeface="+mn-cs"/>
+              </a:defRPr>
+            </a:lvl4pPr>
+            <a:lvl5pPr marL="1188720" indent="-137160" algn="l" defTabSz="914400" rtl="0" eaLnBrk="1" latinLnBrk="0" hangingPunct="1">
+              <a:spcBef>
+                <a:spcPct val="20000"/>
+              </a:spcBef>
+              <a:buClr>
+                <a:schemeClr val="accent1"/>
+              </a:buClr>
+              <a:buSzPct val="100000"/>
+              <a:buFont typeface="Arial" pitchFamily="34" charset="0"/>
+              <a:buChar char="•"/>
+              <a:defRPr sz="1200" kern="1200" baseline="0">
+                <a:solidFill>
+                  <a:schemeClr val="tx1"/>
+                </a:solidFill>
+                <a:latin typeface="Lucida Fax"/>
+                <a:ea typeface="+mn-ea"/>
+                <a:cs typeface="+mn-cs"/>
+              </a:defRPr>
+            </a:lvl5pPr>
+            <a:lvl6pPr marL="1371600" indent="-182880" algn="l" defTabSz="914400" rtl="0" eaLnBrk="1" latinLnBrk="0" hangingPunct="1">
+              <a:spcBef>
+                <a:spcPct val="20000"/>
+              </a:spcBef>
+              <a:buClr>
+                <a:schemeClr val="accent1"/>
+              </a:buClr>
+              <a:buFont typeface="Arial" pitchFamily="34" charset="0"/>
+              <a:buChar char="•"/>
+              <a:defRPr sz="1300" kern="1200">
+                <a:solidFill>
+                  <a:schemeClr val="tx1"/>
+                </a:solidFill>
+                <a:latin typeface="+mn-lt"/>
+                <a:ea typeface="+mn-ea"/>
+                <a:cs typeface="+mn-cs"/>
+              </a:defRPr>
+            </a:lvl6pPr>
+            <a:lvl7pPr marL="1554480" indent="-182880" algn="l" defTabSz="914400" rtl="0" eaLnBrk="1" latinLnBrk="0" hangingPunct="1">
+              <a:spcBef>
+                <a:spcPct val="20000"/>
+              </a:spcBef>
+              <a:buClr>
+                <a:schemeClr val="accent1"/>
+              </a:buClr>
+              <a:buFont typeface="Arial" pitchFamily="34" charset="0"/>
+              <a:buChar char="•"/>
+              <a:defRPr sz="1300" kern="1200">
+                <a:solidFill>
+                  <a:schemeClr val="tx1"/>
+                </a:solidFill>
+                <a:latin typeface="+mn-lt"/>
+                <a:ea typeface="+mn-ea"/>
+                <a:cs typeface="+mn-cs"/>
+              </a:defRPr>
+            </a:lvl7pPr>
+            <a:lvl8pPr marL="1737360" indent="-182880" algn="l" defTabSz="914400" rtl="0" eaLnBrk="1" latinLnBrk="0" hangingPunct="1">
+              <a:spcBef>
+                <a:spcPct val="20000"/>
+              </a:spcBef>
+              <a:buClr>
+                <a:schemeClr val="accent1"/>
+              </a:buClr>
+              <a:buFont typeface="Arial" pitchFamily="34" charset="0"/>
+              <a:buChar char="•"/>
+              <a:defRPr sz="1300" kern="1200">
+                <a:solidFill>
+                  <a:schemeClr val="tx1"/>
+                </a:solidFill>
+                <a:latin typeface="+mn-lt"/>
+                <a:ea typeface="+mn-ea"/>
+                <a:cs typeface="+mn-cs"/>
+              </a:defRPr>
+            </a:lvl8pPr>
+            <a:lvl9pPr marL="1920240" indent="-182880" algn="l" defTabSz="914400" rtl="0" eaLnBrk="1" latinLnBrk="0" hangingPunct="1">
+              <a:spcBef>
+                <a:spcPct val="20000"/>
+              </a:spcBef>
+              <a:buClr>
+                <a:schemeClr val="accent1"/>
+              </a:buClr>
+              <a:buFont typeface="Arial" pitchFamily="34" charset="0"/>
+              <a:buChar char="•"/>
+              <a:defRPr sz="1300" kern="1200">
+                <a:solidFill>
+                  <a:schemeClr val="tx1"/>
+                </a:solidFill>
+                <a:latin typeface="+mn-lt"/>
+                <a:ea typeface="+mn-ea"/>
+                <a:cs typeface="+mn-cs"/>
+              </a:defRPr>
+            </a:lvl9pPr>
+          </a:lstStyle>
+          <a:p>
+            <a:pPr marL="0" indent="0" algn="ctr">
+              <a:buFont typeface="Arial" pitchFamily="34" charset="0"/>
+              <a:buNone/>
+            </a:pPr>
+            <a:r>
+              <a:rPr lang="en-US" dirty="0" smtClean="0"/>
+              <a:t>Gas Gain</a:t>
+            </a:r>
+          </a:p>
+        </p:txBody>
+      </p:sp>
+      <p:cxnSp>
+        <p:nvCxnSpPr>
+          <p:cNvPr id="28" name="Straight Arrow Connector 27"/>
+          <p:cNvCxnSpPr/>
+          <p:nvPr/>
+        </p:nvCxnSpPr>
+        <p:spPr>
+          <a:xfrm>
+            <a:off x="4548554" y="5472119"/>
+            <a:ext cx="0" cy="462083"/>
+          </a:xfrm>
+          <a:prstGeom prst="straightConnector1">
+            <a:avLst/>
+          </a:prstGeom>
+          <a:ln w="38100" cmpd="sng">
+            <a:tailEnd type="arrow"/>
+          </a:ln>
+        </p:spPr>
+        <p:style>
+          <a:lnRef idx="2">
+            <a:schemeClr val="accent1"/>
+          </a:lnRef>
+          <a:fillRef idx="0">
+            <a:schemeClr val="accent1"/>
+          </a:fillRef>
+          <a:effectRef idx="1">
+            <a:schemeClr val="accent1"/>
+          </a:effectRef>
+          <a:fontRef idx="minor">
+            <a:schemeClr val="tx1"/>
+          </a:fontRef>
+        </p:style>
+      </p:cxnSp>
+      <p:cxnSp>
+        <p:nvCxnSpPr>
+          <p:cNvPr id="19" name="Straight Arrow Connector 18"/>
+          <p:cNvCxnSpPr/>
+          <p:nvPr/>
+        </p:nvCxnSpPr>
+        <p:spPr>
+          <a:xfrm>
+            <a:off x="2668957" y="4566976"/>
+            <a:ext cx="455248" cy="219951"/>
+          </a:xfrm>
+          <a:prstGeom prst="straightConnector1">
+            <a:avLst/>
+          </a:prstGeom>
+          <a:ln w="38100" cmpd="sng">
+            <a:tailEnd type="arrow"/>
+          </a:ln>
+        </p:spPr>
+        <p:style>
+          <a:lnRef idx="2">
+            <a:schemeClr val="accent1"/>
+          </a:lnRef>
+          <a:fillRef idx="0">
+            <a:schemeClr val="accent1"/>
+          </a:fillRef>
+          <a:effectRef idx="1">
+            <a:schemeClr val="accent1"/>
+          </a:effectRef>
+          <a:fontRef idx="minor">
+            <a:schemeClr val="tx1"/>
+          </a:fontRef>
+        </p:style>
+      </p:cxnSp>
+      <p:sp>
+        <p:nvSpPr>
+          <p:cNvPr id="9" name="Frame 8"/>
+          <p:cNvSpPr/>
+          <p:nvPr/>
+        </p:nvSpPr>
+        <p:spPr>
+          <a:xfrm>
+            <a:off x="3143743" y="4625590"/>
+            <a:ext cx="2799859" cy="937846"/>
+          </a:xfrm>
+          <a:prstGeom prst="frame">
+            <a:avLst>
+              <a:gd name="adj1" fmla="val 2083"/>
+            </a:avLst>
+          </a:prstGeom>
+          <a:ln>
+            <a:solidFill>
+              <a:schemeClr val="tx1"/>
+            </a:solidFill>
+            <a:prstDash val="solid"/>
+          </a:ln>
+        </p:spPr>
+        <p:style>
+          <a:lnRef idx="1">
+            <a:schemeClr val="accent1"/>
+          </a:lnRef>
+          <a:fillRef idx="3">
+            <a:schemeClr val="accent1"/>
+          </a:fillRef>
+          <a:effectRef idx="2">
+            <a:schemeClr val="accent1"/>
+          </a:effectRef>
+          <a:fontRef idx="minor">
+            <a:schemeClr val="lt1"/>
+          </a:fontRef>
+        </p:style>
+        <p:txBody>
+          <a:bodyPr rtlCol="0" anchor="ctr"/>
+          <a:lstStyle/>
+          <a:p>
+            <a:pPr algn="ctr"/>
+            <a:endParaRPr lang="en-US">
+              <a:solidFill>
+                <a:schemeClr val="tx1"/>
+              </a:solidFill>
+            </a:endParaRPr>
+          </a:p>
+        </p:txBody>
+      </p:sp>
+      <p:sp>
+        <p:nvSpPr>
+          <p:cNvPr id="29" name="Content Placeholder 2"/>
+          <p:cNvSpPr txBox="1">
+            <a:spLocks/>
+          </p:cNvSpPr>
+          <p:nvPr/>
+        </p:nvSpPr>
+        <p:spPr>
+          <a:xfrm>
+            <a:off x="5924064" y="3842662"/>
+            <a:ext cx="2536090" cy="632500"/>
+          </a:xfrm>
+          <a:prstGeom prst="rect">
+            <a:avLst/>
+          </a:prstGeom>
+          <a:solidFill>
+            <a:srgbClr val="FF6600"/>
+          </a:solidFill>
+          <a:ln>
+            <a:solidFill>
+              <a:schemeClr val="tx1"/>
+            </a:solidFill>
+          </a:ln>
+        </p:spPr>
+        <p:txBody>
+          <a:bodyPr vert="horz" lIns="91440" tIns="45720" rIns="91440" bIns="45720" rtlCol="0" anchor="ctr">
+            <a:normAutofit/>
+          </a:bodyPr>
+          <a:lstStyle>
+            <a:lvl1pPr marL="182880" indent="-182880" algn="l" defTabSz="914400" rtl="0" eaLnBrk="1" latinLnBrk="0" hangingPunct="1">
+              <a:spcBef>
+                <a:spcPct val="20000"/>
+              </a:spcBef>
+              <a:buClr>
+                <a:schemeClr val="accent1"/>
+              </a:buClr>
+              <a:buSzPct val="85000"/>
+              <a:buFont typeface="Arial" pitchFamily="34" charset="0"/>
+              <a:buChar char="•"/>
+              <a:defRPr sz="2000" kern="1200">
+                <a:solidFill>
+                  <a:schemeClr val="tx1"/>
+                </a:solidFill>
+                <a:latin typeface="Lucida Fax"/>
+                <a:ea typeface="+mn-ea"/>
+                <a:cs typeface="+mn-cs"/>
+              </a:defRPr>
+            </a:lvl1pPr>
+            <a:lvl2pPr marL="457200" indent="-182880" algn="l" defTabSz="914400" rtl="0" eaLnBrk="1" latinLnBrk="0" hangingPunct="1">
+              <a:spcBef>
+                <a:spcPct val="20000"/>
+              </a:spcBef>
+              <a:buClr>
+                <a:schemeClr val="accent1"/>
+              </a:buClr>
+              <a:buSzPct val="85000"/>
+              <a:buFont typeface="Arial" pitchFamily="34" charset="0"/>
+              <a:buChar char="•"/>
+              <a:defRPr sz="1800" kern="1200">
+                <a:solidFill>
+                  <a:schemeClr val="tx1"/>
+                </a:solidFill>
+                <a:latin typeface="Lucida Fax"/>
+                <a:ea typeface="+mn-ea"/>
+                <a:cs typeface="+mn-cs"/>
+              </a:defRPr>
+            </a:lvl2pPr>
+            <a:lvl3pPr marL="731520" indent="-182880" algn="l" defTabSz="914400" rtl="0" eaLnBrk="1" latinLnBrk="0" hangingPunct="1">
+              <a:spcBef>
+                <a:spcPct val="20000"/>
+              </a:spcBef>
+              <a:buClr>
+                <a:schemeClr val="accent1"/>
+              </a:buClr>
+              <a:buSzPct val="90000"/>
+              <a:buFont typeface="Arial" pitchFamily="34" charset="0"/>
+              <a:buChar char="•"/>
+              <a:defRPr sz="1600" kern="1200">
+                <a:solidFill>
+                  <a:schemeClr val="tx1"/>
+                </a:solidFill>
+                <a:latin typeface="Lucida Fax"/>
+                <a:ea typeface="+mn-ea"/>
+                <a:cs typeface="+mn-cs"/>
+              </a:defRPr>
+            </a:lvl3pPr>
+            <a:lvl4pPr marL="1005840" indent="-182880" algn="l" defTabSz="914400" rtl="0" eaLnBrk="1" latinLnBrk="0" hangingPunct="1">
+              <a:spcBef>
+                <a:spcPct val="20000"/>
+              </a:spcBef>
+              <a:buClr>
+                <a:schemeClr val="accent1"/>
+              </a:buClr>
+              <a:buFont typeface="Arial" pitchFamily="34" charset="0"/>
+              <a:buChar char="•"/>
+              <a:defRPr sz="1400" kern="1200">
+                <a:solidFill>
+                  <a:schemeClr val="tx1"/>
+                </a:solidFill>
+                <a:latin typeface="Lucida Fax"/>
+                <a:ea typeface="+mn-ea"/>
+                <a:cs typeface="+mn-cs"/>
+              </a:defRPr>
+            </a:lvl4pPr>
+            <a:lvl5pPr marL="1188720" indent="-137160" algn="l" defTabSz="914400" rtl="0" eaLnBrk="1" latinLnBrk="0" hangingPunct="1">
+              <a:spcBef>
+                <a:spcPct val="20000"/>
+              </a:spcBef>
+              <a:buClr>
+                <a:schemeClr val="accent1"/>
+              </a:buClr>
+              <a:buSzPct val="100000"/>
+              <a:buFont typeface="Arial" pitchFamily="34" charset="0"/>
+              <a:buChar char="•"/>
+              <a:defRPr sz="1200" kern="1200" baseline="0">
+                <a:solidFill>
+                  <a:schemeClr val="tx1"/>
+                </a:solidFill>
+                <a:latin typeface="Lucida Fax"/>
+                <a:ea typeface="+mn-ea"/>
+                <a:cs typeface="+mn-cs"/>
+              </a:defRPr>
+            </a:lvl5pPr>
+            <a:lvl6pPr marL="1371600" indent="-182880" algn="l" defTabSz="914400" rtl="0" eaLnBrk="1" latinLnBrk="0" hangingPunct="1">
+              <a:spcBef>
+                <a:spcPct val="20000"/>
+              </a:spcBef>
+              <a:buClr>
+                <a:schemeClr val="accent1"/>
+              </a:buClr>
+              <a:buFont typeface="Arial" pitchFamily="34" charset="0"/>
+              <a:buChar char="•"/>
+              <a:defRPr sz="1300" kern="1200">
+                <a:solidFill>
+                  <a:schemeClr val="tx1"/>
+                </a:solidFill>
+                <a:latin typeface="+mn-lt"/>
+                <a:ea typeface="+mn-ea"/>
+                <a:cs typeface="+mn-cs"/>
+              </a:defRPr>
+            </a:lvl6pPr>
+            <a:lvl7pPr marL="1554480" indent="-182880" algn="l" defTabSz="914400" rtl="0" eaLnBrk="1" latinLnBrk="0" hangingPunct="1">
+              <a:spcBef>
+                <a:spcPct val="20000"/>
+              </a:spcBef>
+              <a:buClr>
+                <a:schemeClr val="accent1"/>
+              </a:buClr>
+              <a:buFont typeface="Arial" pitchFamily="34" charset="0"/>
+              <a:buChar char="•"/>
+              <a:defRPr sz="1300" kern="1200">
+                <a:solidFill>
+                  <a:schemeClr val="tx1"/>
+                </a:solidFill>
+                <a:latin typeface="+mn-lt"/>
+                <a:ea typeface="+mn-ea"/>
+                <a:cs typeface="+mn-cs"/>
+              </a:defRPr>
+            </a:lvl7pPr>
+            <a:lvl8pPr marL="1737360" indent="-182880" algn="l" defTabSz="914400" rtl="0" eaLnBrk="1" latinLnBrk="0" hangingPunct="1">
+              <a:spcBef>
+                <a:spcPct val="20000"/>
+              </a:spcBef>
+              <a:buClr>
+                <a:schemeClr val="accent1"/>
+              </a:buClr>
+              <a:buFont typeface="Arial" pitchFamily="34" charset="0"/>
+              <a:buChar char="•"/>
+              <a:defRPr sz="1300" kern="1200">
+                <a:solidFill>
+                  <a:schemeClr val="tx1"/>
+                </a:solidFill>
+                <a:latin typeface="+mn-lt"/>
+                <a:ea typeface="+mn-ea"/>
+                <a:cs typeface="+mn-cs"/>
+              </a:defRPr>
+            </a:lvl8pPr>
+            <a:lvl9pPr marL="1920240" indent="-182880" algn="l" defTabSz="914400" rtl="0" eaLnBrk="1" latinLnBrk="0" hangingPunct="1">
+              <a:spcBef>
+                <a:spcPct val="20000"/>
+              </a:spcBef>
+              <a:buClr>
+                <a:schemeClr val="accent1"/>
+              </a:buClr>
+              <a:buFont typeface="Arial" pitchFamily="34" charset="0"/>
+              <a:buChar char="•"/>
+              <a:defRPr sz="1300" kern="1200">
+                <a:solidFill>
+                  <a:schemeClr val="tx1"/>
+                </a:solidFill>
+                <a:latin typeface="+mn-lt"/>
+                <a:ea typeface="+mn-ea"/>
+                <a:cs typeface="+mn-cs"/>
+              </a:defRPr>
+            </a:lvl9pPr>
+          </a:lstStyle>
+          <a:p>
+            <a:pPr marL="0" indent="0" algn="ctr">
+              <a:buFont typeface="Arial" pitchFamily="34" charset="0"/>
+              <a:buNone/>
+            </a:pPr>
+            <a:r>
+              <a:rPr lang="en-US" dirty="0" smtClean="0"/>
+              <a:t>SPE Resolution</a:t>
+            </a:r>
+          </a:p>
+        </p:txBody>
+      </p:sp>
+      <p:sp>
+        <p:nvSpPr>
+          <p:cNvPr id="31" name="Content Placeholder 2"/>
+          <p:cNvSpPr txBox="1">
+            <a:spLocks/>
+          </p:cNvSpPr>
+          <p:nvPr/>
+        </p:nvSpPr>
+        <p:spPr>
+          <a:xfrm>
+            <a:off x="1426309" y="3842662"/>
+            <a:ext cx="3701566" cy="632500"/>
+          </a:xfrm>
+          <a:prstGeom prst="rect">
+            <a:avLst/>
+          </a:prstGeom>
+          <a:pattFill prst="pct10">
+            <a:fgClr>
+              <a:srgbClr val="0000FF"/>
+            </a:fgClr>
+            <a:bgClr>
+              <a:prstClr val="white"/>
+            </a:bgClr>
+          </a:pattFill>
+          <a:ln>
+            <a:solidFill>
+              <a:schemeClr val="tx1"/>
+            </a:solidFill>
+          </a:ln>
+        </p:spPr>
+        <p:txBody>
+          <a:bodyPr vert="horz" lIns="91440" tIns="45720" rIns="91440" bIns="45720" rtlCol="0" anchor="ctr">
+            <a:normAutofit/>
+          </a:bodyPr>
+          <a:lstStyle>
+            <a:lvl1pPr marL="182880" indent="-182880" algn="l" defTabSz="914400" rtl="0" eaLnBrk="1" latinLnBrk="0" hangingPunct="1">
+              <a:spcBef>
+                <a:spcPct val="20000"/>
+              </a:spcBef>
+              <a:buClr>
+                <a:schemeClr val="accent1"/>
+              </a:buClr>
+              <a:buSzPct val="85000"/>
+              <a:buFont typeface="Arial" pitchFamily="34" charset="0"/>
+              <a:buChar char="•"/>
+              <a:defRPr sz="2000" kern="1200">
+                <a:solidFill>
+                  <a:schemeClr val="tx1"/>
+                </a:solidFill>
+                <a:latin typeface="Lucida Fax"/>
+                <a:ea typeface="+mn-ea"/>
+                <a:cs typeface="+mn-cs"/>
+              </a:defRPr>
+            </a:lvl1pPr>
+            <a:lvl2pPr marL="457200" indent="-182880" algn="l" defTabSz="914400" rtl="0" eaLnBrk="1" latinLnBrk="0" hangingPunct="1">
+              <a:spcBef>
+                <a:spcPct val="20000"/>
+              </a:spcBef>
+              <a:buClr>
+                <a:schemeClr val="accent1"/>
+              </a:buClr>
+              <a:buSzPct val="85000"/>
+              <a:buFont typeface="Arial" pitchFamily="34" charset="0"/>
+              <a:buChar char="•"/>
+              <a:defRPr sz="1800" kern="1200">
+                <a:solidFill>
+                  <a:schemeClr val="tx1"/>
+                </a:solidFill>
+                <a:latin typeface="Lucida Fax"/>
+                <a:ea typeface="+mn-ea"/>
+                <a:cs typeface="+mn-cs"/>
+              </a:defRPr>
+            </a:lvl2pPr>
+            <a:lvl3pPr marL="731520" indent="-182880" algn="l" defTabSz="914400" rtl="0" eaLnBrk="1" latinLnBrk="0" hangingPunct="1">
+              <a:spcBef>
+                <a:spcPct val="20000"/>
+              </a:spcBef>
+              <a:buClr>
+                <a:schemeClr val="accent1"/>
+              </a:buClr>
+              <a:buSzPct val="90000"/>
+              <a:buFont typeface="Arial" pitchFamily="34" charset="0"/>
+              <a:buChar char="•"/>
+              <a:defRPr sz="1600" kern="1200">
+                <a:solidFill>
+                  <a:schemeClr val="tx1"/>
+                </a:solidFill>
+                <a:latin typeface="Lucida Fax"/>
+                <a:ea typeface="+mn-ea"/>
+                <a:cs typeface="+mn-cs"/>
+              </a:defRPr>
+            </a:lvl3pPr>
+            <a:lvl4pPr marL="1005840" indent="-182880" algn="l" defTabSz="914400" rtl="0" eaLnBrk="1" latinLnBrk="0" hangingPunct="1">
+              <a:spcBef>
+                <a:spcPct val="20000"/>
+              </a:spcBef>
+              <a:buClr>
+                <a:schemeClr val="accent1"/>
+              </a:buClr>
+              <a:buFont typeface="Arial" pitchFamily="34" charset="0"/>
+              <a:buChar char="•"/>
+              <a:defRPr sz="1400" kern="1200">
+                <a:solidFill>
+                  <a:schemeClr val="tx1"/>
+                </a:solidFill>
+                <a:latin typeface="Lucida Fax"/>
+                <a:ea typeface="+mn-ea"/>
+                <a:cs typeface="+mn-cs"/>
+              </a:defRPr>
+            </a:lvl4pPr>
+            <a:lvl5pPr marL="1188720" indent="-137160" algn="l" defTabSz="914400" rtl="0" eaLnBrk="1" latinLnBrk="0" hangingPunct="1">
+              <a:spcBef>
+                <a:spcPct val="20000"/>
+              </a:spcBef>
+              <a:buClr>
+                <a:schemeClr val="accent1"/>
+              </a:buClr>
+              <a:buSzPct val="100000"/>
+              <a:buFont typeface="Arial" pitchFamily="34" charset="0"/>
+              <a:buChar char="•"/>
+              <a:defRPr sz="1200" kern="1200" baseline="0">
+                <a:solidFill>
+                  <a:schemeClr val="tx1"/>
+                </a:solidFill>
+                <a:latin typeface="Lucida Fax"/>
+                <a:ea typeface="+mn-ea"/>
+                <a:cs typeface="+mn-cs"/>
+              </a:defRPr>
+            </a:lvl5pPr>
+            <a:lvl6pPr marL="1371600" indent="-182880" algn="l" defTabSz="914400" rtl="0" eaLnBrk="1" latinLnBrk="0" hangingPunct="1">
+              <a:spcBef>
+                <a:spcPct val="20000"/>
+              </a:spcBef>
+              <a:buClr>
+                <a:schemeClr val="accent1"/>
+              </a:buClr>
+              <a:buFont typeface="Arial" pitchFamily="34" charset="0"/>
+              <a:buChar char="•"/>
+              <a:defRPr sz="1300" kern="1200">
+                <a:solidFill>
+                  <a:schemeClr val="tx1"/>
+                </a:solidFill>
+                <a:latin typeface="+mn-lt"/>
+                <a:ea typeface="+mn-ea"/>
+                <a:cs typeface="+mn-cs"/>
+              </a:defRPr>
+            </a:lvl6pPr>
+            <a:lvl7pPr marL="1554480" indent="-182880" algn="l" defTabSz="914400" rtl="0" eaLnBrk="1" latinLnBrk="0" hangingPunct="1">
+              <a:spcBef>
+                <a:spcPct val="20000"/>
+              </a:spcBef>
+              <a:buClr>
+                <a:schemeClr val="accent1"/>
+              </a:buClr>
+              <a:buFont typeface="Arial" pitchFamily="34" charset="0"/>
+              <a:buChar char="•"/>
+              <a:defRPr sz="1300" kern="1200">
+                <a:solidFill>
+                  <a:schemeClr val="tx1"/>
+                </a:solidFill>
+                <a:latin typeface="+mn-lt"/>
+                <a:ea typeface="+mn-ea"/>
+                <a:cs typeface="+mn-cs"/>
+              </a:defRPr>
+            </a:lvl7pPr>
+            <a:lvl8pPr marL="1737360" indent="-182880" algn="l" defTabSz="914400" rtl="0" eaLnBrk="1" latinLnBrk="0" hangingPunct="1">
+              <a:spcBef>
+                <a:spcPct val="20000"/>
+              </a:spcBef>
+              <a:buClr>
+                <a:schemeClr val="accent1"/>
+              </a:buClr>
+              <a:buFont typeface="Arial" pitchFamily="34" charset="0"/>
+              <a:buChar char="•"/>
+              <a:defRPr sz="1300" kern="1200">
+                <a:solidFill>
+                  <a:schemeClr val="tx1"/>
+                </a:solidFill>
+                <a:latin typeface="+mn-lt"/>
+                <a:ea typeface="+mn-ea"/>
+                <a:cs typeface="+mn-cs"/>
+              </a:defRPr>
+            </a:lvl8pPr>
+            <a:lvl9pPr marL="1920240" indent="-182880" algn="l" defTabSz="914400" rtl="0" eaLnBrk="1" latinLnBrk="0" hangingPunct="1">
+              <a:spcBef>
+                <a:spcPct val="20000"/>
+              </a:spcBef>
+              <a:buClr>
+                <a:schemeClr val="accent1"/>
+              </a:buClr>
+              <a:buFont typeface="Arial" pitchFamily="34" charset="0"/>
+              <a:buChar char="•"/>
+              <a:defRPr sz="1300" kern="1200">
+                <a:solidFill>
+                  <a:schemeClr val="tx1"/>
+                </a:solidFill>
+                <a:latin typeface="+mn-lt"/>
+                <a:ea typeface="+mn-ea"/>
+                <a:cs typeface="+mn-cs"/>
+              </a:defRPr>
+            </a:lvl9pPr>
+          </a:lstStyle>
+          <a:p>
+            <a:pPr marL="0" indent="0" algn="ctr">
+              <a:buFont typeface="Arial" pitchFamily="34" charset="0"/>
+              <a:buNone/>
+            </a:pPr>
+            <a:r>
+              <a:rPr lang="en-US" dirty="0" smtClean="0"/>
+              <a:t>Intrinsic S1/S2 Resolution</a:t>
+            </a:r>
+          </a:p>
+        </p:txBody>
+      </p:sp>
+      <p:sp>
+        <p:nvSpPr>
+          <p:cNvPr id="32" name="Content Placeholder 2"/>
+          <p:cNvSpPr txBox="1">
+            <a:spLocks/>
+          </p:cNvSpPr>
+          <p:nvPr/>
+        </p:nvSpPr>
+        <p:spPr>
+          <a:xfrm>
+            <a:off x="3280509" y="4797490"/>
+            <a:ext cx="2536090" cy="632500"/>
+          </a:xfrm>
+          <a:prstGeom prst="rect">
+            <a:avLst/>
+          </a:prstGeom>
+          <a:solidFill>
+            <a:srgbClr val="FFFF00"/>
+          </a:solidFill>
+          <a:ln>
+            <a:solidFill>
+              <a:srgbClr val="FFFF00"/>
+            </a:solidFill>
+          </a:ln>
+        </p:spPr>
+        <p:txBody>
+          <a:bodyPr vert="horz" lIns="91440" tIns="45720" rIns="91440" bIns="45720" rtlCol="0" anchor="ctr">
+            <a:normAutofit/>
+          </a:bodyPr>
+          <a:lstStyle>
+            <a:lvl1pPr marL="182880" indent="-182880" algn="l" defTabSz="914400" rtl="0" eaLnBrk="1" latinLnBrk="0" hangingPunct="1">
+              <a:spcBef>
+                <a:spcPct val="20000"/>
+              </a:spcBef>
+              <a:buClr>
+                <a:schemeClr val="accent1"/>
+              </a:buClr>
+              <a:buSzPct val="85000"/>
+              <a:buFont typeface="Arial" pitchFamily="34" charset="0"/>
+              <a:buChar char="•"/>
+              <a:defRPr sz="2000" kern="1200">
+                <a:solidFill>
+                  <a:schemeClr val="tx1"/>
+                </a:solidFill>
+                <a:latin typeface="Lucida Fax"/>
+                <a:ea typeface="+mn-ea"/>
+                <a:cs typeface="+mn-cs"/>
+              </a:defRPr>
+            </a:lvl1pPr>
+            <a:lvl2pPr marL="457200" indent="-182880" algn="l" defTabSz="914400" rtl="0" eaLnBrk="1" latinLnBrk="0" hangingPunct="1">
+              <a:spcBef>
+                <a:spcPct val="20000"/>
+              </a:spcBef>
+              <a:buClr>
+                <a:schemeClr val="accent1"/>
+              </a:buClr>
+              <a:buSzPct val="85000"/>
+              <a:buFont typeface="Arial" pitchFamily="34" charset="0"/>
+              <a:buChar char="•"/>
+              <a:defRPr sz="1800" kern="1200">
+                <a:solidFill>
+                  <a:schemeClr val="tx1"/>
+                </a:solidFill>
+                <a:latin typeface="Lucida Fax"/>
+                <a:ea typeface="+mn-ea"/>
+                <a:cs typeface="+mn-cs"/>
+              </a:defRPr>
+            </a:lvl2pPr>
+            <a:lvl3pPr marL="731520" indent="-182880" algn="l" defTabSz="914400" rtl="0" eaLnBrk="1" latinLnBrk="0" hangingPunct="1">
+              <a:spcBef>
+                <a:spcPct val="20000"/>
+              </a:spcBef>
+              <a:buClr>
+                <a:schemeClr val="accent1"/>
+              </a:buClr>
+              <a:buSzPct val="90000"/>
+              <a:buFont typeface="Arial" pitchFamily="34" charset="0"/>
+              <a:buChar char="•"/>
+              <a:defRPr sz="1600" kern="1200">
+                <a:solidFill>
+                  <a:schemeClr val="tx1"/>
+                </a:solidFill>
+                <a:latin typeface="Lucida Fax"/>
+                <a:ea typeface="+mn-ea"/>
+                <a:cs typeface="+mn-cs"/>
+              </a:defRPr>
+            </a:lvl3pPr>
+            <a:lvl4pPr marL="1005840" indent="-182880" algn="l" defTabSz="914400" rtl="0" eaLnBrk="1" latinLnBrk="0" hangingPunct="1">
+              <a:spcBef>
+                <a:spcPct val="20000"/>
+              </a:spcBef>
+              <a:buClr>
+                <a:schemeClr val="accent1"/>
+              </a:buClr>
+              <a:buFont typeface="Arial" pitchFamily="34" charset="0"/>
+              <a:buChar char="•"/>
+              <a:defRPr sz="1400" kern="1200">
+                <a:solidFill>
+                  <a:schemeClr val="tx1"/>
+                </a:solidFill>
+                <a:latin typeface="Lucida Fax"/>
+                <a:ea typeface="+mn-ea"/>
+                <a:cs typeface="+mn-cs"/>
+              </a:defRPr>
+            </a:lvl4pPr>
+            <a:lvl5pPr marL="1188720" indent="-137160" algn="l" defTabSz="914400" rtl="0" eaLnBrk="1" latinLnBrk="0" hangingPunct="1">
+              <a:spcBef>
+                <a:spcPct val="20000"/>
+              </a:spcBef>
+              <a:buClr>
+                <a:schemeClr val="accent1"/>
+              </a:buClr>
+              <a:buSzPct val="100000"/>
+              <a:buFont typeface="Arial" pitchFamily="34" charset="0"/>
+              <a:buChar char="•"/>
+              <a:defRPr sz="1200" kern="1200" baseline="0">
+                <a:solidFill>
+                  <a:schemeClr val="tx1"/>
+                </a:solidFill>
+                <a:latin typeface="Lucida Fax"/>
+                <a:ea typeface="+mn-ea"/>
+                <a:cs typeface="+mn-cs"/>
+              </a:defRPr>
+            </a:lvl5pPr>
+            <a:lvl6pPr marL="1371600" indent="-182880" algn="l" defTabSz="914400" rtl="0" eaLnBrk="1" latinLnBrk="0" hangingPunct="1">
+              <a:spcBef>
+                <a:spcPct val="20000"/>
+              </a:spcBef>
+              <a:buClr>
+                <a:schemeClr val="accent1"/>
+              </a:buClr>
+              <a:buFont typeface="Arial" pitchFamily="34" charset="0"/>
+              <a:buChar char="•"/>
+              <a:defRPr sz="1300" kern="1200">
+                <a:solidFill>
+                  <a:schemeClr val="tx1"/>
+                </a:solidFill>
+                <a:latin typeface="+mn-lt"/>
+                <a:ea typeface="+mn-ea"/>
+                <a:cs typeface="+mn-cs"/>
+              </a:defRPr>
+            </a:lvl6pPr>
+            <a:lvl7pPr marL="1554480" indent="-182880" algn="l" defTabSz="914400" rtl="0" eaLnBrk="1" latinLnBrk="0" hangingPunct="1">
+              <a:spcBef>
+                <a:spcPct val="20000"/>
+              </a:spcBef>
+              <a:buClr>
+                <a:schemeClr val="accent1"/>
+              </a:buClr>
+              <a:buFont typeface="Arial" pitchFamily="34" charset="0"/>
+              <a:buChar char="•"/>
+              <a:defRPr sz="1300" kern="1200">
+                <a:solidFill>
+                  <a:schemeClr val="tx1"/>
+                </a:solidFill>
+                <a:latin typeface="+mn-lt"/>
+                <a:ea typeface="+mn-ea"/>
+                <a:cs typeface="+mn-cs"/>
+              </a:defRPr>
+            </a:lvl7pPr>
+            <a:lvl8pPr marL="1737360" indent="-182880" algn="l" defTabSz="914400" rtl="0" eaLnBrk="1" latinLnBrk="0" hangingPunct="1">
+              <a:spcBef>
+                <a:spcPct val="20000"/>
+              </a:spcBef>
+              <a:buClr>
+                <a:schemeClr val="accent1"/>
+              </a:buClr>
+              <a:buFont typeface="Arial" pitchFamily="34" charset="0"/>
+              <a:buChar char="•"/>
+              <a:defRPr sz="1300" kern="1200">
+                <a:solidFill>
+                  <a:schemeClr val="tx1"/>
+                </a:solidFill>
+                <a:latin typeface="+mn-lt"/>
+                <a:ea typeface="+mn-ea"/>
+                <a:cs typeface="+mn-cs"/>
+              </a:defRPr>
+            </a:lvl8pPr>
+            <a:lvl9pPr marL="1920240" indent="-182880" algn="l" defTabSz="914400" rtl="0" eaLnBrk="1" latinLnBrk="0" hangingPunct="1">
+              <a:spcBef>
+                <a:spcPct val="20000"/>
+              </a:spcBef>
+              <a:buClr>
+                <a:schemeClr val="accent1"/>
+              </a:buClr>
+              <a:buFont typeface="Arial" pitchFamily="34" charset="0"/>
+              <a:buChar char="•"/>
+              <a:defRPr sz="1300" kern="1200">
+                <a:solidFill>
+                  <a:schemeClr val="tx1"/>
+                </a:solidFill>
+                <a:latin typeface="+mn-lt"/>
+                <a:ea typeface="+mn-ea"/>
+                <a:cs typeface="+mn-cs"/>
+              </a:defRPr>
+            </a:lvl9pPr>
+          </a:lstStyle>
+          <a:p>
+            <a:pPr marL="0" indent="0" algn="ctr">
+              <a:buFont typeface="Arial" pitchFamily="34" charset="0"/>
+              <a:buNone/>
+            </a:pPr>
+            <a:r>
+              <a:rPr lang="en-US" dirty="0" smtClean="0"/>
+              <a:t>S1/S2 Efficiency</a:t>
+            </a:r>
+          </a:p>
+        </p:txBody>
+      </p:sp>
+    </p:spTree>
+    <p:extLst>
+      <p:ext uri="{BB962C8B-B14F-4D97-AF65-F5344CB8AC3E}">
+        <p14:creationId xmlns:p14="http://schemas.microsoft.com/office/powerpoint/2010/main" val="142465598"/>
+      </p:ext>
+    </p:extLst>
+  </p:cSld>
+  <p:clrMapOvr>
+    <a:masterClrMapping/>
+  </p:clrMapOvr>
+  <mc:AlternateContent xmlns:mc="http://schemas.openxmlformats.org/markup-compatibility/2006" xmlns:p14="http://schemas.microsoft.com/office/powerpoint/2010/main">
+    <mc:Choice Requires="p14">
+      <p:transition spd="slow" p14:dur="2000" advTm="34259"/>
+    </mc:Choice>
+    <mc:Fallback xmlns="">
+      <p:transition xmlns:p14="http://schemas.microsoft.com/office/powerpoint/2010/main" spd="slow" advTm="34259"/>
+    </mc:Fallback>
+  </mc:AlternateContent>
+  <p:timing>
+    <p:tnLst>
+      <p:par>
+        <p:cTn xmlns:p14="http://schemas.microsoft.com/office/powerpoint/2010/main" id="1" dur="indefinite" restart="never" nodeType="tmRoot"/>
+      </p:par>
+    </p:tnLst>
+  </p:timing>
+</p:sld>
+</file>
+
+<file path=ppt/slides/slide15.xml><?xml version="1.0" encoding="utf-8"?>
+<p:sld xmlns:a="http://schemas.openxmlformats.org/drawingml/2006/main" xmlns:r="http://schemas.openxmlformats.org/officeDocument/2006/relationships" xmlns:p="http://schemas.openxmlformats.org/presentationml/2006/main">
+  <p:cSld>
+    <p:spTree>
+      <p:nvGrpSpPr>
+        <p:cNvPr id="1" name=""/>
+        <p:cNvGrpSpPr/>
+        <p:nvPr/>
+      </p:nvGrpSpPr>
+      <p:grpSpPr>
+        <a:xfrm>
+          <a:off x="0" y="0"/>
+          <a:ext cx="0" cy="0"/>
+          <a:chOff x="0" y="0"/>
+          <a:chExt cx="0" cy="0"/>
+        </a:xfrm>
+      </p:grpSpPr>
+      <p:sp>
+        <p:nvSpPr>
+          <p:cNvPr id="2" name="Title 1"/>
+          <p:cNvSpPr>
+            <a:spLocks noGrp="1"/>
+          </p:cNvSpPr>
+          <p:nvPr>
+            <p:ph type="title"/>
+          </p:nvPr>
+        </p:nvSpPr>
+        <p:spPr/>
+        <p:txBody>
+          <a:bodyPr>
+            <a:noAutofit/>
+          </a:bodyPr>
+          <a:lstStyle/>
+          <a:p>
+            <a:r>
+              <a:rPr lang="en-US" sz="3200" dirty="0" smtClean="0"/>
+              <a:t>PF Efficiency</a:t>
+            </a:r>
+            <a:endParaRPr lang="en-US" sz="3200" dirty="0"/>
+          </a:p>
+        </p:txBody>
+      </p:sp>
+      <p:sp>
+        <p:nvSpPr>
+          <p:cNvPr id="7" name="Content Placeholder 6"/>
+          <p:cNvSpPr>
+            <a:spLocks noGrp="1"/>
+          </p:cNvSpPr>
+          <p:nvPr>
+            <p:ph idx="1"/>
+          </p:nvPr>
+        </p:nvSpPr>
+        <p:spPr>
+          <a:xfrm>
+            <a:off x="457200" y="1309914"/>
+            <a:ext cx="8229600" cy="2500086"/>
+          </a:xfrm>
+        </p:spPr>
+        <p:txBody>
+          <a:bodyPr>
+            <a:normAutofit/>
+          </a:bodyPr>
+          <a:lstStyle/>
+          <a:p>
+            <a:pPr marL="0" indent="0">
+              <a:buNone/>
+            </a:pPr>
+            <a:r>
+              <a:rPr lang="en-US" dirty="0" smtClean="0"/>
+              <a:t>Calibration: Waveform </a:t>
+            </a:r>
+            <a:r>
+              <a:rPr lang="en-US" dirty="0" smtClean="0"/>
+              <a:t>Simulator</a:t>
+            </a:r>
+          </a:p>
+          <a:p>
+            <a:pPr marL="0" indent="0">
+              <a:buNone/>
+            </a:pPr>
+            <a:endParaRPr lang="en-US" dirty="0"/>
+          </a:p>
+          <a:p>
+            <a:pPr marL="0" indent="0">
+              <a:buNone/>
+            </a:pPr>
+            <a:r>
+              <a:rPr lang="en-US" dirty="0" smtClean="0"/>
+              <a:t>Examine the efficiency of the </a:t>
+            </a:r>
+            <a:r>
+              <a:rPr lang="en-US" dirty="0" err="1" smtClean="0"/>
+              <a:t>xerawdp</a:t>
+            </a:r>
+            <a:r>
+              <a:rPr lang="en-US" dirty="0" smtClean="0"/>
+              <a:t> </a:t>
+            </a:r>
+            <a:r>
+              <a:rPr lang="en-US" dirty="0" err="1" smtClean="0"/>
+              <a:t>peakfinder</a:t>
+            </a:r>
+            <a:r>
+              <a:rPr lang="en-US" dirty="0" smtClean="0"/>
+              <a:t> used in NR data.</a:t>
+            </a:r>
+          </a:p>
+          <a:p>
+            <a:pPr marL="0" indent="0">
+              <a:buNone/>
+            </a:pPr>
+            <a:endParaRPr lang="en-US" dirty="0"/>
+          </a:p>
+          <a:p>
+            <a:pPr marL="0" indent="0">
+              <a:buNone/>
+            </a:pPr>
+            <a:r>
+              <a:rPr lang="en-US" dirty="0" smtClean="0"/>
+              <a:t>Also can characterize the resolution of the peak finder as a function of the S1 size.</a:t>
+            </a:r>
+            <a:endParaRPr lang="en-US" dirty="0" smtClean="0"/>
+          </a:p>
+          <a:p>
+            <a:pPr marL="0" indent="0">
+              <a:buNone/>
+            </a:pPr>
+            <a:endParaRPr lang="en-US" dirty="0"/>
+          </a:p>
+          <a:p>
+            <a:pPr marL="0" indent="0">
+              <a:buNone/>
+            </a:pPr>
+            <a:endParaRPr lang="en-US" dirty="0" smtClean="0"/>
+          </a:p>
+        </p:txBody>
+      </p:sp>
+      <p:sp>
+        <p:nvSpPr>
+          <p:cNvPr id="4" name="Date Placeholder 3"/>
+          <p:cNvSpPr>
+            <a:spLocks noGrp="1"/>
+          </p:cNvSpPr>
+          <p:nvPr>
+            <p:ph type="dt" sz="half" idx="10"/>
+          </p:nvPr>
+        </p:nvSpPr>
+        <p:spPr/>
+        <p:txBody>
+          <a:bodyPr/>
+          <a:lstStyle/>
+          <a:p>
+            <a:r>
+              <a:rPr lang="en-US" smtClean="0"/>
+              <a:t>7/7/16</a:t>
+            </a:r>
+            <a:endParaRPr lang="en-US" dirty="0"/>
+          </a:p>
+        </p:txBody>
+      </p:sp>
+      <p:sp>
+        <p:nvSpPr>
+          <p:cNvPr id="5" name="Footer Placeholder 4"/>
+          <p:cNvSpPr>
+            <a:spLocks noGrp="1"/>
+          </p:cNvSpPr>
+          <p:nvPr>
+            <p:ph type="ftr" sz="quarter" idx="11"/>
+          </p:nvPr>
+        </p:nvSpPr>
+        <p:spPr/>
+        <p:txBody>
+          <a:bodyPr/>
+          <a:lstStyle/>
+          <a:p>
+            <a:r>
+              <a:rPr lang="en-US" smtClean="0"/>
+              <a:t>Matthew D. Anthony</a:t>
+            </a:r>
+            <a:endParaRPr lang="en-US"/>
+          </a:p>
+        </p:txBody>
+      </p:sp>
+      <p:sp>
+        <p:nvSpPr>
+          <p:cNvPr id="6" name="Slide Number Placeholder 5"/>
+          <p:cNvSpPr>
+            <a:spLocks noGrp="1"/>
+          </p:cNvSpPr>
+          <p:nvPr>
+            <p:ph type="sldNum" sz="quarter" idx="12"/>
+          </p:nvPr>
+        </p:nvSpPr>
+        <p:spPr/>
+        <p:txBody>
+          <a:bodyPr/>
+          <a:lstStyle/>
+          <a:p>
+            <a:fld id="{CFE4BAC9-6D41-4691-9299-18EF07EF0177}" type="slidenum">
+              <a:rPr lang="en-US" smtClean="0"/>
+              <a:t>15</a:t>
+            </a:fld>
+            <a:endParaRPr lang="en-US"/>
+          </a:p>
+        </p:txBody>
+      </p:sp>
+      <p:pic>
+        <p:nvPicPr>
+          <p:cNvPr id="8" name="Picture 7" descr="s1_pf_resolution.png"/>
+          <p:cNvPicPr>
+            <a:picLocks noChangeAspect="1"/>
+          </p:cNvPicPr>
+          <p:nvPr/>
+        </p:nvPicPr>
+        <p:blipFill>
+          <a:blip r:embed="rId3">
+            <a:extLst>
+              <a:ext uri="{28A0092B-C50C-407E-A947-70E740481C1C}">
+                <a14:useLocalDpi xmlns:a14="http://schemas.microsoft.com/office/drawing/2010/main" val="0"/>
+              </a:ext>
+            </a:extLst>
+          </a:blip>
+          <a:stretch>
+            <a:fillRect/>
+          </a:stretch>
+        </p:blipFill>
+        <p:spPr>
+          <a:xfrm>
+            <a:off x="4450861" y="3810000"/>
+            <a:ext cx="3993661" cy="2852615"/>
+          </a:xfrm>
+          <a:prstGeom prst="rect">
+            <a:avLst/>
+          </a:prstGeom>
+        </p:spPr>
+      </p:pic>
+      <p:pic>
+        <p:nvPicPr>
+          <p:cNvPr id="9" name="Picture 8" descr="s1_pf_efficiency.png"/>
+          <p:cNvPicPr>
+            <a:picLocks noChangeAspect="1"/>
+          </p:cNvPicPr>
+          <p:nvPr/>
+        </p:nvPicPr>
+        <p:blipFill>
+          <a:blip r:embed="rId4">
+            <a:extLst>
+              <a:ext uri="{28A0092B-C50C-407E-A947-70E740481C1C}">
+                <a14:useLocalDpi xmlns:a14="http://schemas.microsoft.com/office/drawing/2010/main" val="0"/>
+              </a:ext>
+            </a:extLst>
+          </a:blip>
+          <a:stretch>
+            <a:fillRect/>
+          </a:stretch>
+        </p:blipFill>
+        <p:spPr>
+          <a:xfrm>
+            <a:off x="457200" y="3810000"/>
+            <a:ext cx="3993661" cy="2852615"/>
+          </a:xfrm>
+          <a:prstGeom prst="rect">
+            <a:avLst/>
+          </a:prstGeom>
+        </p:spPr>
+      </p:pic>
+    </p:spTree>
+    <p:extLst>
+      <p:ext uri="{BB962C8B-B14F-4D97-AF65-F5344CB8AC3E}">
+        <p14:creationId xmlns:p14="http://schemas.microsoft.com/office/powerpoint/2010/main" val="3894067251"/>
+      </p:ext>
+    </p:extLst>
+  </p:cSld>
+  <p:clrMapOvr>
+    <a:masterClrMapping/>
+  </p:clrMapOvr>
+  <mc:AlternateContent xmlns:mc="http://schemas.openxmlformats.org/markup-compatibility/2006" xmlns:p14="http://schemas.microsoft.com/office/powerpoint/2010/main">
+    <mc:Choice Requires="p14">
+      <p:transition spd="slow" p14:dur="2000" advTm="9161"/>
+    </mc:Choice>
+    <mc:Fallback xmlns="">
+      <p:transition xmlns:p14="http://schemas.microsoft.com/office/powerpoint/2010/main" spd="slow" advTm="9161"/>
+    </mc:Fallback>
+  </mc:AlternateContent>
+  <p:timing>
+    <p:tnLst>
+      <p:par>
+        <p:cTn xmlns:p14="http://schemas.microsoft.com/office/powerpoint/2010/main" id="1" dur="indefinite" restart="never" nodeType="tmRoot"/>
+      </p:par>
+    </p:tnLst>
+  </p:timing>
+</p:sld>
+</file>
+
+<file path=ppt/slides/slide16.xml><?xml version="1.0" encoding="utf-8"?>
+<p:sld xmlns:a="http://schemas.openxmlformats.org/drawingml/2006/main" xmlns:r="http://schemas.openxmlformats.org/officeDocument/2006/relationships" xmlns:p="http://schemas.openxmlformats.org/presentationml/2006/main">
+  <p:cSld>
+    <p:spTree>
+      <p:nvGrpSpPr>
+        <p:cNvPr id="1" name=""/>
+        <p:cNvGrpSpPr/>
+        <p:nvPr/>
+      </p:nvGrpSpPr>
+      <p:grpSpPr>
+        <a:xfrm>
+          <a:off x="0" y="0"/>
+          <a:ext cx="0" cy="0"/>
+          <a:chOff x="0" y="0"/>
+          <a:chExt cx="0" cy="0"/>
+        </a:xfrm>
+      </p:grpSpPr>
+      <p:sp>
+        <p:nvSpPr>
+          <p:cNvPr id="2" name="Title 1"/>
+          <p:cNvSpPr>
+            <a:spLocks noGrp="1"/>
+          </p:cNvSpPr>
+          <p:nvPr>
+            <p:ph type="title"/>
+          </p:nvPr>
+        </p:nvSpPr>
+        <p:spPr/>
+        <p:txBody>
+          <a:bodyPr>
+            <a:noAutofit/>
+          </a:bodyPr>
+          <a:lstStyle/>
+          <a:p>
+            <a:r>
+              <a:rPr lang="en-US" sz="3200" dirty="0" smtClean="0"/>
+              <a:t>S2 Trigger Efficiency</a:t>
+            </a:r>
+            <a:endParaRPr lang="en-US" sz="3200" dirty="0"/>
+          </a:p>
+        </p:txBody>
+      </p:sp>
+      <p:sp>
+        <p:nvSpPr>
+          <p:cNvPr id="7" name="Content Placeholder 6"/>
+          <p:cNvSpPr>
+            <a:spLocks noGrp="1"/>
+          </p:cNvSpPr>
+          <p:nvPr>
+            <p:ph idx="1"/>
+          </p:nvPr>
+        </p:nvSpPr>
+        <p:spPr>
+          <a:xfrm>
+            <a:off x="457200" y="1309914"/>
+            <a:ext cx="8229600" cy="2500086"/>
+          </a:xfrm>
+        </p:spPr>
+        <p:txBody>
+          <a:bodyPr>
+            <a:normAutofit/>
+          </a:bodyPr>
+          <a:lstStyle/>
+          <a:p>
+            <a:pPr marL="0" indent="0">
+              <a:buNone/>
+            </a:pPr>
+            <a:r>
+              <a:rPr lang="en-US" dirty="0" smtClean="0"/>
+              <a:t>Calibration: </a:t>
+            </a:r>
+            <a:r>
+              <a:rPr lang="en-US" dirty="0" err="1" smtClean="0"/>
+              <a:t>NaI</a:t>
+            </a:r>
+            <a:r>
+              <a:rPr lang="en-US" dirty="0" smtClean="0"/>
+              <a:t> – true and random coincidence</a:t>
+            </a:r>
+            <a:endParaRPr lang="en-US" dirty="0" smtClean="0"/>
+          </a:p>
+          <a:p>
+            <a:pPr marL="0" indent="0">
+              <a:buNone/>
+            </a:pPr>
+            <a:endParaRPr lang="en-US" dirty="0" smtClean="0"/>
+          </a:p>
+          <a:p>
+            <a:pPr marL="0" indent="0">
+              <a:buNone/>
+            </a:pPr>
+            <a:r>
+              <a:rPr lang="en-US" dirty="0" smtClean="0"/>
+              <a:t>Look at S2s in waveform and whether they had trigger in fixed time window afterwards</a:t>
+            </a:r>
+            <a:endParaRPr lang="en-US" dirty="0"/>
+          </a:p>
+        </p:txBody>
+      </p:sp>
+      <p:sp>
+        <p:nvSpPr>
+          <p:cNvPr id="4" name="Date Placeholder 3"/>
+          <p:cNvSpPr>
+            <a:spLocks noGrp="1"/>
+          </p:cNvSpPr>
+          <p:nvPr>
+            <p:ph type="dt" sz="half" idx="10"/>
+          </p:nvPr>
+        </p:nvSpPr>
+        <p:spPr/>
+        <p:txBody>
+          <a:bodyPr/>
+          <a:lstStyle/>
+          <a:p>
+            <a:r>
+              <a:rPr lang="en-US" smtClean="0"/>
+              <a:t>7/7/16</a:t>
+            </a:r>
+            <a:endParaRPr lang="en-US" dirty="0"/>
+          </a:p>
+        </p:txBody>
+      </p:sp>
+      <p:sp>
+        <p:nvSpPr>
+          <p:cNvPr id="5" name="Footer Placeholder 4"/>
+          <p:cNvSpPr>
+            <a:spLocks noGrp="1"/>
+          </p:cNvSpPr>
+          <p:nvPr>
+            <p:ph type="ftr" sz="quarter" idx="11"/>
+          </p:nvPr>
+        </p:nvSpPr>
+        <p:spPr/>
+        <p:txBody>
+          <a:bodyPr/>
+          <a:lstStyle/>
+          <a:p>
+            <a:r>
+              <a:rPr lang="en-US" smtClean="0"/>
+              <a:t>Matthew D. Anthony</a:t>
+            </a:r>
+            <a:endParaRPr lang="en-US"/>
+          </a:p>
+        </p:txBody>
+      </p:sp>
+      <p:sp>
+        <p:nvSpPr>
+          <p:cNvPr id="6" name="Slide Number Placeholder 5"/>
+          <p:cNvSpPr>
+            <a:spLocks noGrp="1"/>
+          </p:cNvSpPr>
+          <p:nvPr>
+            <p:ph type="sldNum" sz="quarter" idx="12"/>
+          </p:nvPr>
+        </p:nvSpPr>
+        <p:spPr/>
+        <p:txBody>
+          <a:bodyPr/>
+          <a:lstStyle/>
+          <a:p>
+            <a:fld id="{CFE4BAC9-6D41-4691-9299-18EF07EF0177}" type="slidenum">
+              <a:rPr lang="en-US" smtClean="0"/>
+              <a:t>16</a:t>
+            </a:fld>
+            <a:endParaRPr lang="en-US"/>
+          </a:p>
+        </p:txBody>
+      </p:sp>
+      <p:pic>
+        <p:nvPicPr>
+          <p:cNvPr id="8" name="Picture 7" descr="s2_trig_efficiency.png"/>
+          <p:cNvPicPr>
+            <a:picLocks noChangeAspect="1"/>
+          </p:cNvPicPr>
+          <p:nvPr/>
+        </p:nvPicPr>
+        <p:blipFill>
+          <a:blip r:embed="rId3">
+            <a:extLst>
+              <a:ext uri="{28A0092B-C50C-407E-A947-70E740481C1C}">
+                <a14:useLocalDpi xmlns:a14="http://schemas.microsoft.com/office/drawing/2010/main" val="0"/>
+              </a:ext>
+            </a:extLst>
+          </a:blip>
+          <a:stretch>
+            <a:fillRect/>
+          </a:stretch>
+        </p:blipFill>
+        <p:spPr>
+          <a:xfrm>
+            <a:off x="97696" y="3335495"/>
+            <a:ext cx="4630615" cy="3307582"/>
+          </a:xfrm>
+          <a:prstGeom prst="rect">
+            <a:avLst/>
+          </a:prstGeom>
+        </p:spPr>
+      </p:pic>
+      <p:pic>
+        <p:nvPicPr>
+          <p:cNvPr id="9" name="Picture 8" descr="s2_trig_efficiency.png"/>
+          <p:cNvPicPr>
+            <a:picLocks noChangeAspect="1"/>
+          </p:cNvPicPr>
+          <p:nvPr/>
+        </p:nvPicPr>
+        <p:blipFill>
+          <a:blip r:embed="rId4">
+            <a:extLst>
+              <a:ext uri="{28A0092B-C50C-407E-A947-70E740481C1C}">
+                <a14:useLocalDpi xmlns:a14="http://schemas.microsoft.com/office/drawing/2010/main" val="0"/>
+              </a:ext>
+            </a:extLst>
+          </a:blip>
+          <a:stretch>
+            <a:fillRect/>
+          </a:stretch>
+        </p:blipFill>
+        <p:spPr>
+          <a:xfrm>
+            <a:off x="4532923" y="3335494"/>
+            <a:ext cx="4630615" cy="3307583"/>
+          </a:xfrm>
+          <a:prstGeom prst="rect">
+            <a:avLst/>
+          </a:prstGeom>
+        </p:spPr>
+      </p:pic>
+    </p:spTree>
+    <p:extLst>
+      <p:ext uri="{BB962C8B-B14F-4D97-AF65-F5344CB8AC3E}">
+        <p14:creationId xmlns:p14="http://schemas.microsoft.com/office/powerpoint/2010/main" val="3894067251"/>
+      </p:ext>
+    </p:extLst>
+  </p:cSld>
+  <p:clrMapOvr>
+    <a:masterClrMapping/>
+  </p:clrMapOvr>
+  <mc:AlternateContent xmlns:mc="http://schemas.openxmlformats.org/markup-compatibility/2006" xmlns:p14="http://schemas.microsoft.com/office/powerpoint/2010/main">
+    <mc:Choice Requires="p14">
+      <p:transition spd="slow" p14:dur="2000" advTm="9161"/>
+    </mc:Choice>
+    <mc:Fallback xmlns="">
+      <p:transition xmlns:p14="http://schemas.microsoft.com/office/powerpoint/2010/main" spd="slow" advTm="9161"/>
+    </mc:Fallback>
+  </mc:AlternateContent>
+  <p:timing>
+    <p:tnLst>
+      <p:par>
+        <p:cTn xmlns:p14="http://schemas.microsoft.com/office/powerpoint/2010/main" id="1" dur="indefinite" restart="never" nodeType="tmRoot"/>
+      </p:par>
+    </p:tnLst>
+  </p:timing>
+</p:sld>
+</file>
+
 <file path=ppt/slides/slide2.xml><?xml version="1.0" encoding="utf-8"?>
 <p:sld xmlns:a="http://schemas.openxmlformats.org/drawingml/2006/main" xmlns:r="http://schemas.openxmlformats.org/officeDocument/2006/relationships" xmlns:p="http://schemas.openxmlformats.org/presentationml/2006/main">
   <p:cSld>
@@ -15229,13 +17949,8 @@
             </a:pPr>
             <a:r>
               <a:rPr lang="en-US" dirty="0" smtClean="0"/>
-              <a:t>Calibrations: </a:t>
-            </a:r>
-            <a:r>
-              <a:rPr lang="en-US" dirty="0" smtClean="0"/>
-              <a:t>LED at high and low voltages</a:t>
-            </a:r>
-            <a:endParaRPr lang="en-US" dirty="0" smtClean="0"/>
+              <a:t>Calibrations: LED at high and low voltages</a:t>
+            </a:r>
           </a:p>
           <a:p>
             <a:pPr marL="0" indent="0">

</xml_diff>